<commit_message>
Korrektur Grafiken und Vortrag
</commit_message>
<xml_diff>
--- a/Vorträge/VortragFlorianSchierzBloomfilterKurz.pptx
+++ b/Vorträge/VortragFlorianSchierzBloomfilterKurz.pptx
@@ -5,7 +5,7 @@
     <p:sldMasterId id="2147483648" r:id="rId1"/>
   </p:sldMasterIdLst>
   <p:notesMasterIdLst>
-    <p:notesMasterId r:id="rId36"/>
+    <p:notesMasterId r:id="rId40"/>
   </p:notesMasterIdLst>
   <p:sldIdLst>
     <p:sldId id="260" r:id="rId2"/>
@@ -35,13 +35,17 @@
     <p:sldId id="276" r:id="rId26"/>
     <p:sldId id="262" r:id="rId27"/>
     <p:sldId id="266" r:id="rId28"/>
-    <p:sldId id="259" r:id="rId29"/>
-    <p:sldId id="270" r:id="rId30"/>
-    <p:sldId id="273" r:id="rId31"/>
-    <p:sldId id="285" r:id="rId32"/>
-    <p:sldId id="286" r:id="rId33"/>
-    <p:sldId id="284" r:id="rId34"/>
-    <p:sldId id="258" r:id="rId35"/>
+    <p:sldId id="295" r:id="rId29"/>
+    <p:sldId id="292" r:id="rId30"/>
+    <p:sldId id="293" r:id="rId31"/>
+    <p:sldId id="294" r:id="rId32"/>
+    <p:sldId id="259" r:id="rId33"/>
+    <p:sldId id="270" r:id="rId34"/>
+    <p:sldId id="273" r:id="rId35"/>
+    <p:sldId id="285" r:id="rId36"/>
+    <p:sldId id="286" r:id="rId37"/>
+    <p:sldId id="284" r:id="rId38"/>
+    <p:sldId id="258" r:id="rId39"/>
   </p:sldIdLst>
   <p:sldSz cx="9144000" cy="5143500" type="screen16x9"/>
   <p:notesSz cx="6858000" cy="9144000"/>
@@ -196,6 +200,10 @@
         <p14:section name="Diskussion" id="{468B6378-F3C8-4D40-86A8-5D9C228CEDD4}">
           <p14:sldIdLst>
             <p14:sldId id="266"/>
+            <p14:sldId id="295"/>
+            <p14:sldId id="292"/>
+            <p14:sldId id="293"/>
+            <p14:sldId id="294"/>
           </p14:sldIdLst>
         </p14:section>
         <p14:section name="Quellen" id="{B75A67BE-6CAD-4DEB-B20F-95E5188708BC}">
@@ -320,7 +328,7 @@
           <a:p>
             <a:fld id="{6DB929B3-EDC4-4292-BA5A-2119A16C91BC}" type="datetimeFigureOut">
               <a:rPr lang="de-DE" smtClean="0"/>
-              <a:t>15.06.2022</a:t>
+              <a:t>21.06.2022</a:t>
             </a:fld>
             <a:endParaRPr lang="de-DE"/>
           </a:p>
@@ -10627,8 +10635,8 @@
           </a:p>
         </p:txBody>
       </p:sp>
-      <mc:AlternateContent xmlns:mc="http://schemas.openxmlformats.org/markup-compatibility/2006" xmlns:a14="http://schemas.microsoft.com/office/drawing/2010/main">
-        <mc:Choice Requires="a14">
+      <mc:AlternateContent xmlns:mc="http://schemas.openxmlformats.org/markup-compatibility/2006">
+        <mc:Choice xmlns:a14="http://schemas.microsoft.com/office/drawing/2010/main" Requires="a14">
           <p:sp>
             <p:nvSpPr>
               <p:cNvPr id="8" name="Textfeld 7">
@@ -10644,7 +10652,7 @@
             <p:spPr>
               <a:xfrm>
                 <a:off x="611560" y="1203598"/>
-                <a:ext cx="3672408" cy="2585323"/>
+                <a:ext cx="3672408" cy="2862322"/>
               </a:xfrm>
               <a:prstGeom prst="rect">
                 <a:avLst/>
@@ -10676,6 +10684,21 @@
                     </a:solidFill>
                   </a:rPr>
                   <a:t>Increment</a:t>
+                </a:r>
+                <a:br>
+                  <a:rPr lang="de-DE" b="1" u="sng" dirty="0">
+                    <a:solidFill>
+                      <a:srgbClr val="000000"/>
+                    </a:solidFill>
+                  </a:rPr>
+                </a:br>
+                <a:r>
+                  <a:rPr lang="de-DE" b="1" u="sng" dirty="0" err="1">
+                    <a:solidFill>
+                      <a:srgbClr val="000000"/>
+                    </a:solidFill>
+                  </a:rPr>
+                  <a:t>Counting</a:t>
                 </a:r>
                 <a:r>
                   <a:rPr lang="de-DE" b="1" u="sng" dirty="0">
@@ -10844,7 +10867,7 @@
             </p:txBody>
           </p:sp>
         </mc:Choice>
-        <mc:Fallback xmlns="">
+        <mc:Fallback>
           <p:sp>
             <p:nvSpPr>
               <p:cNvPr id="8" name="Textfeld 7">
@@ -10862,7 +10885,7 @@
             <p:spPr>
               <a:xfrm>
                 <a:off x="611560" y="1203598"/>
-                <a:ext cx="3672408" cy="2585323"/>
+                <a:ext cx="3672408" cy="2862322"/>
               </a:xfrm>
               <a:prstGeom prst="rect">
                 <a:avLst/>
@@ -10870,7 +10893,7 @@
               <a:blipFill>
                 <a:blip r:embed="rId2"/>
                 <a:stretch>
-                  <a:fillRect l="-995" t="-1176" b="-2588"/>
+                  <a:fillRect l="-995" t="-1064" b="-2340"/>
                 </a:stretch>
               </a:blipFill>
             </p:spPr>
@@ -11663,7 +11686,23 @@
                   <a:srgbClr val="0064A8"/>
                 </a:solidFill>
               </a:rPr>
-              <a:t>Ist eine Datenstruktur mit den Eigenschaften des Bloom-Filters möglich, die zudem die Elemente selbst speichert?</a:t>
+              <a:t>Weiterforschen für Anwendungen in Security und </a:t>
+            </a:r>
+            <a:r>
+              <a:rPr lang="de-DE" b="1" dirty="0" err="1">
+                <a:solidFill>
+                  <a:srgbClr val="0064A8"/>
+                </a:solidFill>
+              </a:rPr>
+              <a:t>Ubiquitous</a:t>
+            </a:r>
+            <a:r>
+              <a:rPr lang="de-DE" b="1" dirty="0">
+                <a:solidFill>
+                  <a:srgbClr val="0064A8"/>
+                </a:solidFill>
+              </a:rPr>
+              <a:t> Computing</a:t>
             </a:r>
           </a:p>
           <a:p>
@@ -11815,7 +11854,7 @@
         <p:spPr>
           <a:xfrm>
             <a:off x="611560" y="1203598"/>
-            <a:ext cx="4968552" cy="1754326"/>
+            <a:ext cx="7056784" cy="1477328"/>
           </a:xfrm>
           <a:prstGeom prst="rect">
             <a:avLst/>
@@ -11833,8 +11872,12 @@
               <a:buChar char="•"/>
             </a:pPr>
             <a:r>
-              <a:rPr lang="de-DE" dirty="0"/>
-              <a:t>Prinzipielle Idee</a:t>
+              <a:rPr lang="de-DE" dirty="0">
+                <a:solidFill>
+                  <a:srgbClr val="000000"/>
+                </a:solidFill>
+              </a:rPr>
+              <a:t>Wo sind weitere Einsatzmöglichkeiten?</a:t>
             </a:r>
           </a:p>
           <a:p>
@@ -11842,10 +11885,11 @@
               <a:buFont typeface="Arial" panose="020B0604020202020204" pitchFamily="34" charset="0"/>
               <a:buChar char="•"/>
             </a:pPr>
-            <a:r>
-              <a:rPr lang="de-DE" dirty="0"/>
-              <a:t>Anwendungen</a:t>
-            </a:r>
+            <a:endParaRPr lang="de-DE" dirty="0">
+              <a:solidFill>
+                <a:srgbClr val="000000"/>
+              </a:solidFill>
+            </a:endParaRPr>
           </a:p>
           <a:p>
             <a:pPr marL="285750" indent="-285750">
@@ -11853,8 +11897,12 @@
               <a:buChar char="•"/>
             </a:pPr>
             <a:r>
-              <a:rPr lang="de-DE" dirty="0"/>
-              <a:t>Funktionsweise und Operationen</a:t>
+              <a:rPr lang="de-DE" dirty="0">
+                <a:solidFill>
+                  <a:srgbClr val="000000"/>
+                </a:solidFill>
+              </a:rPr>
+              <a:t>Welche Anpassungen dafür notwendig?</a:t>
             </a:r>
           </a:p>
           <a:p>
@@ -11862,10 +11910,11 @@
               <a:buFont typeface="Arial" panose="020B0604020202020204" pitchFamily="34" charset="0"/>
               <a:buChar char="•"/>
             </a:pPr>
-            <a:r>
-              <a:rPr lang="de-DE" dirty="0"/>
-              <a:t>Varianten</a:t>
-            </a:r>
+            <a:endParaRPr lang="de-DE" dirty="0">
+              <a:solidFill>
+                <a:srgbClr val="000000"/>
+              </a:solidFill>
+            </a:endParaRPr>
           </a:p>
           <a:p>
             <a:pPr marL="285750" indent="-285750">
@@ -11873,22 +11922,130 @@
               <a:buChar char="•"/>
             </a:pPr>
             <a:r>
-              <a:rPr lang="de-DE" dirty="0"/>
-              <a:t>Zusammenfassung</a:t>
-            </a:r>
-          </a:p>
-          <a:p>
-            <a:pPr marL="285750" indent="-285750">
-              <a:buFont typeface="Arial" panose="020B0604020202020204" pitchFamily="34" charset="0"/>
-              <a:buChar char="•"/>
-            </a:pPr>
-            <a:r>
-              <a:rPr lang="de-DE" dirty="0"/>
-              <a:t>Quellen</a:t>
-            </a:r>
-          </a:p>
-        </p:txBody>
-      </p:sp>
+              <a:rPr lang="de-DE" dirty="0">
+                <a:solidFill>
+                  <a:srgbClr val="000000"/>
+                </a:solidFill>
+              </a:rPr>
+              <a:t>Welche Datenstruktur eignet sich in Kombination als Speicher?</a:t>
+            </a:r>
+          </a:p>
+        </p:txBody>
+      </p:sp>
+      <p:pic>
+        <p:nvPicPr>
+          <p:cNvPr id="9" name="Grafik 8">
+            <a:extLst>
+              <a:ext uri="{FF2B5EF4-FFF2-40B4-BE49-F238E27FC236}">
+                <a16:creationId xmlns:a16="http://schemas.microsoft.com/office/drawing/2014/main" id="{BD05548D-8331-7BDF-539D-A0DEDA4BAFFF}"/>
+              </a:ext>
+            </a:extLst>
+          </p:cNvPr>
+          <p:cNvPicPr>
+            <a:picLocks noChangeAspect="1"/>
+          </p:cNvPicPr>
+          <p:nvPr/>
+        </p:nvPicPr>
+        <p:blipFill rotWithShape="1">
+          <a:blip r:embed="rId2">
+            <a:extLst>
+              <a:ext uri="{28A0092B-C50C-407E-A947-70E740481C1C}">
+                <a14:useLocalDpi xmlns:a14="http://schemas.microsoft.com/office/drawing/2010/main" val="0"/>
+              </a:ext>
+              <a:ext uri="{96DAC541-7B7A-43D3-8B79-37D633B846F1}">
+                <asvg:svgBlip xmlns:asvg="http://schemas.microsoft.com/office/drawing/2016/SVG/main" r:embed="rId3"/>
+              </a:ext>
+            </a:extLst>
+          </a:blip>
+          <a:srcRect l="20298" r="10399" b="66800"/>
+          <a:stretch/>
+        </p:blipFill>
+        <p:spPr>
+          <a:xfrm>
+            <a:off x="517863" y="2680926"/>
+            <a:ext cx="2672075" cy="1810505"/>
+          </a:xfrm>
+          <a:prstGeom prst="rect">
+            <a:avLst/>
+          </a:prstGeom>
+        </p:spPr>
+      </p:pic>
+      <p:pic>
+        <p:nvPicPr>
+          <p:cNvPr id="10" name="Grafik 9">
+            <a:extLst>
+              <a:ext uri="{FF2B5EF4-FFF2-40B4-BE49-F238E27FC236}">
+                <a16:creationId xmlns:a16="http://schemas.microsoft.com/office/drawing/2014/main" id="{77AB5CB0-B45E-0E24-2429-2BA816348D0E}"/>
+              </a:ext>
+            </a:extLst>
+          </p:cNvPr>
+          <p:cNvPicPr>
+            <a:picLocks noChangeAspect="1"/>
+          </p:cNvPicPr>
+          <p:nvPr/>
+        </p:nvPicPr>
+        <p:blipFill rotWithShape="1">
+          <a:blip r:embed="rId4">
+            <a:extLst>
+              <a:ext uri="{28A0092B-C50C-407E-A947-70E740481C1C}">
+                <a14:useLocalDpi xmlns:a14="http://schemas.microsoft.com/office/drawing/2010/main" val="0"/>
+              </a:ext>
+              <a:ext uri="{96DAC541-7B7A-43D3-8B79-37D633B846F1}">
+                <asvg:svgBlip xmlns:asvg="http://schemas.microsoft.com/office/drawing/2016/SVG/main" r:embed="rId5"/>
+              </a:ext>
+            </a:extLst>
+          </a:blip>
+          <a:srcRect b="59800"/>
+          <a:stretch/>
+        </p:blipFill>
+        <p:spPr>
+          <a:xfrm>
+            <a:off x="2771800" y="2755360"/>
+            <a:ext cx="3404913" cy="1935944"/>
+          </a:xfrm>
+          <a:prstGeom prst="rect">
+            <a:avLst/>
+          </a:prstGeom>
+        </p:spPr>
+      </p:pic>
+      <p:pic>
+        <p:nvPicPr>
+          <p:cNvPr id="12" name="Grafik 11">
+            <a:extLst>
+              <a:ext uri="{FF2B5EF4-FFF2-40B4-BE49-F238E27FC236}">
+                <a16:creationId xmlns:a16="http://schemas.microsoft.com/office/drawing/2014/main" id="{A90E3BED-37A8-A732-BEB7-D0DC50DDF73D}"/>
+              </a:ext>
+            </a:extLst>
+          </p:cNvPr>
+          <p:cNvPicPr>
+            <a:picLocks noChangeAspect="1"/>
+          </p:cNvPicPr>
+          <p:nvPr/>
+        </p:nvPicPr>
+        <p:blipFill rotWithShape="1">
+          <a:blip r:embed="rId6">
+            <a:extLst>
+              <a:ext uri="{28A0092B-C50C-407E-A947-70E740481C1C}">
+                <a14:useLocalDpi xmlns:a14="http://schemas.microsoft.com/office/drawing/2010/main" val="0"/>
+              </a:ext>
+              <a:ext uri="{96DAC541-7B7A-43D3-8B79-37D633B846F1}">
+                <asvg:svgBlip xmlns:asvg="http://schemas.microsoft.com/office/drawing/2016/SVG/main" r:embed="rId7"/>
+              </a:ext>
+            </a:extLst>
+          </a:blip>
+          <a:srcRect l="22279" t="3499" r="20298" b="71000"/>
+          <a:stretch/>
+        </p:blipFill>
+        <p:spPr>
+          <a:xfrm>
+            <a:off x="5956662" y="2819949"/>
+            <a:ext cx="2642696" cy="1659892"/>
+          </a:xfrm>
+          <a:prstGeom prst="rect">
+            <a:avLst/>
+          </a:prstGeom>
+        </p:spPr>
+      </p:pic>
     </p:spTree>
     <p:extLst>
       <p:ext uri="{BB962C8B-B14F-4D97-AF65-F5344CB8AC3E}">
@@ -11986,9 +12143,13 @@
           <a:lstStyle/>
           <a:p>
             <a:r>
-              <a:rPr lang="de-DE" dirty="0"/>
-              <a:t>Quellen</a:t>
-            </a:r>
+              <a:rPr lang="de-DE" dirty="0" err="1"/>
+              <a:t>Floomfilter</a:t>
+            </a:r>
+            <a:endParaRPr lang="de-DE" dirty="0"/>
+          </a:p>
+          <a:p>
+            <a:endParaRPr lang="de-DE" dirty="0"/>
           </a:p>
         </p:txBody>
       </p:sp>
@@ -12014,253 +12175,48 @@
           </a:p>
         </p:txBody>
       </p:sp>
-      <p:sp>
-        <p:nvSpPr>
-          <p:cNvPr id="11" name="Textfeld 10">
+      <p:pic>
+        <p:nvPicPr>
+          <p:cNvPr id="9" name="Grafik 8">
             <a:extLst>
               <a:ext uri="{FF2B5EF4-FFF2-40B4-BE49-F238E27FC236}">
-                <a16:creationId xmlns:a16="http://schemas.microsoft.com/office/drawing/2014/main" id="{AED7FCD8-3C56-4B11-ADA2-B181B3B96684}"/>
+                <a16:creationId xmlns:a16="http://schemas.microsoft.com/office/drawing/2014/main" id="{E50EBD86-0D44-2C9C-1F98-99F252C2F76A}"/>
               </a:ext>
             </a:extLst>
           </p:cNvPr>
-          <p:cNvSpPr txBox="1"/>
+          <p:cNvPicPr>
+            <a:picLocks noChangeAspect="1"/>
+          </p:cNvPicPr>
           <p:nvPr/>
-        </p:nvSpPr>
+        </p:nvPicPr>
+        <p:blipFill rotWithShape="1">
+          <a:blip r:embed="rId2">
+            <a:extLst>
+              <a:ext uri="{28A0092B-C50C-407E-A947-70E740481C1C}">
+                <a14:useLocalDpi xmlns:a14="http://schemas.microsoft.com/office/drawing/2010/main" val="0"/>
+              </a:ext>
+              <a:ext uri="{96DAC541-7B7A-43D3-8B79-37D633B846F1}">
+                <asvg:svgBlip xmlns:asvg="http://schemas.microsoft.com/office/drawing/2016/SVG/main" r:embed="rId3"/>
+              </a:ext>
+            </a:extLst>
+          </a:blip>
+          <a:srcRect b="59800"/>
+          <a:stretch/>
+        </p:blipFill>
         <p:spPr>
           <a:xfrm>
-            <a:off x="611560" y="1419622"/>
-            <a:ext cx="8064896" cy="2800767"/>
+            <a:off x="816159" y="381876"/>
+            <a:ext cx="8157441" cy="4638106"/>
           </a:xfrm>
           <a:prstGeom prst="rect">
             <a:avLst/>
           </a:prstGeom>
-          <a:noFill/>
         </p:spPr>
-        <p:txBody>
-          <a:bodyPr wrap="square" rtlCol="0">
-            <a:spAutoFit/>
-          </a:bodyPr>
-          <a:lstStyle/>
-          <a:p>
-            <a:pPr marL="285750" indent="-285750">
-              <a:buFont typeface="Arial" panose="020B0604020202020204" pitchFamily="34" charset="0"/>
-              <a:buChar char="•"/>
-            </a:pPr>
-            <a:r>
-              <a:rPr lang="en-US" sz="1600" dirty="0">
-                <a:latin typeface="Segoe UI" panose="020B0502040204020203" pitchFamily="34" charset="0"/>
-              </a:rPr>
-              <a:t>[1] Burton H. Bloom, 1970, Space/time trade-offs in hash coding with allowable errors, </a:t>
-            </a:r>
-            <a:r>
-              <a:rPr lang="en-US" sz="1600" i="1" dirty="0">
-                <a:latin typeface="Segoe UI" panose="020B0502040204020203" pitchFamily="34" charset="0"/>
-              </a:rPr>
-              <a:t>Communications of the ACM</a:t>
-            </a:r>
-            <a:r>
-              <a:rPr lang="en-US" sz="1600" i="0" dirty="0">
-                <a:latin typeface="Segoe UI" panose="020B0502040204020203" pitchFamily="34" charset="0"/>
-              </a:rPr>
-              <a:t> 13, Issue 7, 422–426. DOI: https://doi.org/10.1145/362686.362692.</a:t>
-            </a:r>
-          </a:p>
-          <a:p>
-            <a:pPr marL="285750" indent="-285750">
-              <a:buFont typeface="Arial" panose="020B0604020202020204" pitchFamily="34" charset="0"/>
-              <a:buChar char="•"/>
-            </a:pPr>
-            <a:r>
-              <a:rPr lang="en-US" sz="1600" dirty="0">
-                <a:latin typeface="Segoe UI" panose="020B0502040204020203" pitchFamily="34" charset="0"/>
-              </a:rPr>
-              <a:t>[2] </a:t>
-            </a:r>
-            <a:r>
-              <a:rPr lang="en-US" sz="1600" dirty="0" err="1">
-                <a:latin typeface="Segoe UI" panose="020B0502040204020203" pitchFamily="34" charset="0"/>
-              </a:rPr>
-              <a:t>Saibal</a:t>
-            </a:r>
-            <a:r>
-              <a:rPr lang="en-US" sz="1600" dirty="0">
-                <a:latin typeface="Segoe UI" panose="020B0502040204020203" pitchFamily="34" charset="0"/>
-              </a:rPr>
-              <a:t> Kumar Pal and Puneet Sardana, 2012, BLOOM FILTERS &amp; THEIR APPLICATIONS, </a:t>
-            </a:r>
-            <a:r>
-              <a:rPr lang="en-US" sz="1600" i="1" dirty="0">
-                <a:latin typeface="Segoe UI" panose="020B0502040204020203" pitchFamily="34" charset="0"/>
-              </a:rPr>
-              <a:t>International Journal of Computer Applications Technology and Research</a:t>
-            </a:r>
-            <a:r>
-              <a:rPr lang="en-US" sz="1600" i="0" dirty="0">
-                <a:latin typeface="Segoe UI" panose="020B0502040204020203" pitchFamily="34" charset="0"/>
-              </a:rPr>
-              <a:t> 1, 25–29. </a:t>
-            </a:r>
-            <a:r>
-              <a:rPr lang="en-US" sz="1600" dirty="0">
-                <a:latin typeface="Segoe UI" panose="020B0502040204020203" pitchFamily="34" charset="0"/>
-              </a:rPr>
-              <a:t>DOI: https://doi.org/10.7753/2012.1006</a:t>
-            </a:r>
-            <a:r>
-              <a:rPr lang="en-US" sz="1600" i="0" dirty="0">
-                <a:latin typeface="Segoe UI" panose="020B0502040204020203" pitchFamily="34" charset="0"/>
-              </a:rPr>
-              <a:t> https://ui.adsabs.harvard.edu/</a:t>
-            </a:r>
-            <a:r>
-              <a:rPr lang="en-US" sz="1600" i="0" dirty="0" err="1">
-                <a:latin typeface="Segoe UI" panose="020B0502040204020203" pitchFamily="34" charset="0"/>
-              </a:rPr>
-              <a:t>link_gateway</a:t>
-            </a:r>
-            <a:r>
-              <a:rPr lang="en-US" sz="1600" i="0" dirty="0">
-                <a:latin typeface="Segoe UI" panose="020B0502040204020203" pitchFamily="34" charset="0"/>
-              </a:rPr>
-              <a:t>/2012IJCAT...1...25P/doi:10.7753/2012.1006</a:t>
-            </a:r>
-          </a:p>
-          <a:p>
-            <a:pPr marL="285750" indent="-285750">
-              <a:buFont typeface="Arial" panose="020B0604020202020204" pitchFamily="34" charset="0"/>
-              <a:buChar char="•"/>
-            </a:pPr>
-            <a:r>
-              <a:rPr lang="de-DE" sz="1600" dirty="0">
-                <a:latin typeface="Segoe UI" panose="020B0502040204020203" pitchFamily="34" charset="0"/>
-              </a:rPr>
-              <a:t>[3] </a:t>
-            </a:r>
-            <a:r>
-              <a:rPr lang="de-DE" sz="1600" dirty="0" err="1">
-                <a:latin typeface="Segoe UI" panose="020B0502040204020203" pitchFamily="34" charset="0"/>
-              </a:rPr>
-              <a:t>Ripon</a:t>
-            </a:r>
-            <a:r>
-              <a:rPr lang="de-DE" sz="1600" dirty="0">
-                <a:latin typeface="Segoe UI" panose="020B0502040204020203" pitchFamily="34" charset="0"/>
-              </a:rPr>
-              <a:t> </a:t>
-            </a:r>
-            <a:r>
-              <a:rPr lang="de-DE" sz="1600" dirty="0" err="1">
-                <a:latin typeface="Segoe UI" panose="020B0502040204020203" pitchFamily="34" charset="0"/>
-              </a:rPr>
-              <a:t>Patgiri</a:t>
-            </a:r>
-            <a:r>
-              <a:rPr lang="de-DE" sz="1600" dirty="0">
-                <a:latin typeface="Segoe UI" panose="020B0502040204020203" pitchFamily="34" charset="0"/>
-              </a:rPr>
-              <a:t>, </a:t>
-            </a:r>
-            <a:r>
-              <a:rPr lang="de-DE" sz="1600" dirty="0" err="1">
-                <a:latin typeface="Segoe UI" panose="020B0502040204020203" pitchFamily="34" charset="0"/>
-              </a:rPr>
-              <a:t>Sabuzima</a:t>
-            </a:r>
-            <a:r>
-              <a:rPr lang="de-DE" sz="1600" dirty="0">
-                <a:latin typeface="Segoe UI" panose="020B0502040204020203" pitchFamily="34" charset="0"/>
-              </a:rPr>
-              <a:t> </a:t>
-            </a:r>
-            <a:r>
-              <a:rPr lang="de-DE" sz="1600" dirty="0" err="1">
-                <a:latin typeface="Segoe UI" panose="020B0502040204020203" pitchFamily="34" charset="0"/>
-              </a:rPr>
-              <a:t>Nayak</a:t>
-            </a:r>
-            <a:r>
-              <a:rPr lang="de-DE" sz="1600" dirty="0">
-                <a:latin typeface="Segoe UI" panose="020B0502040204020203" pitchFamily="34" charset="0"/>
-              </a:rPr>
-              <a:t>, and Samir </a:t>
-            </a:r>
-            <a:r>
-              <a:rPr lang="de-DE" sz="1600" dirty="0" err="1">
-                <a:latin typeface="Segoe UI" panose="020B0502040204020203" pitchFamily="34" charset="0"/>
-              </a:rPr>
-              <a:t>Borgohain</a:t>
-            </a:r>
-            <a:r>
-              <a:rPr lang="de-DE" sz="1600" dirty="0">
-                <a:latin typeface="Segoe UI" panose="020B0502040204020203" pitchFamily="34" charset="0"/>
-              </a:rPr>
-              <a:t>. 2018. </a:t>
-            </a:r>
-            <a:r>
-              <a:rPr lang="de-DE" sz="1600" dirty="0" err="1">
-                <a:latin typeface="Segoe UI" panose="020B0502040204020203" pitchFamily="34" charset="0"/>
-              </a:rPr>
-              <a:t>Preventing</a:t>
-            </a:r>
-            <a:r>
-              <a:rPr lang="de-DE" sz="1600" dirty="0">
-                <a:latin typeface="Segoe UI" panose="020B0502040204020203" pitchFamily="34" charset="0"/>
-              </a:rPr>
-              <a:t> DDoS </a:t>
-            </a:r>
-            <a:r>
-              <a:rPr lang="de-DE" sz="1600" dirty="0" err="1">
-                <a:latin typeface="Segoe UI" panose="020B0502040204020203" pitchFamily="34" charset="0"/>
-              </a:rPr>
-              <a:t>using</a:t>
-            </a:r>
-            <a:r>
-              <a:rPr lang="de-DE" sz="1600" dirty="0">
-                <a:latin typeface="Segoe UI" panose="020B0502040204020203" pitchFamily="34" charset="0"/>
-              </a:rPr>
-              <a:t> Bloom Filter: A Survey. </a:t>
-            </a:r>
-            <a:r>
-              <a:rPr lang="de-DE" sz="1600" i="1" dirty="0">
-                <a:latin typeface="Segoe UI" panose="020B0502040204020203" pitchFamily="34" charset="0"/>
-              </a:rPr>
-              <a:t>ICST Transactions on </a:t>
-            </a:r>
-            <a:r>
-              <a:rPr lang="de-DE" sz="1600" i="1" dirty="0" err="1">
-                <a:latin typeface="Segoe UI" panose="020B0502040204020203" pitchFamily="34" charset="0"/>
-              </a:rPr>
-              <a:t>Scalable</a:t>
-            </a:r>
-            <a:r>
-              <a:rPr lang="de-DE" sz="1600" i="1" dirty="0">
-                <a:latin typeface="Segoe UI" panose="020B0502040204020203" pitchFamily="34" charset="0"/>
-              </a:rPr>
-              <a:t> Information Systems</a:t>
-            </a:r>
-            <a:r>
-              <a:rPr lang="de-DE" sz="1600" i="0" dirty="0">
-                <a:latin typeface="Segoe UI" panose="020B0502040204020203" pitchFamily="34" charset="0"/>
-              </a:rPr>
-              <a:t> 5, 19, 155865. DOI: </a:t>
-            </a:r>
-            <a:r>
-              <a:rPr lang="de-DE" sz="1600" i="0" dirty="0">
-                <a:latin typeface="Segoe UI" panose="020B0502040204020203" pitchFamily="34" charset="0"/>
-                <a:hlinkClick r:id="rId2"/>
-              </a:rPr>
-              <a:t>https://doi.org/10.4108%2Feai.19-6-2018.155865</a:t>
-            </a:r>
-            <a:endParaRPr lang="de-DE" sz="1600" i="0" dirty="0">
-              <a:latin typeface="Segoe UI" panose="020B0502040204020203" pitchFamily="34" charset="0"/>
-            </a:endParaRPr>
-          </a:p>
-        </p:txBody>
-      </p:sp>
+      </p:pic>
     </p:spTree>
     <p:extLst>
       <p:ext uri="{BB962C8B-B14F-4D97-AF65-F5344CB8AC3E}">
-        <p14:creationId xmlns:p14="http://schemas.microsoft.com/office/powerpoint/2010/main" val="2718584080"/>
+        <p14:creationId xmlns:p14="http://schemas.microsoft.com/office/powerpoint/2010/main" val="1272520820"/>
       </p:ext>
     </p:extLst>
   </p:cSld>
@@ -12354,9 +12310,16 @@
           <a:lstStyle/>
           <a:p>
             <a:r>
+              <a:rPr lang="de-DE" dirty="0" err="1"/>
+              <a:t>Counting</a:t>
+            </a:r>
+            <a:r>
               <a:rPr lang="de-DE" dirty="0"/>
-              <a:t>Quellen</a:t>
-            </a:r>
+              <a:t> BF</a:t>
+            </a:r>
+          </a:p>
+          <a:p>
+            <a:endParaRPr lang="de-DE" dirty="0"/>
           </a:p>
         </p:txBody>
       </p:sp>
@@ -12382,314 +12345,48 @@
           </a:p>
         </p:txBody>
       </p:sp>
-      <p:sp>
-        <p:nvSpPr>
-          <p:cNvPr id="11" name="Textfeld 10">
+      <p:pic>
+        <p:nvPicPr>
+          <p:cNvPr id="5" name="Grafik 4">
             <a:extLst>
               <a:ext uri="{FF2B5EF4-FFF2-40B4-BE49-F238E27FC236}">
-                <a16:creationId xmlns:a16="http://schemas.microsoft.com/office/drawing/2014/main" id="{AED7FCD8-3C56-4B11-ADA2-B181B3B96684}"/>
+                <a16:creationId xmlns:a16="http://schemas.microsoft.com/office/drawing/2014/main" id="{A3C3CBBE-E493-5801-EDE4-58B188005AEF}"/>
               </a:ext>
             </a:extLst>
           </p:cNvPr>
-          <p:cNvSpPr txBox="1"/>
+          <p:cNvPicPr>
+            <a:picLocks noChangeAspect="1"/>
+          </p:cNvPicPr>
           <p:nvPr/>
-        </p:nvSpPr>
+        </p:nvPicPr>
+        <p:blipFill rotWithShape="1">
+          <a:blip r:embed="rId2">
+            <a:extLst>
+              <a:ext uri="{28A0092B-C50C-407E-A947-70E740481C1C}">
+                <a14:useLocalDpi xmlns:a14="http://schemas.microsoft.com/office/drawing/2010/main" val="0"/>
+              </a:ext>
+              <a:ext uri="{96DAC541-7B7A-43D3-8B79-37D633B846F1}">
+                <asvg:svgBlip xmlns:asvg="http://schemas.microsoft.com/office/drawing/2016/SVG/main" r:embed="rId3"/>
+              </a:ext>
+            </a:extLst>
+          </a:blip>
+          <a:srcRect l="24925" b="66800"/>
+          <a:stretch/>
+        </p:blipFill>
         <p:spPr>
           <a:xfrm>
-            <a:off x="611560" y="1419622"/>
-            <a:ext cx="8064896" cy="2800767"/>
+            <a:off x="1835696" y="149133"/>
+            <a:ext cx="8064896" cy="5044363"/>
           </a:xfrm>
           <a:prstGeom prst="rect">
             <a:avLst/>
           </a:prstGeom>
-          <a:noFill/>
         </p:spPr>
-        <p:txBody>
-          <a:bodyPr wrap="square" rtlCol="0">
-            <a:spAutoFit/>
-          </a:bodyPr>
-          <a:lstStyle/>
-          <a:p>
-            <a:pPr marL="285750" indent="-285750">
-              <a:buFont typeface="Arial" panose="020B0604020202020204" pitchFamily="34" charset="0"/>
-              <a:buChar char="•"/>
-            </a:pPr>
-            <a:r>
-              <a:rPr lang="de-DE" sz="1600" dirty="0">
-                <a:latin typeface="Segoe UI" panose="020B0502040204020203" pitchFamily="34" charset="0"/>
-              </a:rPr>
-              <a:t>[4] </a:t>
-            </a:r>
-            <a:r>
-              <a:rPr lang="en-US" sz="1600" dirty="0"/>
-              <a:t>Bloom Filter. </a:t>
-            </a:r>
-            <a:r>
-              <a:rPr lang="en-US" sz="1600" i="1" dirty="0"/>
-              <a:t>Brilliant.org</a:t>
-            </a:r>
-            <a:r>
-              <a:rPr lang="en-US" sz="1600" dirty="0"/>
-              <a:t>. Retrieved 18:02, May 12, 2022, from </a:t>
-            </a:r>
-            <a:r>
-              <a:rPr lang="en-US" sz="1600" dirty="0">
-                <a:hlinkClick r:id="rId2"/>
-              </a:rPr>
-              <a:t>https://brilliant.org/wiki/bloom-filter/</a:t>
-            </a:r>
-            <a:endParaRPr lang="en-US" sz="1600" dirty="0"/>
-          </a:p>
-          <a:p>
-            <a:pPr marL="285750" indent="-285750">
-              <a:buFont typeface="Arial" panose="020B0604020202020204" pitchFamily="34" charset="0"/>
-              <a:buChar char="•"/>
-            </a:pPr>
-            <a:r>
-              <a:rPr lang="en-US" sz="1600" i="0" dirty="0">
-                <a:latin typeface="Segoe UI" panose="020B0502040204020203" pitchFamily="34" charset="0"/>
-              </a:rPr>
-              <a:t>[5] </a:t>
-            </a:r>
-            <a:r>
-              <a:rPr lang="en-US" sz="1600" dirty="0">
-                <a:latin typeface="Segoe UI" panose="020B0502040204020203" pitchFamily="34" charset="0"/>
-              </a:rPr>
-              <a:t>Fabio </a:t>
-            </a:r>
-            <a:r>
-              <a:rPr lang="en-US" sz="1600" dirty="0" err="1">
-                <a:latin typeface="Segoe UI" panose="020B0502040204020203" pitchFamily="34" charset="0"/>
-              </a:rPr>
-              <a:t>Grandi</a:t>
-            </a:r>
-            <a:r>
-              <a:rPr lang="en-US" sz="1600" dirty="0">
-                <a:latin typeface="Segoe UI" panose="020B0502040204020203" pitchFamily="34" charset="0"/>
-              </a:rPr>
-              <a:t>. 2018. On the analysis of Bloom filters. </a:t>
-            </a:r>
-            <a:r>
-              <a:rPr lang="en-US" sz="1600" i="1" dirty="0">
-                <a:latin typeface="Segoe UI" panose="020B0502040204020203" pitchFamily="34" charset="0"/>
-              </a:rPr>
-              <a:t>Information Processing Letters</a:t>
-            </a:r>
-            <a:r>
-              <a:rPr lang="en-US" sz="1600" i="0" dirty="0">
-                <a:latin typeface="Segoe UI" panose="020B0502040204020203" pitchFamily="34" charset="0"/>
-              </a:rPr>
-              <a:t> 129, 35–39. DOI: </a:t>
-            </a:r>
-            <a:r>
-              <a:rPr lang="en-US" sz="1600" i="0" dirty="0">
-                <a:latin typeface="Segoe UI" panose="020B0502040204020203" pitchFamily="34" charset="0"/>
-                <a:hlinkClick r:id="rId3"/>
-              </a:rPr>
-              <a:t>https://doi.org/10.1016/j.ipl.2017.09.004</a:t>
-            </a:r>
-            <a:endParaRPr lang="en-US" sz="1600" i="0" dirty="0">
-              <a:latin typeface="Segoe UI" panose="020B0502040204020203" pitchFamily="34" charset="0"/>
-            </a:endParaRPr>
-          </a:p>
-          <a:p>
-            <a:pPr marL="285750" indent="-285750">
-              <a:buFont typeface="Arial" panose="020B0604020202020204" pitchFamily="34" charset="0"/>
-              <a:buChar char="•"/>
-            </a:pPr>
-            <a:r>
-              <a:rPr lang="en-US" sz="1600" dirty="0">
-                <a:latin typeface="Segoe UI" panose="020B0502040204020203" pitchFamily="34" charset="0"/>
-              </a:rPr>
-              <a:t>[6] Nayak, S. and </a:t>
-            </a:r>
-            <a:r>
-              <a:rPr lang="en-US" sz="1600" dirty="0" err="1">
-                <a:latin typeface="Segoe UI" panose="020B0502040204020203" pitchFamily="34" charset="0"/>
-              </a:rPr>
-              <a:t>Patgiri</a:t>
-            </a:r>
-            <a:r>
-              <a:rPr lang="en-US" sz="1600" dirty="0">
-                <a:latin typeface="Segoe UI" panose="020B0502040204020203" pitchFamily="34" charset="0"/>
-              </a:rPr>
-              <a:t>, R. 2021. </a:t>
-            </a:r>
-            <a:r>
-              <a:rPr lang="en-US" sz="1600" i="1" dirty="0" err="1">
-                <a:latin typeface="Segoe UI" panose="020B0502040204020203" pitchFamily="34" charset="0"/>
-              </a:rPr>
-              <a:t>RobustBF</a:t>
-            </a:r>
-            <a:r>
-              <a:rPr lang="en-US" sz="1600" i="1" dirty="0">
-                <a:latin typeface="Segoe UI" panose="020B0502040204020203" pitchFamily="34" charset="0"/>
-              </a:rPr>
-              <a:t>: A High Accuracy and Memory Efficient 2D Bloom Filter</a:t>
-            </a:r>
-            <a:r>
-              <a:rPr lang="en-US" sz="1600" i="0" dirty="0">
-                <a:latin typeface="Segoe UI" panose="020B0502040204020203" pitchFamily="34" charset="0"/>
-              </a:rPr>
-              <a:t>. DOI: https://doi.org/10.48550/arxiv.2106.04365</a:t>
-            </a:r>
-          </a:p>
-          <a:p>
-            <a:pPr marL="285750" indent="-285750">
-              <a:buFont typeface="Arial" panose="020B0604020202020204" pitchFamily="34" charset="0"/>
-              <a:buChar char="•"/>
-            </a:pPr>
-            <a:r>
-              <a:rPr lang="en-US" sz="1600" dirty="0">
-                <a:latin typeface="Segoe UI" panose="020B0502040204020203" pitchFamily="34" charset="0"/>
-              </a:rPr>
-              <a:t>[7] </a:t>
-            </a:r>
-            <a:r>
-              <a:rPr lang="de-DE" sz="1600" dirty="0">
-                <a:latin typeface="Segoe UI" panose="020B0502040204020203" pitchFamily="34" charset="0"/>
-              </a:rPr>
-              <a:t>Fan, L., Cao, P., Almeida, J., and Broder, A. Z. 1998. Summary Cache: A </a:t>
-            </a:r>
-            <a:r>
-              <a:rPr lang="de-DE" sz="1600" dirty="0" err="1">
-                <a:latin typeface="Segoe UI" panose="020B0502040204020203" pitchFamily="34" charset="0"/>
-              </a:rPr>
-              <a:t>Scalable</a:t>
-            </a:r>
-            <a:r>
-              <a:rPr lang="de-DE" sz="1600" dirty="0">
-                <a:latin typeface="Segoe UI" panose="020B0502040204020203" pitchFamily="34" charset="0"/>
-              </a:rPr>
-              <a:t> Wide-Area Web Cache Sharing Protocol. In </a:t>
-            </a:r>
-            <a:r>
-              <a:rPr lang="de-DE" sz="1600" i="1" dirty="0">
-                <a:latin typeface="Segoe UI" panose="020B0502040204020203" pitchFamily="34" charset="0"/>
-              </a:rPr>
-              <a:t>Proceedings </a:t>
-            </a:r>
-            <a:r>
-              <a:rPr lang="de-DE" sz="1600" i="1" dirty="0" err="1">
-                <a:latin typeface="Segoe UI" panose="020B0502040204020203" pitchFamily="34" charset="0"/>
-              </a:rPr>
-              <a:t>of</a:t>
-            </a:r>
-            <a:r>
-              <a:rPr lang="de-DE" sz="1600" i="1" dirty="0">
-                <a:latin typeface="Segoe UI" panose="020B0502040204020203" pitchFamily="34" charset="0"/>
-              </a:rPr>
-              <a:t> </a:t>
-            </a:r>
-            <a:r>
-              <a:rPr lang="de-DE" sz="1600" i="1" dirty="0" err="1">
-                <a:latin typeface="Segoe UI" panose="020B0502040204020203" pitchFamily="34" charset="0"/>
-              </a:rPr>
-              <a:t>the</a:t>
-            </a:r>
-            <a:r>
-              <a:rPr lang="de-DE" sz="1600" i="1" dirty="0">
-                <a:latin typeface="Segoe UI" panose="020B0502040204020203" pitchFamily="34" charset="0"/>
-              </a:rPr>
-              <a:t> ACM SIGCOMM ’98 Conference on </a:t>
-            </a:r>
-            <a:r>
-              <a:rPr lang="de-DE" sz="1600" i="1" dirty="0" err="1">
-                <a:latin typeface="Segoe UI" panose="020B0502040204020203" pitchFamily="34" charset="0"/>
-              </a:rPr>
-              <a:t>Applications</a:t>
-            </a:r>
-            <a:r>
-              <a:rPr lang="de-DE" sz="1600" i="1" dirty="0">
-                <a:latin typeface="Segoe UI" panose="020B0502040204020203" pitchFamily="34" charset="0"/>
-              </a:rPr>
-              <a:t>, Technologies, </a:t>
-            </a:r>
-            <a:r>
-              <a:rPr lang="de-DE" sz="1600" i="1" dirty="0" err="1">
-                <a:latin typeface="Segoe UI" panose="020B0502040204020203" pitchFamily="34" charset="0"/>
-              </a:rPr>
-              <a:t>Architectures</a:t>
-            </a:r>
-            <a:r>
-              <a:rPr lang="de-DE" sz="1600" i="1" dirty="0">
-                <a:latin typeface="Segoe UI" panose="020B0502040204020203" pitchFamily="34" charset="0"/>
-              </a:rPr>
-              <a:t>, and </a:t>
-            </a:r>
-            <a:r>
-              <a:rPr lang="de-DE" sz="1600" i="1" dirty="0" err="1">
-                <a:latin typeface="Segoe UI" panose="020B0502040204020203" pitchFamily="34" charset="0"/>
-              </a:rPr>
-              <a:t>Protocols</a:t>
-            </a:r>
-            <a:r>
-              <a:rPr lang="de-DE" sz="1600" i="1" dirty="0">
-                <a:latin typeface="Segoe UI" panose="020B0502040204020203" pitchFamily="34" charset="0"/>
-              </a:rPr>
-              <a:t> </a:t>
-            </a:r>
-            <a:r>
-              <a:rPr lang="de-DE" sz="1600" i="1" dirty="0" err="1">
-                <a:latin typeface="Segoe UI" panose="020B0502040204020203" pitchFamily="34" charset="0"/>
-              </a:rPr>
-              <a:t>for</a:t>
-            </a:r>
-            <a:r>
-              <a:rPr lang="de-DE" sz="1600" i="1" dirty="0">
-                <a:latin typeface="Segoe UI" panose="020B0502040204020203" pitchFamily="34" charset="0"/>
-              </a:rPr>
-              <a:t> Computer Communication</a:t>
-            </a:r>
-            <a:r>
-              <a:rPr lang="de-DE" sz="1600" i="0" dirty="0">
-                <a:latin typeface="Segoe UI" panose="020B0502040204020203" pitchFamily="34" charset="0"/>
-              </a:rPr>
-              <a:t>. SIGCOMM ’98. </a:t>
-            </a:r>
-            <a:r>
-              <a:rPr lang="de-DE" sz="1600" i="0" dirty="0" err="1">
-                <a:latin typeface="Segoe UI" panose="020B0502040204020203" pitchFamily="34" charset="0"/>
-              </a:rPr>
-              <a:t>Association</a:t>
-            </a:r>
-            <a:r>
-              <a:rPr lang="de-DE" sz="1600" i="0" dirty="0">
-                <a:latin typeface="Segoe UI" panose="020B0502040204020203" pitchFamily="34" charset="0"/>
-              </a:rPr>
-              <a:t> </a:t>
-            </a:r>
-            <a:r>
-              <a:rPr lang="de-DE" sz="1600" i="0" dirty="0" err="1">
-                <a:latin typeface="Segoe UI" panose="020B0502040204020203" pitchFamily="34" charset="0"/>
-              </a:rPr>
-              <a:t>for</a:t>
-            </a:r>
-            <a:r>
-              <a:rPr lang="de-DE" sz="1600" i="0" dirty="0">
-                <a:latin typeface="Segoe UI" panose="020B0502040204020203" pitchFamily="34" charset="0"/>
-              </a:rPr>
-              <a:t> Computing Machinery, New York, NY, USA, 254–265. DOI:</a:t>
-            </a:r>
-            <a:r>
-              <a:rPr lang="en-US" sz="1600" i="0" dirty="0">
-                <a:latin typeface="Segoe UI" panose="020B0502040204020203" pitchFamily="34" charset="0"/>
-              </a:rPr>
-              <a:t> https://doi.org/</a:t>
-            </a:r>
-            <a:r>
-              <a:rPr lang="de-DE" sz="1600" i="0" dirty="0">
-                <a:latin typeface="Segoe UI" panose="020B0502040204020203" pitchFamily="34" charset="0"/>
-              </a:rPr>
-              <a:t>10.1145/285237.285287</a:t>
-            </a:r>
-          </a:p>
-        </p:txBody>
-      </p:sp>
+      </p:pic>
     </p:spTree>
     <p:extLst>
       <p:ext uri="{BB962C8B-B14F-4D97-AF65-F5344CB8AC3E}">
-        <p14:creationId xmlns:p14="http://schemas.microsoft.com/office/powerpoint/2010/main" val="1092689422"/>
+        <p14:creationId xmlns:p14="http://schemas.microsoft.com/office/powerpoint/2010/main" val="744574050"/>
       </p:ext>
     </p:extLst>
   </p:cSld>
@@ -13036,8 +12733,11 @@
           <a:p>
             <a:r>
               <a:rPr lang="de-DE" dirty="0"/>
-              <a:t>Quellen</a:t>
-            </a:r>
+              <a:t>VIC BF</a:t>
+            </a:r>
+          </a:p>
+          <a:p>
+            <a:endParaRPr lang="de-DE" dirty="0"/>
           </a:p>
         </p:txBody>
       </p:sp>
@@ -13063,296 +12763,48 @@
           </a:p>
         </p:txBody>
       </p:sp>
-      <p:sp>
-        <p:nvSpPr>
-          <p:cNvPr id="11" name="Textfeld 10">
+      <p:pic>
+        <p:nvPicPr>
+          <p:cNvPr id="10" name="Grafik 9">
             <a:extLst>
               <a:ext uri="{FF2B5EF4-FFF2-40B4-BE49-F238E27FC236}">
-                <a16:creationId xmlns:a16="http://schemas.microsoft.com/office/drawing/2014/main" id="{AED7FCD8-3C56-4B11-ADA2-B181B3B96684}"/>
+                <a16:creationId xmlns:a16="http://schemas.microsoft.com/office/drawing/2014/main" id="{FCE469E1-4657-6866-856C-EDDDEEF7D097}"/>
               </a:ext>
             </a:extLst>
           </p:cNvPr>
-          <p:cNvSpPr txBox="1"/>
+          <p:cNvPicPr>
+            <a:picLocks noChangeAspect="1"/>
+          </p:cNvPicPr>
           <p:nvPr/>
-        </p:nvSpPr>
+        </p:nvPicPr>
+        <p:blipFill rotWithShape="1">
+          <a:blip r:embed="rId2">
+            <a:extLst>
+              <a:ext uri="{28A0092B-C50C-407E-A947-70E740481C1C}">
+                <a14:useLocalDpi xmlns:a14="http://schemas.microsoft.com/office/drawing/2010/main" val="0"/>
+              </a:ext>
+              <a:ext uri="{96DAC541-7B7A-43D3-8B79-37D633B846F1}">
+                <asvg:svgBlip xmlns:asvg="http://schemas.microsoft.com/office/drawing/2016/SVG/main" r:embed="rId3"/>
+              </a:ext>
+            </a:extLst>
+          </a:blip>
+          <a:srcRect l="22279" t="3499" r="20298" b="71000"/>
+          <a:stretch/>
+        </p:blipFill>
         <p:spPr>
           <a:xfrm>
-            <a:off x="611560" y="1419622"/>
-            <a:ext cx="8064896" cy="2554545"/>
+            <a:off x="1331640" y="627534"/>
+            <a:ext cx="6569200" cy="4126151"/>
           </a:xfrm>
           <a:prstGeom prst="rect">
             <a:avLst/>
           </a:prstGeom>
-          <a:noFill/>
         </p:spPr>
-        <p:txBody>
-          <a:bodyPr wrap="square" rtlCol="0">
-            <a:spAutoFit/>
-          </a:bodyPr>
-          <a:lstStyle/>
-          <a:p>
-            <a:pPr marL="285750" indent="-285750">
-              <a:buFont typeface="Arial" panose="020B0604020202020204" pitchFamily="34" charset="0"/>
-              <a:buChar char="•"/>
-            </a:pPr>
-            <a:r>
-              <a:rPr lang="en-US" sz="1600" dirty="0">
-                <a:latin typeface="Segoe UI" panose="020B0502040204020203" pitchFamily="34" charset="0"/>
-              </a:rPr>
-              <a:t>[8] </a:t>
-            </a:r>
-            <a:r>
-              <a:rPr lang="de-DE" sz="1600" dirty="0">
-                <a:latin typeface="Segoe UI" panose="020B0502040204020203" pitchFamily="34" charset="0"/>
-              </a:rPr>
-              <a:t>Rottenstreich Ori, </a:t>
-            </a:r>
-            <a:r>
-              <a:rPr lang="de-DE" sz="1600" dirty="0" err="1">
-                <a:latin typeface="Segoe UI" panose="020B0502040204020203" pitchFamily="34" charset="0"/>
-              </a:rPr>
-              <a:t>Kanizo</a:t>
-            </a:r>
-            <a:r>
-              <a:rPr lang="de-DE" sz="1600" dirty="0">
-                <a:latin typeface="Segoe UI" panose="020B0502040204020203" pitchFamily="34" charset="0"/>
-              </a:rPr>
-              <a:t> Yossi, and </a:t>
-            </a:r>
-            <a:r>
-              <a:rPr lang="de-DE" sz="1600" dirty="0" err="1">
-                <a:latin typeface="Segoe UI" panose="020B0502040204020203" pitchFamily="34" charset="0"/>
-              </a:rPr>
-              <a:t>Keslassy</a:t>
-            </a:r>
-            <a:r>
-              <a:rPr lang="de-DE" sz="1600" dirty="0">
-                <a:latin typeface="Segoe UI" panose="020B0502040204020203" pitchFamily="34" charset="0"/>
-              </a:rPr>
-              <a:t> Isaac. 2014. The Variable-</a:t>
-            </a:r>
-            <a:r>
-              <a:rPr lang="de-DE" sz="1600" dirty="0" err="1">
-                <a:latin typeface="Segoe UI" panose="020B0502040204020203" pitchFamily="34" charset="0"/>
-              </a:rPr>
-              <a:t>Increment</a:t>
-            </a:r>
-            <a:r>
-              <a:rPr lang="de-DE" sz="1600" dirty="0">
-                <a:latin typeface="Segoe UI" panose="020B0502040204020203" pitchFamily="34" charset="0"/>
-              </a:rPr>
-              <a:t> </a:t>
-            </a:r>
-            <a:r>
-              <a:rPr lang="de-DE" sz="1600" dirty="0" err="1">
-                <a:latin typeface="Segoe UI" panose="020B0502040204020203" pitchFamily="34" charset="0"/>
-              </a:rPr>
-              <a:t>Counting</a:t>
-            </a:r>
-            <a:r>
-              <a:rPr lang="de-DE" sz="1600" dirty="0">
-                <a:latin typeface="Segoe UI" panose="020B0502040204020203" pitchFamily="34" charset="0"/>
-              </a:rPr>
-              <a:t> Bloom Filter. </a:t>
-            </a:r>
-            <a:r>
-              <a:rPr lang="de-DE" sz="1600" i="1" dirty="0">
-                <a:latin typeface="Segoe UI" panose="020B0502040204020203" pitchFamily="34" charset="0"/>
-              </a:rPr>
-              <a:t>IEEE/ACM Trans. Networking</a:t>
-            </a:r>
-            <a:r>
-              <a:rPr lang="de-DE" sz="1600" i="0" dirty="0">
-                <a:latin typeface="Segoe UI" panose="020B0502040204020203" pitchFamily="34" charset="0"/>
-              </a:rPr>
-              <a:t> 22, 4, 1092–1105. DOI: </a:t>
-            </a:r>
-            <a:r>
-              <a:rPr lang="de-DE" sz="1600" i="0" dirty="0">
-                <a:latin typeface="Segoe UI" panose="020B0502040204020203" pitchFamily="34" charset="0"/>
-                <a:hlinkClick r:id="rId2"/>
-              </a:rPr>
-              <a:t>https://doi.org/</a:t>
-            </a:r>
-            <a:r>
-              <a:rPr lang="de-DE" sz="1600" dirty="0">
-                <a:hlinkClick r:id="rId2"/>
-              </a:rPr>
-              <a:t>10.1109/TNET.2013.2272604</a:t>
-            </a:r>
-            <a:endParaRPr lang="de-DE" sz="1600" dirty="0"/>
-          </a:p>
-          <a:p>
-            <a:pPr marL="285750" indent="-285750">
-              <a:buFont typeface="Arial" panose="020B0604020202020204" pitchFamily="34" charset="0"/>
-              <a:buChar char="•"/>
-            </a:pPr>
-            <a:r>
-              <a:rPr lang="en-US" sz="1600" dirty="0">
-                <a:latin typeface="Segoe UI" panose="020B0502040204020203" pitchFamily="34" charset="0"/>
-              </a:rPr>
-              <a:t>[9] Rothenberg, C., </a:t>
-            </a:r>
-            <a:r>
-              <a:rPr lang="en-US" sz="1600" dirty="0" err="1">
-                <a:latin typeface="Segoe UI" panose="020B0502040204020203" pitchFamily="34" charset="0"/>
-              </a:rPr>
-              <a:t>Macapuna</a:t>
-            </a:r>
-            <a:r>
-              <a:rPr lang="en-US" sz="1600" dirty="0">
-                <a:latin typeface="Segoe UI" panose="020B0502040204020203" pitchFamily="34" charset="0"/>
-              </a:rPr>
-              <a:t>, C., Verdi, F., and </a:t>
-            </a:r>
-            <a:r>
-              <a:rPr lang="en-US" sz="1600" dirty="0" err="1">
-                <a:latin typeface="Segoe UI" panose="020B0502040204020203" pitchFamily="34" charset="0"/>
-              </a:rPr>
-              <a:t>Magalhaes</a:t>
-            </a:r>
-            <a:r>
-              <a:rPr lang="en-US" sz="1600" dirty="0">
-                <a:latin typeface="Segoe UI" panose="020B0502040204020203" pitchFamily="34" charset="0"/>
-              </a:rPr>
-              <a:t>, M. 2010. The </a:t>
-            </a:r>
-            <a:r>
-              <a:rPr lang="en-US" sz="1600" dirty="0" err="1">
-                <a:latin typeface="Segoe UI" panose="020B0502040204020203" pitchFamily="34" charset="0"/>
-              </a:rPr>
-              <a:t>deletable</a:t>
-            </a:r>
-            <a:r>
-              <a:rPr lang="en-US" sz="1600" dirty="0">
-                <a:latin typeface="Segoe UI" panose="020B0502040204020203" pitchFamily="34" charset="0"/>
-              </a:rPr>
-              <a:t> Bloom filter: a new member of the Bloom family. </a:t>
-            </a:r>
-            <a:r>
-              <a:rPr lang="en-US" sz="1600" i="1" dirty="0">
-                <a:latin typeface="Segoe UI" panose="020B0502040204020203" pitchFamily="34" charset="0"/>
-              </a:rPr>
-              <a:t>IEEE </a:t>
-            </a:r>
-            <a:r>
-              <a:rPr lang="en-US" sz="1600" i="1" dirty="0" err="1">
-                <a:latin typeface="Segoe UI" panose="020B0502040204020203" pitchFamily="34" charset="0"/>
-              </a:rPr>
-              <a:t>Commun</a:t>
-            </a:r>
-            <a:r>
-              <a:rPr lang="en-US" sz="1600" i="1" dirty="0">
-                <a:latin typeface="Segoe UI" panose="020B0502040204020203" pitchFamily="34" charset="0"/>
-              </a:rPr>
-              <a:t>. Lett.</a:t>
-            </a:r>
-            <a:r>
-              <a:rPr lang="en-US" sz="1600" i="0" dirty="0">
-                <a:latin typeface="Segoe UI" panose="020B0502040204020203" pitchFamily="34" charset="0"/>
-              </a:rPr>
-              <a:t> 14, 6, 557–559. DOI: </a:t>
-            </a:r>
-            <a:r>
-              <a:rPr lang="en-US" sz="1600" i="0" dirty="0">
-                <a:latin typeface="Segoe UI" panose="020B0502040204020203" pitchFamily="34" charset="0"/>
-                <a:hlinkClick r:id="rId3"/>
-              </a:rPr>
-              <a:t>https://</a:t>
-            </a:r>
-            <a:r>
-              <a:rPr lang="de-DE" sz="1600" i="0" dirty="0">
-                <a:latin typeface="Segoe UI" panose="020B0502040204020203" pitchFamily="34" charset="0"/>
-                <a:hlinkClick r:id="rId3"/>
-              </a:rPr>
-              <a:t>doi.org/</a:t>
-            </a:r>
-            <a:r>
-              <a:rPr lang="de-DE" sz="1600" dirty="0">
-                <a:hlinkClick r:id="rId3"/>
-              </a:rPr>
-              <a:t>10.1109/LCOMM.2010.06.100344</a:t>
-            </a:r>
-            <a:endParaRPr lang="de-DE" sz="1600" dirty="0"/>
-          </a:p>
-          <a:p>
-            <a:pPr marL="285750" indent="-285750">
-              <a:buFont typeface="Arial" panose="020B0604020202020204" pitchFamily="34" charset="0"/>
-              <a:buChar char="•"/>
-            </a:pPr>
-            <a:r>
-              <a:rPr lang="de-DE" sz="1600" dirty="0">
-                <a:latin typeface="Segoe UI" panose="020B0502040204020203" pitchFamily="34" charset="0"/>
-              </a:rPr>
-              <a:t>[10] </a:t>
-            </a:r>
-            <a:r>
-              <a:rPr lang="en-US" sz="1600" dirty="0">
-                <a:latin typeface="Segoe UI" panose="020B0502040204020203" pitchFamily="34" charset="0"/>
-              </a:rPr>
-              <a:t>Rhea S.C. and </a:t>
-            </a:r>
-            <a:r>
-              <a:rPr lang="en-US" sz="1600" dirty="0" err="1">
-                <a:latin typeface="Segoe UI" panose="020B0502040204020203" pitchFamily="34" charset="0"/>
-              </a:rPr>
-              <a:t>Kubiatowicz</a:t>
-            </a:r>
-            <a:r>
-              <a:rPr lang="en-US" sz="1600" dirty="0">
-                <a:latin typeface="Segoe UI" panose="020B0502040204020203" pitchFamily="34" charset="0"/>
-              </a:rPr>
-              <a:t> J. 2002. Probabilistic location and routing. In </a:t>
-            </a:r>
-            <a:r>
-              <a:rPr lang="en-US" sz="1600" i="1" dirty="0" err="1">
-                <a:latin typeface="Segoe UI" panose="020B0502040204020203" pitchFamily="34" charset="0"/>
-              </a:rPr>
-              <a:t>Proceedings.Twenty</a:t>
-            </a:r>
-            <a:r>
-              <a:rPr lang="en-US" sz="1600" i="1" dirty="0">
-                <a:latin typeface="Segoe UI" panose="020B0502040204020203" pitchFamily="34" charset="0"/>
-              </a:rPr>
-              <a:t>-First Annual Joint Conference of the IEEE Computer and Communications Societies</a:t>
-            </a:r>
-            <a:r>
-              <a:rPr lang="en-US" sz="1600" i="0" dirty="0">
-                <a:latin typeface="Segoe UI" panose="020B0502040204020203" pitchFamily="34" charset="0"/>
-              </a:rPr>
-              <a:t>, 1248-1257 vol.3. DOI: </a:t>
-            </a:r>
-            <a:r>
-              <a:rPr lang="en-US" sz="1600" dirty="0">
-                <a:latin typeface="Segoe UI" panose="020B0502040204020203" pitchFamily="34" charset="0"/>
-                <a:hlinkClick r:id="rId4"/>
-              </a:rPr>
-              <a:t>https://</a:t>
-            </a:r>
-            <a:r>
-              <a:rPr lang="de-DE" sz="1600" dirty="0">
-                <a:latin typeface="Segoe UI" panose="020B0502040204020203" pitchFamily="34" charset="0"/>
-                <a:hlinkClick r:id="rId4"/>
-              </a:rPr>
-              <a:t>doi.org/</a:t>
-            </a:r>
-            <a:r>
-              <a:rPr lang="en-US" sz="1600" i="0" dirty="0">
-                <a:latin typeface="Segoe UI" panose="020B0502040204020203" pitchFamily="34" charset="0"/>
-                <a:hlinkClick r:id="rId4"/>
-              </a:rPr>
-              <a:t>10.1109/INFCOM.2002.1019375</a:t>
-            </a:r>
-            <a:endParaRPr lang="en-US" sz="1600" i="0" dirty="0">
-              <a:latin typeface="Segoe UI" panose="020B0502040204020203" pitchFamily="34" charset="0"/>
-            </a:endParaRPr>
-          </a:p>
-        </p:txBody>
-      </p:sp>
+      </p:pic>
     </p:spTree>
     <p:extLst>
       <p:ext uri="{BB962C8B-B14F-4D97-AF65-F5344CB8AC3E}">
-        <p14:creationId xmlns:p14="http://schemas.microsoft.com/office/powerpoint/2010/main" val="2790701121"/>
+        <p14:creationId xmlns:p14="http://schemas.microsoft.com/office/powerpoint/2010/main" val="2405430898"/>
       </p:ext>
     </p:extLst>
   </p:cSld>
@@ -13446,9 +12898,16 @@
           <a:lstStyle/>
           <a:p>
             <a:r>
+              <a:rPr lang="de-DE" dirty="0" err="1"/>
+              <a:t>Deletable</a:t>
+            </a:r>
+            <a:r>
               <a:rPr lang="de-DE" dirty="0"/>
-              <a:t>Quellen</a:t>
-            </a:r>
+              <a:t> BF</a:t>
+            </a:r>
+          </a:p>
+          <a:p>
+            <a:endParaRPr lang="de-DE" dirty="0"/>
           </a:p>
         </p:txBody>
       </p:sp>
@@ -13474,486 +12933,48 @@
           </a:p>
         </p:txBody>
       </p:sp>
-      <p:sp>
-        <p:nvSpPr>
-          <p:cNvPr id="11" name="Textfeld 10">
+      <p:pic>
+        <p:nvPicPr>
+          <p:cNvPr id="5" name="Grafik 4">
             <a:extLst>
               <a:ext uri="{FF2B5EF4-FFF2-40B4-BE49-F238E27FC236}">
-                <a16:creationId xmlns:a16="http://schemas.microsoft.com/office/drawing/2014/main" id="{AED7FCD8-3C56-4B11-ADA2-B181B3B96684}"/>
+                <a16:creationId xmlns:a16="http://schemas.microsoft.com/office/drawing/2014/main" id="{1537EFDE-8C63-B2C2-1F5B-084C2E2E46E2}"/>
               </a:ext>
             </a:extLst>
           </p:cNvPr>
-          <p:cNvSpPr txBox="1"/>
+          <p:cNvPicPr>
+            <a:picLocks noChangeAspect="1"/>
+          </p:cNvPicPr>
           <p:nvPr/>
-        </p:nvSpPr>
+        </p:nvPicPr>
+        <p:blipFill rotWithShape="1">
+          <a:blip r:embed="rId2">
+            <a:extLst>
+              <a:ext uri="{28A0092B-C50C-407E-A947-70E740481C1C}">
+                <a14:useLocalDpi xmlns:a14="http://schemas.microsoft.com/office/drawing/2010/main" val="0"/>
+              </a:ext>
+              <a:ext uri="{96DAC541-7B7A-43D3-8B79-37D633B846F1}">
+                <asvg:svgBlip xmlns:asvg="http://schemas.microsoft.com/office/drawing/2016/SVG/main" r:embed="rId3"/>
+              </a:ext>
+            </a:extLst>
+          </a:blip>
+          <a:srcRect l="18319" r="16338" b="62600"/>
+          <a:stretch/>
+        </p:blipFill>
         <p:spPr>
           <a:xfrm>
-            <a:off x="611560" y="1419622"/>
-            <a:ext cx="8064896" cy="4339650"/>
+            <a:off x="1172902" y="-308570"/>
+            <a:ext cx="6834196" cy="5532547"/>
           </a:xfrm>
           <a:prstGeom prst="rect">
             <a:avLst/>
           </a:prstGeom>
-          <a:noFill/>
         </p:spPr>
-        <p:txBody>
-          <a:bodyPr wrap="square" rtlCol="0">
-            <a:spAutoFit/>
-          </a:bodyPr>
-          <a:lstStyle/>
-          <a:p>
-            <a:pPr marL="285750" indent="-285750">
-              <a:buFont typeface="Arial" panose="020B0604020202020204" pitchFamily="34" charset="0"/>
-              <a:buChar char="•"/>
-            </a:pPr>
-            <a:r>
-              <a:rPr lang="en-US" sz="1600" dirty="0">
-                <a:latin typeface="Segoe UI" panose="020B0502040204020203" pitchFamily="34" charset="0"/>
-              </a:rPr>
-              <a:t>[11] Whitaker A. and </a:t>
-            </a:r>
-            <a:r>
-              <a:rPr lang="en-US" sz="1600" dirty="0" err="1">
-                <a:latin typeface="Segoe UI" panose="020B0502040204020203" pitchFamily="34" charset="0"/>
-              </a:rPr>
-              <a:t>Wetherall</a:t>
-            </a:r>
-            <a:r>
-              <a:rPr lang="en-US" sz="1600" dirty="0">
-                <a:latin typeface="Segoe UI" panose="020B0502040204020203" pitchFamily="34" charset="0"/>
-              </a:rPr>
-              <a:t> D. 2002. Forwarding without loops in Icarus. In </a:t>
-            </a:r>
-            <a:r>
-              <a:rPr lang="en-US" sz="1600" i="1" dirty="0">
-                <a:latin typeface="Segoe UI" panose="020B0502040204020203" pitchFamily="34" charset="0"/>
-              </a:rPr>
-              <a:t>2002 IEEE Open Architectures and Network Programming Proceedings. OPENARCH 2002 (Cat. No.02EX571)</a:t>
-            </a:r>
-            <a:r>
-              <a:rPr lang="en-US" sz="1600" i="0" dirty="0">
-                <a:latin typeface="Segoe UI" panose="020B0502040204020203" pitchFamily="34" charset="0"/>
-              </a:rPr>
-              <a:t>, 63–75. DOI: </a:t>
-            </a:r>
-            <a:r>
-              <a:rPr lang="en-US" sz="1600" dirty="0">
-                <a:latin typeface="Segoe UI" panose="020B0502040204020203" pitchFamily="34" charset="0"/>
-                <a:hlinkClick r:id="rId2"/>
-              </a:rPr>
-              <a:t>https://</a:t>
-            </a:r>
-            <a:r>
-              <a:rPr lang="de-DE" sz="1600" dirty="0">
-                <a:latin typeface="Segoe UI" panose="020B0502040204020203" pitchFamily="34" charset="0"/>
-                <a:hlinkClick r:id="rId2"/>
-              </a:rPr>
-              <a:t>doi.org/</a:t>
-            </a:r>
-            <a:r>
-              <a:rPr lang="en-US" sz="1600" i="0" dirty="0">
-                <a:latin typeface="Segoe UI" panose="020B0502040204020203" pitchFamily="34" charset="0"/>
-                <a:hlinkClick r:id="rId2"/>
-              </a:rPr>
-              <a:t>10.1109/OPNARC.2002.1019229</a:t>
-            </a:r>
-            <a:endParaRPr lang="en-US" sz="1600" i="0" dirty="0">
-              <a:latin typeface="Segoe UI" panose="020B0502040204020203" pitchFamily="34" charset="0"/>
-            </a:endParaRPr>
-          </a:p>
-          <a:p>
-            <a:pPr marL="285750" indent="-285750">
-              <a:buFont typeface="Arial" panose="020B0604020202020204" pitchFamily="34" charset="0"/>
-              <a:buChar char="•"/>
-            </a:pPr>
-            <a:r>
-              <a:rPr lang="de-DE" sz="1600" dirty="0">
-                <a:latin typeface="Segoe UI" panose="020B0502040204020203" pitchFamily="34" charset="0"/>
-              </a:rPr>
-              <a:t>[12] Laufer Rafael P., </a:t>
-            </a:r>
-            <a:r>
-              <a:rPr lang="de-DE" sz="1600" dirty="0" err="1">
-                <a:latin typeface="Segoe UI" panose="020B0502040204020203" pitchFamily="34" charset="0"/>
-              </a:rPr>
-              <a:t>Velloso</a:t>
-            </a:r>
-            <a:r>
-              <a:rPr lang="de-DE" sz="1600" dirty="0">
-                <a:latin typeface="Segoe UI" panose="020B0502040204020203" pitchFamily="34" charset="0"/>
-              </a:rPr>
-              <a:t> Pedro B., Cunha Daniel de O., </a:t>
-            </a:r>
-            <a:r>
-              <a:rPr lang="de-DE" sz="1600" dirty="0" err="1">
-                <a:latin typeface="Segoe UI" panose="020B0502040204020203" pitchFamily="34" charset="0"/>
-              </a:rPr>
-              <a:t>Moraes</a:t>
-            </a:r>
-            <a:r>
-              <a:rPr lang="de-DE" sz="1600" dirty="0">
-                <a:latin typeface="Segoe UI" panose="020B0502040204020203" pitchFamily="34" charset="0"/>
-              </a:rPr>
-              <a:t> Igor M., </a:t>
-            </a:r>
-            <a:r>
-              <a:rPr lang="de-DE" sz="1600" dirty="0" err="1">
-                <a:latin typeface="Segoe UI" panose="020B0502040204020203" pitchFamily="34" charset="0"/>
-              </a:rPr>
-              <a:t>Bicudo</a:t>
-            </a:r>
-            <a:r>
-              <a:rPr lang="de-DE" sz="1600" dirty="0">
-                <a:latin typeface="Segoe UI" panose="020B0502040204020203" pitchFamily="34" charset="0"/>
-              </a:rPr>
-              <a:t> Marco D.D., Moreira Marcelo D.D., and Duarte Otto Carlos M.B. 2007. </a:t>
-            </a:r>
-            <a:r>
-              <a:rPr lang="de-DE" sz="1600" dirty="0" err="1">
-                <a:latin typeface="Segoe UI" panose="020B0502040204020203" pitchFamily="34" charset="0"/>
-              </a:rPr>
-              <a:t>Towards</a:t>
-            </a:r>
-            <a:r>
-              <a:rPr lang="de-DE" sz="1600" dirty="0">
-                <a:latin typeface="Segoe UI" panose="020B0502040204020203" pitchFamily="34" charset="0"/>
-              </a:rPr>
-              <a:t> </a:t>
-            </a:r>
-            <a:r>
-              <a:rPr lang="de-DE" sz="1600" dirty="0" err="1">
-                <a:latin typeface="Segoe UI" panose="020B0502040204020203" pitchFamily="34" charset="0"/>
-              </a:rPr>
-              <a:t>Stateless</a:t>
-            </a:r>
-            <a:r>
-              <a:rPr lang="de-DE" sz="1600" dirty="0">
-                <a:latin typeface="Segoe UI" panose="020B0502040204020203" pitchFamily="34" charset="0"/>
-              </a:rPr>
-              <a:t> Single-Packet IP </a:t>
-            </a:r>
-            <a:r>
-              <a:rPr lang="de-DE" sz="1600" dirty="0" err="1">
-                <a:latin typeface="Segoe UI" panose="020B0502040204020203" pitchFamily="34" charset="0"/>
-              </a:rPr>
-              <a:t>Traceback</a:t>
-            </a:r>
-            <a:r>
-              <a:rPr lang="de-DE" sz="1600" dirty="0">
-                <a:latin typeface="Segoe UI" panose="020B0502040204020203" pitchFamily="34" charset="0"/>
-              </a:rPr>
-              <a:t>. In </a:t>
-            </a:r>
-            <a:r>
-              <a:rPr lang="de-DE" sz="1600" i="1" dirty="0">
-                <a:latin typeface="Segoe UI" panose="020B0502040204020203" pitchFamily="34" charset="0"/>
-              </a:rPr>
-              <a:t>32nd IEEE Conference on </a:t>
-            </a:r>
-            <a:r>
-              <a:rPr lang="de-DE" sz="1600" i="1" dirty="0" err="1">
-                <a:latin typeface="Segoe UI" panose="020B0502040204020203" pitchFamily="34" charset="0"/>
-              </a:rPr>
-              <a:t>Local</a:t>
-            </a:r>
-            <a:r>
-              <a:rPr lang="de-DE" sz="1600" i="1" dirty="0">
-                <a:latin typeface="Segoe UI" panose="020B0502040204020203" pitchFamily="34" charset="0"/>
-              </a:rPr>
-              <a:t> Computer Networks (LCN 2007)</a:t>
-            </a:r>
-            <a:r>
-              <a:rPr lang="de-DE" sz="1600" i="0" dirty="0">
-                <a:latin typeface="Segoe UI" panose="020B0502040204020203" pitchFamily="34" charset="0"/>
-              </a:rPr>
-              <a:t>, 548–555. DOI: </a:t>
-            </a:r>
-            <a:r>
-              <a:rPr lang="en-US" sz="1600" dirty="0">
-                <a:latin typeface="Segoe UI" panose="020B0502040204020203" pitchFamily="34" charset="0"/>
-                <a:hlinkClick r:id="rId3"/>
-              </a:rPr>
-              <a:t>https://</a:t>
-            </a:r>
-            <a:r>
-              <a:rPr lang="de-DE" sz="1600" dirty="0">
-                <a:latin typeface="Segoe UI" panose="020B0502040204020203" pitchFamily="34" charset="0"/>
-                <a:hlinkClick r:id="rId3"/>
-              </a:rPr>
-              <a:t>doi.org/</a:t>
-            </a:r>
-            <a:r>
-              <a:rPr lang="de-DE" sz="1600" i="0" dirty="0">
-                <a:latin typeface="Segoe UI" panose="020B0502040204020203" pitchFamily="34" charset="0"/>
-                <a:hlinkClick r:id="rId3"/>
-              </a:rPr>
-              <a:t>10.1109/LCN.2007.15</a:t>
-            </a:r>
-            <a:endParaRPr lang="de-DE" sz="1600" i="0" dirty="0">
-              <a:latin typeface="Segoe UI" panose="020B0502040204020203" pitchFamily="34" charset="0"/>
-            </a:endParaRPr>
-          </a:p>
-          <a:p>
-            <a:pPr marL="285750" indent="-285750">
-              <a:buFont typeface="Arial" panose="020B0604020202020204" pitchFamily="34" charset="0"/>
-              <a:buChar char="•"/>
-            </a:pPr>
-            <a:r>
-              <a:rPr lang="de-DE" sz="1600" dirty="0">
-                <a:latin typeface="Segoe UI" panose="020B0502040204020203" pitchFamily="34" charset="0"/>
-                <a:cs typeface="Segoe UI" panose="020B0502040204020203" pitchFamily="34" charset="0"/>
-              </a:rPr>
-              <a:t>[13] </a:t>
-            </a:r>
-            <a:r>
-              <a:rPr lang="en-US" sz="1600" dirty="0">
-                <a:latin typeface="Segoe UI" panose="020B0502040204020203" pitchFamily="34" charset="0"/>
-                <a:cs typeface="Segoe UI" panose="020B0502040204020203" pitchFamily="34" charset="0"/>
-              </a:rPr>
-              <a:t>Wang, J. 1999. A Survey of Web Caching Schemes for the Internet. </a:t>
-            </a:r>
-            <a:r>
-              <a:rPr lang="en-US" sz="1600" i="1" dirty="0">
-                <a:latin typeface="Segoe UI" panose="020B0502040204020203" pitchFamily="34" charset="0"/>
-                <a:cs typeface="Segoe UI" panose="020B0502040204020203" pitchFamily="34" charset="0"/>
-              </a:rPr>
-              <a:t>SIGCOMM </a:t>
-            </a:r>
-            <a:r>
-              <a:rPr lang="en-US" sz="1600" i="1" dirty="0" err="1">
-                <a:latin typeface="Segoe UI" panose="020B0502040204020203" pitchFamily="34" charset="0"/>
-                <a:cs typeface="Segoe UI" panose="020B0502040204020203" pitchFamily="34" charset="0"/>
-              </a:rPr>
-              <a:t>Comput</a:t>
-            </a:r>
-            <a:r>
-              <a:rPr lang="en-US" sz="1600" i="1" dirty="0">
-                <a:latin typeface="Segoe UI" panose="020B0502040204020203" pitchFamily="34" charset="0"/>
-                <a:cs typeface="Segoe UI" panose="020B0502040204020203" pitchFamily="34" charset="0"/>
-              </a:rPr>
-              <a:t>. </a:t>
-            </a:r>
-            <a:r>
-              <a:rPr lang="en-US" sz="1600" i="1" dirty="0" err="1">
-                <a:latin typeface="Segoe UI" panose="020B0502040204020203" pitchFamily="34" charset="0"/>
-                <a:cs typeface="Segoe UI" panose="020B0502040204020203" pitchFamily="34" charset="0"/>
-              </a:rPr>
-              <a:t>Commun</a:t>
-            </a:r>
-            <a:r>
-              <a:rPr lang="en-US" sz="1600" i="1" dirty="0">
-                <a:latin typeface="Segoe UI" panose="020B0502040204020203" pitchFamily="34" charset="0"/>
-                <a:cs typeface="Segoe UI" panose="020B0502040204020203" pitchFamily="34" charset="0"/>
-              </a:rPr>
-              <a:t>. Rev.</a:t>
-            </a:r>
-            <a:r>
-              <a:rPr lang="en-US" sz="1600" i="0" dirty="0">
-                <a:latin typeface="Segoe UI" panose="020B0502040204020203" pitchFamily="34" charset="0"/>
-                <a:cs typeface="Segoe UI" panose="020B0502040204020203" pitchFamily="34" charset="0"/>
-              </a:rPr>
-              <a:t> 29, 5, 36–46. DOI: </a:t>
-            </a:r>
-            <a:r>
-              <a:rPr kumimoji="0" lang="de-DE" altLang="de-DE" sz="1600" b="0" i="0" u="none" strike="noStrike" cap="none" normalizeH="0" baseline="0" dirty="0">
-                <a:ln>
-                  <a:noFill/>
-                </a:ln>
-                <a:solidFill>
-                  <a:schemeClr val="tx1"/>
-                </a:solidFill>
-                <a:effectLst/>
-                <a:latin typeface="Segoe UI" panose="020B0502040204020203" pitchFamily="34" charset="0"/>
-                <a:cs typeface="Segoe UI" panose="020B0502040204020203" pitchFamily="34" charset="0"/>
-                <a:hlinkClick r:id="rId4"/>
-              </a:rPr>
-              <a:t>https://doi.org/10.1145/505696.505701</a:t>
-            </a:r>
-            <a:endParaRPr kumimoji="0" lang="de-DE" altLang="de-DE" sz="1600" b="0" i="0" u="none" strike="noStrike" cap="none" normalizeH="0" baseline="0" dirty="0">
-              <a:ln>
-                <a:noFill/>
-              </a:ln>
-              <a:solidFill>
-                <a:schemeClr val="tx1"/>
-              </a:solidFill>
-              <a:effectLst/>
-              <a:latin typeface="Segoe UI" panose="020B0502040204020203" pitchFamily="34" charset="0"/>
-              <a:cs typeface="Segoe UI" panose="020B0502040204020203" pitchFamily="34" charset="0"/>
-            </a:endParaRPr>
-          </a:p>
-          <a:p>
-            <a:pPr marL="285750" indent="-285750">
-              <a:buFont typeface="Arial" panose="020B0604020202020204" pitchFamily="34" charset="0"/>
-              <a:buChar char="•"/>
-            </a:pPr>
-            <a:r>
-              <a:rPr lang="de-DE" sz="1600" dirty="0">
-                <a:latin typeface="Segoe UI" panose="020B0502040204020203" pitchFamily="34" charset="0"/>
-              </a:rPr>
-              <a:t>[14] </a:t>
-            </a:r>
-            <a:r>
-              <a:rPr lang="de-DE" sz="1600" dirty="0" err="1">
-                <a:latin typeface="Segoe UI" panose="020B0502040204020203" pitchFamily="34" charset="0"/>
-              </a:rPr>
-              <a:t>Dharmapurikar</a:t>
-            </a:r>
-            <a:r>
-              <a:rPr lang="de-DE" sz="1600" dirty="0">
-                <a:latin typeface="Segoe UI" panose="020B0502040204020203" pitchFamily="34" charset="0"/>
-              </a:rPr>
-              <a:t> S., </a:t>
-            </a:r>
-            <a:r>
-              <a:rPr lang="de-DE" sz="1600" dirty="0" err="1">
-                <a:latin typeface="Segoe UI" panose="020B0502040204020203" pitchFamily="34" charset="0"/>
-              </a:rPr>
-              <a:t>Krishnamurthy</a:t>
-            </a:r>
-            <a:r>
-              <a:rPr lang="de-DE" sz="1600" dirty="0">
-                <a:latin typeface="Segoe UI" panose="020B0502040204020203" pitchFamily="34" charset="0"/>
-              </a:rPr>
-              <a:t> P., </a:t>
-            </a:r>
-            <a:r>
-              <a:rPr lang="de-DE" sz="1600" dirty="0" err="1">
-                <a:latin typeface="Segoe UI" panose="020B0502040204020203" pitchFamily="34" charset="0"/>
-              </a:rPr>
-              <a:t>Sproull</a:t>
-            </a:r>
-            <a:r>
-              <a:rPr lang="de-DE" sz="1600" dirty="0">
-                <a:latin typeface="Segoe UI" panose="020B0502040204020203" pitchFamily="34" charset="0"/>
-              </a:rPr>
-              <a:t> T., and Lockwood J. 2003. Deep packet </a:t>
-            </a:r>
-            <a:r>
-              <a:rPr lang="de-DE" sz="1600" dirty="0" err="1">
-                <a:latin typeface="Segoe UI" panose="020B0502040204020203" pitchFamily="34" charset="0"/>
-              </a:rPr>
-              <a:t>inspection</a:t>
-            </a:r>
-            <a:r>
-              <a:rPr lang="de-DE" sz="1600" dirty="0">
-                <a:latin typeface="Segoe UI" panose="020B0502040204020203" pitchFamily="34" charset="0"/>
-              </a:rPr>
-              <a:t> </a:t>
-            </a:r>
-            <a:r>
-              <a:rPr lang="de-DE" sz="1600" dirty="0" err="1">
-                <a:latin typeface="Segoe UI" panose="020B0502040204020203" pitchFamily="34" charset="0"/>
-              </a:rPr>
-              <a:t>using</a:t>
-            </a:r>
-            <a:r>
-              <a:rPr lang="de-DE" sz="1600" dirty="0">
-                <a:latin typeface="Segoe UI" panose="020B0502040204020203" pitchFamily="34" charset="0"/>
-              </a:rPr>
-              <a:t> parallel Bloom </a:t>
-            </a:r>
-            <a:r>
-              <a:rPr lang="de-DE" sz="1600" dirty="0" err="1">
-                <a:latin typeface="Segoe UI" panose="020B0502040204020203" pitchFamily="34" charset="0"/>
-              </a:rPr>
-              <a:t>filters</a:t>
-            </a:r>
-            <a:r>
-              <a:rPr lang="de-DE" sz="1600" dirty="0">
-                <a:latin typeface="Segoe UI" panose="020B0502040204020203" pitchFamily="34" charset="0"/>
-              </a:rPr>
-              <a:t>. In </a:t>
-            </a:r>
-            <a:r>
-              <a:rPr lang="de-DE" sz="1600" i="1" dirty="0">
-                <a:latin typeface="Segoe UI" panose="020B0502040204020203" pitchFamily="34" charset="0"/>
-              </a:rPr>
-              <a:t>11th Symposium on High Performance </a:t>
-            </a:r>
-            <a:r>
-              <a:rPr lang="de-DE" sz="1600" i="1" dirty="0" err="1">
-                <a:latin typeface="Segoe UI" panose="020B0502040204020203" pitchFamily="34" charset="0"/>
-              </a:rPr>
-              <a:t>Interconnects</a:t>
-            </a:r>
-            <a:r>
-              <a:rPr lang="de-DE" sz="1600" i="1" dirty="0">
-                <a:latin typeface="Segoe UI" panose="020B0502040204020203" pitchFamily="34" charset="0"/>
-              </a:rPr>
-              <a:t>, 2003. Proceedings</a:t>
-            </a:r>
-            <a:r>
-              <a:rPr lang="de-DE" sz="1600" i="0" dirty="0">
-                <a:latin typeface="Segoe UI" panose="020B0502040204020203" pitchFamily="34" charset="0"/>
-              </a:rPr>
-              <a:t>, 44–51. DOI: </a:t>
-            </a:r>
-            <a:r>
-              <a:rPr lang="en-US" sz="1600" dirty="0">
-                <a:latin typeface="Segoe UI" panose="020B0502040204020203" pitchFamily="34" charset="0"/>
-                <a:hlinkClick r:id="rId5"/>
-              </a:rPr>
-              <a:t>https://</a:t>
-            </a:r>
-            <a:r>
-              <a:rPr lang="de-DE" sz="1600" dirty="0">
-                <a:latin typeface="Segoe UI" panose="020B0502040204020203" pitchFamily="34" charset="0"/>
-                <a:hlinkClick r:id="rId5"/>
-              </a:rPr>
-              <a:t>doi.org/</a:t>
-            </a:r>
-            <a:r>
-              <a:rPr lang="de-DE" sz="1600" i="0" dirty="0">
-                <a:latin typeface="Segoe UI" panose="020B0502040204020203" pitchFamily="34" charset="0"/>
-                <a:hlinkClick r:id="rId5"/>
-              </a:rPr>
-              <a:t>10.1109/CONECT.2003.1231477</a:t>
-            </a:r>
-            <a:endParaRPr lang="de-DE" altLang="de-DE" sz="1600" dirty="0">
-              <a:latin typeface="Segoe UI" panose="020B0502040204020203" pitchFamily="34" charset="0"/>
-              <a:cs typeface="Segoe UI" panose="020B0502040204020203" pitchFamily="34" charset="0"/>
-            </a:endParaRPr>
-          </a:p>
-          <a:p>
-            <a:pPr marL="285750" indent="-285750">
-              <a:buFont typeface="Arial" panose="020B0604020202020204" pitchFamily="34" charset="0"/>
-              <a:buChar char="•"/>
-            </a:pPr>
-            <a:endParaRPr kumimoji="0" lang="de-DE" altLang="de-DE" sz="3600" b="0" i="0" u="none" strike="noStrike" cap="none" normalizeH="0" baseline="0" dirty="0">
-              <a:ln>
-                <a:noFill/>
-              </a:ln>
-              <a:solidFill>
-                <a:schemeClr val="tx1"/>
-              </a:solidFill>
-              <a:effectLst/>
-              <a:latin typeface="Arial" panose="020B0604020202020204" pitchFamily="34" charset="0"/>
-            </a:endParaRPr>
-          </a:p>
-          <a:p>
-            <a:pPr marL="285750" indent="-285750">
-              <a:buFont typeface="Arial" panose="020B0604020202020204" pitchFamily="34" charset="0"/>
-              <a:buChar char="•"/>
-            </a:pPr>
-            <a:endParaRPr lang="en-US" sz="1600" i="0" dirty="0">
-              <a:latin typeface="Segoe UI" panose="020B0502040204020203" pitchFamily="34" charset="0"/>
-            </a:endParaRPr>
-          </a:p>
-          <a:p>
-            <a:pPr marL="285750" indent="-285750">
-              <a:buFont typeface="Arial" panose="020B0604020202020204" pitchFamily="34" charset="0"/>
-              <a:buChar char="•"/>
-            </a:pPr>
-            <a:endParaRPr lang="en-US" sz="1600" i="0" dirty="0">
-              <a:latin typeface="Segoe UI" panose="020B0502040204020203" pitchFamily="34" charset="0"/>
-            </a:endParaRPr>
-          </a:p>
-        </p:txBody>
-      </p:sp>
+      </p:pic>
     </p:spTree>
     <p:extLst>
       <p:ext uri="{BB962C8B-B14F-4D97-AF65-F5344CB8AC3E}">
-        <p14:creationId xmlns:p14="http://schemas.microsoft.com/office/powerpoint/2010/main" val="3916588754"/>
+        <p14:creationId xmlns:p14="http://schemas.microsoft.com/office/powerpoint/2010/main" val="3942968119"/>
       </p:ext>
     </p:extLst>
   </p:cSld>
@@ -14090,7 +13111,7 @@
         <p:spPr>
           <a:xfrm>
             <a:off x="611560" y="1419622"/>
-            <a:ext cx="8064896" cy="5724644"/>
+            <a:ext cx="8064896" cy="2800767"/>
           </a:xfrm>
           <a:prstGeom prst="rect">
             <a:avLst/>
@@ -14111,71 +13132,20 @@
               <a:rPr lang="en-US" sz="1600" dirty="0">
                 <a:latin typeface="Segoe UI" panose="020B0502040204020203" pitchFamily="34" charset="0"/>
               </a:rPr>
-              <a:t>[15] </a:t>
-            </a:r>
-            <a:r>
-              <a:rPr lang="en-US" sz="1600" dirty="0" err="1">
-                <a:latin typeface="Segoe UI" panose="020B0502040204020203" pitchFamily="34" charset="0"/>
-              </a:rPr>
-              <a:t>Gremillion</a:t>
-            </a:r>
-            <a:r>
-              <a:rPr lang="en-US" sz="1600" dirty="0">
-                <a:latin typeface="Segoe UI" panose="020B0502040204020203" pitchFamily="34" charset="0"/>
-              </a:rPr>
-              <a:t>, L. L. 1982. Designing a Bloom Filter for Differential File Access. </a:t>
-            </a:r>
-            <a:r>
-              <a:rPr lang="en-US" sz="1600" i="1" dirty="0" err="1">
-                <a:latin typeface="Segoe UI" panose="020B0502040204020203" pitchFamily="34" charset="0"/>
-              </a:rPr>
-              <a:t>Commun</a:t>
+              <a:t>[1] Burton H. Bloom, 1970, Space/time trade-offs in hash coding with allowable errors, </a:t>
             </a:r>
             <a:r>
               <a:rPr lang="en-US" sz="1600" i="1" dirty="0">
                 <a:latin typeface="Segoe UI" panose="020B0502040204020203" pitchFamily="34" charset="0"/>
               </a:rPr>
-              <a:t>. ACM</a:t>
+              <a:t>Communications of the ACM</a:t>
             </a:r>
             <a:r>
               <a:rPr lang="en-US" sz="1600" i="0" dirty="0">
                 <a:latin typeface="Segoe UI" panose="020B0502040204020203" pitchFamily="34" charset="0"/>
               </a:rPr>
-              <a:t> 25, 9, 600–604. </a:t>
-            </a:r>
-            <a:r>
-              <a:rPr lang="en-US" sz="1600" i="0" dirty="0">
-                <a:latin typeface="Segoe UI" panose="020B0502040204020203" pitchFamily="34" charset="0"/>
-                <a:cs typeface="Segoe UI" panose="020B0502040204020203" pitchFamily="34" charset="0"/>
-              </a:rPr>
-              <a:t>DOI: </a:t>
-            </a:r>
-            <a:r>
-              <a:rPr kumimoji="0" lang="de-DE" altLang="de-DE" sz="1600" b="0" i="0" u="none" strike="noStrike" cap="none" normalizeH="0" baseline="0" dirty="0">
-                <a:ln>
-                  <a:noFill/>
-                </a:ln>
-                <a:solidFill>
-                  <a:schemeClr val="tx1"/>
-                </a:solidFill>
-                <a:effectLst/>
-                <a:latin typeface="Segoe UI" panose="020B0502040204020203" pitchFamily="34" charset="0"/>
-                <a:cs typeface="Segoe UI" panose="020B0502040204020203" pitchFamily="34" charset="0"/>
-                <a:hlinkClick r:id="rId2"/>
-              </a:rPr>
-              <a:t>https://doi.org/10.1145/358628.358632</a:t>
-            </a:r>
-            <a:endParaRPr kumimoji="0" lang="de-DE" altLang="de-DE" sz="1600" b="0" i="0" u="none" strike="noStrike" cap="none" normalizeH="0" baseline="0" dirty="0">
-              <a:ln>
-                <a:noFill/>
-              </a:ln>
-              <a:solidFill>
-                <a:schemeClr val="tx1"/>
-              </a:solidFill>
-              <a:effectLst/>
-              <a:latin typeface="Segoe UI" panose="020B0502040204020203" pitchFamily="34" charset="0"/>
-              <a:cs typeface="Segoe UI" panose="020B0502040204020203" pitchFamily="34" charset="0"/>
-            </a:endParaRPr>
+              <a:t> 13, Issue 7, 422–426. DOI: https://doi.org/10.1145/362686.362692.</a:t>
+            </a:r>
           </a:p>
           <a:p>
             <a:pPr marL="285750" indent="-285750">
@@ -14183,115 +13153,59 @@
               <a:buChar char="•"/>
             </a:pPr>
             <a:r>
-              <a:rPr lang="de-DE" altLang="de-DE" sz="1600" dirty="0">
-                <a:latin typeface="Segoe UI" panose="020B0502040204020203" pitchFamily="34" charset="0"/>
-                <a:cs typeface="Segoe UI" panose="020B0502040204020203" pitchFamily="34" charset="0"/>
-              </a:rPr>
-              <a:t>[16] </a:t>
-            </a:r>
-            <a:r>
-              <a:rPr lang="de-DE" sz="1600" dirty="0" err="1">
-                <a:latin typeface="Segoe UI" panose="020B0502040204020203" pitchFamily="34" charset="0"/>
-              </a:rPr>
-              <a:t>Murugan</a:t>
-            </a:r>
-            <a:r>
-              <a:rPr lang="de-DE" sz="1600" dirty="0">
-                <a:latin typeface="Segoe UI" panose="020B0502040204020203" pitchFamily="34" charset="0"/>
-              </a:rPr>
-              <a:t>, S., </a:t>
-            </a:r>
-            <a:r>
-              <a:rPr lang="de-DE" sz="1600" dirty="0" err="1">
-                <a:latin typeface="Segoe UI" panose="020B0502040204020203" pitchFamily="34" charset="0"/>
-              </a:rPr>
-              <a:t>Bakthavatchalam</a:t>
-            </a:r>
-            <a:r>
-              <a:rPr lang="de-DE" sz="1600" dirty="0">
-                <a:latin typeface="Segoe UI" panose="020B0502040204020203" pitchFamily="34" charset="0"/>
-              </a:rPr>
-              <a:t>, T. A., and </a:t>
-            </a:r>
-            <a:r>
-              <a:rPr lang="de-DE" sz="1600" dirty="0" err="1">
-                <a:latin typeface="Segoe UI" panose="020B0502040204020203" pitchFamily="34" charset="0"/>
-              </a:rPr>
-              <a:t>Sankarasubbu</a:t>
-            </a:r>
-            <a:r>
-              <a:rPr lang="de-DE" sz="1600" dirty="0">
-                <a:latin typeface="Segoe UI" panose="020B0502040204020203" pitchFamily="34" charset="0"/>
-              </a:rPr>
-              <a:t>, M. 2020. </a:t>
-            </a:r>
-            <a:r>
-              <a:rPr lang="de-DE" sz="1600" dirty="0" err="1">
-                <a:latin typeface="Segoe UI" panose="020B0502040204020203" pitchFamily="34" charset="0"/>
-              </a:rPr>
-              <a:t>SymSpell</a:t>
-            </a:r>
-            <a:r>
-              <a:rPr lang="de-DE" sz="1600" dirty="0">
-                <a:latin typeface="Segoe UI" panose="020B0502040204020203" pitchFamily="34" charset="0"/>
-              </a:rPr>
-              <a:t> and LSTM </a:t>
-            </a:r>
-            <a:r>
-              <a:rPr lang="de-DE" sz="1600" dirty="0" err="1">
-                <a:latin typeface="Segoe UI" panose="020B0502040204020203" pitchFamily="34" charset="0"/>
-              </a:rPr>
-              <a:t>based</a:t>
-            </a:r>
-            <a:r>
-              <a:rPr lang="de-DE" sz="1600" dirty="0">
-                <a:latin typeface="Segoe UI" panose="020B0502040204020203" pitchFamily="34" charset="0"/>
-              </a:rPr>
-              <a:t> </a:t>
-            </a:r>
-            <a:r>
-              <a:rPr lang="de-DE" sz="1600" dirty="0" err="1">
-                <a:latin typeface="Segoe UI" panose="020B0502040204020203" pitchFamily="34" charset="0"/>
-              </a:rPr>
-              <a:t>Spell</a:t>
-            </a:r>
-            <a:r>
-              <a:rPr lang="de-DE" sz="1600" dirty="0">
-                <a:latin typeface="Segoe UI" panose="020B0502040204020203" pitchFamily="34" charset="0"/>
-              </a:rPr>
-              <a:t>-Checkers </a:t>
-            </a:r>
-            <a:r>
-              <a:rPr lang="de-DE" sz="1600" dirty="0" err="1">
-                <a:latin typeface="Segoe UI" panose="020B0502040204020203" pitchFamily="34" charset="0"/>
-              </a:rPr>
-              <a:t>for</a:t>
-            </a:r>
-            <a:r>
-              <a:rPr lang="de-DE" sz="1600" dirty="0">
-                <a:latin typeface="Segoe UI" panose="020B0502040204020203" pitchFamily="34" charset="0"/>
-              </a:rPr>
-              <a:t> Tamil.</a:t>
-            </a:r>
-            <a:r>
-              <a:rPr lang="de-DE" sz="1600" dirty="0">
-                <a:latin typeface="Segoe UI" panose="020B0502040204020203" pitchFamily="34" charset="0"/>
-                <a:cs typeface="Segoe UI" panose="020B0502040204020203" pitchFamily="34" charset="0"/>
-              </a:rPr>
-              <a:t> </a:t>
-            </a:r>
-            <a:r>
-              <a:rPr lang="de-DE" sz="1600" dirty="0">
-                <a:latin typeface="Segoe UI" panose="020B0502040204020203" pitchFamily="34" charset="0"/>
-                <a:cs typeface="Segoe UI" panose="020B0502040204020203" pitchFamily="34" charset="0"/>
-                <a:hlinkClick r:id="rId3"/>
-              </a:rPr>
-              <a:t>http://uttamam.org/papers/20_17.pdf</a:t>
-            </a:r>
-            <a:endParaRPr lang="de-DE" sz="1600" dirty="0">
-              <a:latin typeface="Segoe UI" panose="020B0502040204020203" pitchFamily="34" charset="0"/>
-              <a:cs typeface="Segoe UI" panose="020B0502040204020203" pitchFamily="34" charset="0"/>
-            </a:endParaRPr>
+              <a:rPr lang="en-US" sz="1600" dirty="0">
+                <a:latin typeface="Segoe UI" panose="020B0502040204020203" pitchFamily="34" charset="0"/>
+              </a:rPr>
+              <a:t>[2] </a:t>
+            </a:r>
+            <a:r>
+              <a:rPr lang="en-US" sz="1600" dirty="0" err="1">
+                <a:latin typeface="Segoe UI" panose="020B0502040204020203" pitchFamily="34" charset="0"/>
+              </a:rPr>
+              <a:t>Saibal</a:t>
+            </a:r>
+            <a:r>
+              <a:rPr lang="en-US" sz="1600" dirty="0">
+                <a:latin typeface="Segoe UI" panose="020B0502040204020203" pitchFamily="34" charset="0"/>
+              </a:rPr>
+              <a:t> Kumar Pal and Puneet Sardana, 2012, BLOOM FILTERS &amp; THEIR APPLICATIONS, </a:t>
+            </a:r>
+            <a:r>
+              <a:rPr lang="en-US" sz="1600" i="1" dirty="0">
+                <a:latin typeface="Segoe UI" panose="020B0502040204020203" pitchFamily="34" charset="0"/>
+              </a:rPr>
+              <a:t>International Journal of Computer Applications Technology and Research</a:t>
+            </a:r>
+            <a:r>
+              <a:rPr lang="en-US" sz="1600" i="0" dirty="0">
+                <a:latin typeface="Segoe UI" panose="020B0502040204020203" pitchFamily="34" charset="0"/>
+              </a:rPr>
+              <a:t> 1, 25–29. </a:t>
+            </a:r>
+            <a:r>
+              <a:rPr lang="en-US" sz="1600" dirty="0">
+                <a:latin typeface="Segoe UI" panose="020B0502040204020203" pitchFamily="34" charset="0"/>
+              </a:rPr>
+              <a:t>DOI: https://doi.org/10.7753/2012.1006</a:t>
+            </a:r>
+            <a:r>
+              <a:rPr lang="en-US" sz="1600" i="0" dirty="0">
+                <a:latin typeface="Segoe UI" panose="020B0502040204020203" pitchFamily="34" charset="0"/>
+              </a:rPr>
+              <a:t> https://ui.adsabs.harvard.edu/</a:t>
+            </a:r>
+            <a:r>
+              <a:rPr lang="en-US" sz="1600" i="0" dirty="0" err="1">
+                <a:latin typeface="Segoe UI" panose="020B0502040204020203" pitchFamily="34" charset="0"/>
+              </a:rPr>
+              <a:t>link_gateway</a:t>
+            </a:r>
+            <a:r>
+              <a:rPr lang="en-US" sz="1600" i="0" dirty="0">
+                <a:latin typeface="Segoe UI" panose="020B0502040204020203" pitchFamily="34" charset="0"/>
+              </a:rPr>
+              <a:t>/2012IJCAT...1...25P/doi:10.7753/2012.1006</a:t>
+            </a:r>
           </a:p>
           <a:p>
             <a:pPr marL="285750" indent="-285750">
@@ -14299,48 +13213,40 @@
               <a:buChar char="•"/>
             </a:pPr>
             <a:r>
-              <a:rPr kumimoji="0" lang="de-DE" altLang="de-DE" sz="1600" b="0" i="0" u="none" strike="noStrike" cap="none" normalizeH="0" baseline="0" dirty="0">
-                <a:ln>
-                  <a:noFill/>
-                </a:ln>
-                <a:solidFill>
-                  <a:schemeClr val="tx1"/>
-                </a:solidFill>
-                <a:effectLst/>
-                <a:latin typeface="Segoe UI" panose="020B0502040204020203" pitchFamily="34" charset="0"/>
-                <a:cs typeface="Segoe UI" panose="020B0502040204020203" pitchFamily="34" charset="0"/>
-              </a:rPr>
-              <a:t>[17] </a:t>
+              <a:rPr lang="de-DE" sz="1600" dirty="0">
+                <a:latin typeface="Segoe UI" panose="020B0502040204020203" pitchFamily="34" charset="0"/>
+              </a:rPr>
+              <a:t>[3] </a:t>
             </a:r>
             <a:r>
               <a:rPr lang="de-DE" sz="1600" dirty="0" err="1">
                 <a:latin typeface="Segoe UI" panose="020B0502040204020203" pitchFamily="34" charset="0"/>
               </a:rPr>
-              <a:t>Dharmapurikar</a:t>
+              <a:t>Ripon</a:t>
             </a:r>
             <a:r>
               <a:rPr lang="de-DE" sz="1600" dirty="0">
                 <a:latin typeface="Segoe UI" panose="020B0502040204020203" pitchFamily="34" charset="0"/>
               </a:rPr>
-              <a:t>, S., </a:t>
+              <a:t> </a:t>
             </a:r>
             <a:r>
               <a:rPr lang="de-DE" sz="1600" dirty="0" err="1">
                 <a:latin typeface="Segoe UI" panose="020B0502040204020203" pitchFamily="34" charset="0"/>
               </a:rPr>
-              <a:t>Krishnamurthy</a:t>
+              <a:t>Patgiri</a:t>
             </a:r>
             <a:r>
               <a:rPr lang="de-DE" sz="1600" dirty="0">
                 <a:latin typeface="Segoe UI" panose="020B0502040204020203" pitchFamily="34" charset="0"/>
               </a:rPr>
-              <a:t>, P., and Taylor, D. E. 2003. </a:t>
+              <a:t>, </a:t>
             </a:r>
             <a:r>
               <a:rPr lang="de-DE" sz="1600" dirty="0" err="1">
                 <a:latin typeface="Segoe UI" panose="020B0502040204020203" pitchFamily="34" charset="0"/>
               </a:rPr>
-              <a:t>Longest</a:t>
+              <a:t>Sabuzima</a:t>
             </a:r>
             <a:r>
               <a:rPr lang="de-DE" sz="1600" dirty="0">
@@ -14352,318 +13258,91 @@
               <a:rPr lang="de-DE" sz="1600" dirty="0" err="1">
                 <a:latin typeface="Segoe UI" panose="020B0502040204020203" pitchFamily="34" charset="0"/>
               </a:rPr>
-              <a:t>Prefix</a:t>
+              <a:t>Nayak</a:t>
             </a:r>
             <a:r>
               <a:rPr lang="de-DE" sz="1600" dirty="0">
                 <a:latin typeface="Segoe UI" panose="020B0502040204020203" pitchFamily="34" charset="0"/>
               </a:rPr>
-              <a:t> </a:t>
+              <a:t>, and Samir </a:t>
             </a:r>
             <a:r>
               <a:rPr lang="de-DE" sz="1600" dirty="0" err="1">
                 <a:latin typeface="Segoe UI" panose="020B0502040204020203" pitchFamily="34" charset="0"/>
               </a:rPr>
-              <a:t>Matching</a:t>
+              <a:t>Borgohain</a:t>
             </a:r>
             <a:r>
               <a:rPr lang="de-DE" sz="1600" dirty="0">
                 <a:latin typeface="Segoe UI" panose="020B0502040204020203" pitchFamily="34" charset="0"/>
               </a:rPr>
-              <a:t> </a:t>
+              <a:t>. 2018. </a:t>
             </a:r>
             <a:r>
               <a:rPr lang="de-DE" sz="1600" dirty="0" err="1">
                 <a:latin typeface="Segoe UI" panose="020B0502040204020203" pitchFamily="34" charset="0"/>
               </a:rPr>
-              <a:t>Using</a:t>
+              <a:t>Preventing</a:t>
             </a:r>
             <a:r>
               <a:rPr lang="de-DE" sz="1600" dirty="0">
                 <a:latin typeface="Segoe UI" panose="020B0502040204020203" pitchFamily="34" charset="0"/>
               </a:rPr>
-              <a:t> Bloom Filters. In </a:t>
+              <a:t> DDoS </a:t>
+            </a:r>
+            <a:r>
+              <a:rPr lang="de-DE" sz="1600" dirty="0" err="1">
+                <a:latin typeface="Segoe UI" panose="020B0502040204020203" pitchFamily="34" charset="0"/>
+              </a:rPr>
+              <a:t>using</a:t>
+            </a:r>
+            <a:r>
+              <a:rPr lang="de-DE" sz="1600" dirty="0">
+                <a:latin typeface="Segoe UI" panose="020B0502040204020203" pitchFamily="34" charset="0"/>
+              </a:rPr>
+              <a:t> Bloom Filter: A Survey. </a:t>
             </a:r>
             <a:r>
               <a:rPr lang="de-DE" sz="1600" i="1" dirty="0">
                 <a:latin typeface="Segoe UI" panose="020B0502040204020203" pitchFamily="34" charset="0"/>
               </a:rPr>
-              <a:t>Proceedings </a:t>
+              <a:t>ICST Transactions on </a:t>
             </a:r>
             <a:r>
               <a:rPr lang="de-DE" sz="1600" i="1" dirty="0" err="1">
                 <a:latin typeface="Segoe UI" panose="020B0502040204020203" pitchFamily="34" charset="0"/>
               </a:rPr>
-              <a:t>of</a:t>
+              <a:t>Scalable</a:t>
             </a:r>
             <a:r>
               <a:rPr lang="de-DE" sz="1600" i="1" dirty="0">
                 <a:latin typeface="Segoe UI" panose="020B0502040204020203" pitchFamily="34" charset="0"/>
               </a:rPr>
-              <a:t> </a:t>
-            </a:r>
-            <a:r>
-              <a:rPr lang="de-DE" sz="1600" i="1" dirty="0" err="1">
-                <a:latin typeface="Segoe UI" panose="020B0502040204020203" pitchFamily="34" charset="0"/>
-              </a:rPr>
-              <a:t>the</a:t>
-            </a:r>
-            <a:r>
-              <a:rPr lang="de-DE" sz="1600" i="1" dirty="0">
-                <a:latin typeface="Segoe UI" panose="020B0502040204020203" pitchFamily="34" charset="0"/>
-              </a:rPr>
-              <a:t> 2003 Conference on </a:t>
-            </a:r>
-            <a:r>
-              <a:rPr lang="de-DE" sz="1600" i="1" dirty="0" err="1">
-                <a:latin typeface="Segoe UI" panose="020B0502040204020203" pitchFamily="34" charset="0"/>
-              </a:rPr>
-              <a:t>Applications</a:t>
-            </a:r>
-            <a:r>
-              <a:rPr lang="de-DE" sz="1600" i="1" dirty="0">
-                <a:latin typeface="Segoe UI" panose="020B0502040204020203" pitchFamily="34" charset="0"/>
-              </a:rPr>
-              <a:t>, Technologies, </a:t>
-            </a:r>
-            <a:r>
-              <a:rPr lang="de-DE" sz="1600" i="1" dirty="0" err="1">
-                <a:latin typeface="Segoe UI" panose="020B0502040204020203" pitchFamily="34" charset="0"/>
-              </a:rPr>
-              <a:t>Architectures</a:t>
-            </a:r>
-            <a:r>
-              <a:rPr lang="de-DE" sz="1600" i="1" dirty="0">
-                <a:latin typeface="Segoe UI" panose="020B0502040204020203" pitchFamily="34" charset="0"/>
-              </a:rPr>
-              <a:t>, and </a:t>
-            </a:r>
-            <a:r>
-              <a:rPr lang="de-DE" sz="1600" i="1" dirty="0" err="1">
-                <a:latin typeface="Segoe UI" panose="020B0502040204020203" pitchFamily="34" charset="0"/>
-              </a:rPr>
-              <a:t>Protocols</a:t>
-            </a:r>
-            <a:r>
-              <a:rPr lang="de-DE" sz="1600" i="1" dirty="0">
-                <a:latin typeface="Segoe UI" panose="020B0502040204020203" pitchFamily="34" charset="0"/>
-              </a:rPr>
-              <a:t> </a:t>
-            </a:r>
-            <a:r>
-              <a:rPr lang="de-DE" sz="1600" i="1" dirty="0" err="1">
-                <a:latin typeface="Segoe UI" panose="020B0502040204020203" pitchFamily="34" charset="0"/>
-              </a:rPr>
-              <a:t>for</a:t>
-            </a:r>
-            <a:r>
-              <a:rPr lang="de-DE" sz="1600" i="1" dirty="0">
-                <a:latin typeface="Segoe UI" panose="020B0502040204020203" pitchFamily="34" charset="0"/>
-              </a:rPr>
-              <a:t> Computer Communications</a:t>
+              <a:t> Information Systems</a:t>
             </a:r>
             <a:r>
               <a:rPr lang="de-DE" sz="1600" i="0" dirty="0">
                 <a:latin typeface="Segoe UI" panose="020B0502040204020203" pitchFamily="34" charset="0"/>
               </a:rPr>
-              <a:t>. SIGCOMM ’03. </a:t>
-            </a:r>
-            <a:r>
-              <a:rPr lang="de-DE" sz="1600" i="0" dirty="0" err="1">
-                <a:latin typeface="Segoe UI" panose="020B0502040204020203" pitchFamily="34" charset="0"/>
-              </a:rPr>
-              <a:t>Association</a:t>
+              <a:t> 5, 19, 155865. DOI: </a:t>
             </a:r>
             <a:r>
               <a:rPr lang="de-DE" sz="1600" i="0" dirty="0">
                 <a:latin typeface="Segoe UI" panose="020B0502040204020203" pitchFamily="34" charset="0"/>
-              </a:rPr>
-              <a:t> </a:t>
-            </a:r>
-            <a:r>
-              <a:rPr lang="de-DE" sz="1600" i="0" dirty="0" err="1">
-                <a:latin typeface="Segoe UI" panose="020B0502040204020203" pitchFamily="34" charset="0"/>
-              </a:rPr>
-              <a:t>for</a:t>
-            </a:r>
-            <a:r>
-              <a:rPr lang="de-DE" sz="1600" i="0" dirty="0">
-                <a:latin typeface="Segoe UI" panose="020B0502040204020203" pitchFamily="34" charset="0"/>
-              </a:rPr>
-              <a:t> Computing Machinery, New York, NY, USA, 201–212. DOI: </a:t>
-            </a:r>
-            <a:r>
-              <a:rPr lang="de-DE" altLang="de-DE" sz="1600" dirty="0">
-                <a:latin typeface="Segoe UI" panose="020B0502040204020203" pitchFamily="34" charset="0"/>
-                <a:cs typeface="Segoe UI" panose="020B0502040204020203" pitchFamily="34" charset="0"/>
-                <a:hlinkClick r:id="rId4"/>
-              </a:rPr>
-              <a:t>https://doi.org/</a:t>
-            </a:r>
-            <a:r>
-              <a:rPr lang="de-DE" sz="1600" i="0" dirty="0">
-                <a:latin typeface="Segoe UI" panose="020B0502040204020203" pitchFamily="34" charset="0"/>
-                <a:hlinkClick r:id="rId4"/>
-              </a:rPr>
-              <a:t>10.1145/863955.863979</a:t>
+                <a:hlinkClick r:id="rId2"/>
+              </a:rPr>
+              <a:t>https://doi.org/10.4108%2Feai.19-6-2018.155865</a:t>
             </a:r>
             <a:endParaRPr lang="de-DE" sz="1600" i="0" dirty="0">
               <a:latin typeface="Segoe UI" panose="020B0502040204020203" pitchFamily="34" charset="0"/>
             </a:endParaRPr>
           </a:p>
-          <a:p>
-            <a:pPr marL="285750" indent="-285750">
-              <a:buFont typeface="Arial" panose="020B0604020202020204" pitchFamily="34" charset="0"/>
-              <a:buChar char="•"/>
-            </a:pPr>
-            <a:r>
-              <a:rPr lang="de-DE" sz="1600" dirty="0">
-                <a:latin typeface="Segoe UI" panose="020B0502040204020203" pitchFamily="34" charset="0"/>
-              </a:rPr>
-              <a:t>[18] </a:t>
-            </a:r>
-            <a:r>
-              <a:rPr lang="en-US" sz="1600" dirty="0">
-                <a:latin typeface="Segoe UI" panose="020B0502040204020203" pitchFamily="34" charset="0"/>
-              </a:rPr>
-              <a:t>Jain, N., Dahlin, M., and </a:t>
-            </a:r>
-            <a:r>
-              <a:rPr lang="en-US" sz="1600" dirty="0" err="1">
-                <a:latin typeface="Segoe UI" panose="020B0502040204020203" pitchFamily="34" charset="0"/>
-              </a:rPr>
-              <a:t>Tewar</a:t>
-            </a:r>
-            <a:r>
-              <a:rPr lang="en-US" sz="1600" dirty="0">
-                <a:latin typeface="Segoe UI" panose="020B0502040204020203" pitchFamily="34" charset="0"/>
-              </a:rPr>
-              <a:t>, R. 2005. Using Bloom Filters to Refine Web Search Results. In </a:t>
-            </a:r>
-            <a:r>
-              <a:rPr lang="en-US" sz="1600" i="1" dirty="0">
-                <a:latin typeface="Segoe UI" panose="020B0502040204020203" pitchFamily="34" charset="0"/>
-              </a:rPr>
-              <a:t>Eighth International Workshop on the Web and Databases (</a:t>
-            </a:r>
-            <a:r>
-              <a:rPr lang="en-US" sz="1600" i="1" dirty="0" err="1">
-                <a:latin typeface="Segoe UI" panose="020B0502040204020203" pitchFamily="34" charset="0"/>
-              </a:rPr>
-              <a:t>WebDB</a:t>
-            </a:r>
-            <a:r>
-              <a:rPr lang="en-US" sz="1600" i="1" dirty="0">
-                <a:latin typeface="Segoe UI" panose="020B0502040204020203" pitchFamily="34" charset="0"/>
-              </a:rPr>
-              <a:t> ’05)</a:t>
-            </a:r>
-            <a:r>
-              <a:rPr lang="en-US" sz="1600" i="0" dirty="0">
-                <a:latin typeface="Segoe UI" panose="020B0502040204020203" pitchFamily="34" charset="0"/>
-              </a:rPr>
-              <a:t>.</a:t>
-            </a:r>
-            <a:r>
-              <a:rPr lang="de-DE" sz="1600" dirty="0">
-                <a:latin typeface="Segoe UI" panose="020B0502040204020203" pitchFamily="34" charset="0"/>
-              </a:rPr>
-              <a:t> https://www.microsoft.com/en-us/research/wp-content/uploads/2017/01/webdb-167.pdf</a:t>
-            </a:r>
-          </a:p>
-          <a:p>
-            <a:pPr marL="285750" indent="-285750">
-              <a:buFont typeface="Arial" panose="020B0604020202020204" pitchFamily="34" charset="0"/>
-              <a:buChar char="•"/>
-            </a:pPr>
-            <a:endParaRPr kumimoji="0" lang="de-DE" altLang="de-DE" sz="1600" b="0" i="0" u="none" strike="noStrike" cap="none" normalizeH="0" baseline="0" dirty="0">
-              <a:ln>
-                <a:noFill/>
-              </a:ln>
-              <a:solidFill>
-                <a:schemeClr val="tx1"/>
-              </a:solidFill>
-              <a:effectLst/>
-              <a:latin typeface="Segoe UI" panose="020B0502040204020203" pitchFamily="34" charset="0"/>
-              <a:cs typeface="Segoe UI" panose="020B0502040204020203" pitchFamily="34" charset="0"/>
-            </a:endParaRPr>
-          </a:p>
-          <a:p>
-            <a:pPr marL="285750" indent="-285750">
-              <a:buFont typeface="Arial" panose="020B0604020202020204" pitchFamily="34" charset="0"/>
-              <a:buChar char="•"/>
-            </a:pPr>
-            <a:endParaRPr lang="de-DE" altLang="de-DE" sz="1600" dirty="0">
-              <a:latin typeface="Segoe UI" panose="020B0502040204020203" pitchFamily="34" charset="0"/>
-              <a:cs typeface="Segoe UI" panose="020B0502040204020203" pitchFamily="34" charset="0"/>
-            </a:endParaRPr>
-          </a:p>
-          <a:p>
-            <a:pPr marL="285750" indent="-285750">
-              <a:buFont typeface="Arial" panose="020B0604020202020204" pitchFamily="34" charset="0"/>
-              <a:buChar char="•"/>
-            </a:pPr>
-            <a:endParaRPr kumimoji="0" lang="de-DE" altLang="de-DE" sz="3600" b="0" i="0" u="none" strike="noStrike" cap="none" normalizeH="0" baseline="0" dirty="0">
-              <a:ln>
-                <a:noFill/>
-              </a:ln>
-              <a:solidFill>
-                <a:schemeClr val="tx1"/>
-              </a:solidFill>
-              <a:effectLst/>
-              <a:latin typeface="Arial" panose="020B0604020202020204" pitchFamily="34" charset="0"/>
-            </a:endParaRPr>
-          </a:p>
-          <a:p>
-            <a:pPr marL="285750" indent="-285750">
-              <a:buFont typeface="Arial" panose="020B0604020202020204" pitchFamily="34" charset="0"/>
-              <a:buChar char="•"/>
-            </a:pPr>
-            <a:endParaRPr lang="de-DE" altLang="de-DE" sz="1600" dirty="0">
-              <a:latin typeface="Segoe UI" panose="020B0502040204020203" pitchFamily="34" charset="0"/>
-              <a:cs typeface="Segoe UI" panose="020B0502040204020203" pitchFamily="34" charset="0"/>
-            </a:endParaRPr>
-          </a:p>
-          <a:p>
-            <a:pPr marL="285750" indent="-285750">
-              <a:buFont typeface="Arial" panose="020B0604020202020204" pitchFamily="34" charset="0"/>
-              <a:buChar char="•"/>
-            </a:pPr>
-            <a:endParaRPr kumimoji="0" lang="de-DE" altLang="de-DE" sz="3600" b="0" i="0" u="none" strike="noStrike" cap="none" normalizeH="0" baseline="0" dirty="0">
-              <a:ln>
-                <a:noFill/>
-              </a:ln>
-              <a:solidFill>
-                <a:schemeClr val="tx1"/>
-              </a:solidFill>
-              <a:effectLst/>
-              <a:latin typeface="Arial" panose="020B0604020202020204" pitchFamily="34" charset="0"/>
-            </a:endParaRPr>
-          </a:p>
-          <a:p>
-            <a:pPr marL="285750" indent="-285750">
-              <a:buFont typeface="Arial" panose="020B0604020202020204" pitchFamily="34" charset="0"/>
-              <a:buChar char="•"/>
-            </a:pPr>
-            <a:endParaRPr lang="en-US" sz="1600" i="0" dirty="0">
-              <a:latin typeface="Segoe UI" panose="020B0502040204020203" pitchFamily="34" charset="0"/>
-            </a:endParaRPr>
-          </a:p>
-          <a:p>
-            <a:pPr marL="285750" indent="-285750">
-              <a:buFont typeface="Arial" panose="020B0604020202020204" pitchFamily="34" charset="0"/>
-              <a:buChar char="•"/>
-            </a:pPr>
-            <a:endParaRPr lang="en-US" sz="1600" i="0" dirty="0">
-              <a:latin typeface="Segoe UI" panose="020B0502040204020203" pitchFamily="34" charset="0"/>
-            </a:endParaRPr>
-          </a:p>
         </p:txBody>
       </p:sp>
     </p:spTree>
     <p:extLst>
       <p:ext uri="{BB962C8B-B14F-4D97-AF65-F5344CB8AC3E}">
-        <p14:creationId xmlns:p14="http://schemas.microsoft.com/office/powerpoint/2010/main" val="3408374900"/>
+        <p14:creationId xmlns:p14="http://schemas.microsoft.com/office/powerpoint/2010/main" val="2718584080"/>
       </p:ext>
     </p:extLst>
   </p:cSld>
@@ -14800,6 +13479,2157 @@
         <p:spPr>
           <a:xfrm>
             <a:off x="611560" y="1419622"/>
+            <a:ext cx="8064896" cy="2800767"/>
+          </a:xfrm>
+          <a:prstGeom prst="rect">
+            <a:avLst/>
+          </a:prstGeom>
+          <a:noFill/>
+        </p:spPr>
+        <p:txBody>
+          <a:bodyPr wrap="square" rtlCol="0">
+            <a:spAutoFit/>
+          </a:bodyPr>
+          <a:lstStyle/>
+          <a:p>
+            <a:pPr marL="285750" indent="-285750">
+              <a:buFont typeface="Arial" panose="020B0604020202020204" pitchFamily="34" charset="0"/>
+              <a:buChar char="•"/>
+            </a:pPr>
+            <a:r>
+              <a:rPr lang="de-DE" sz="1600" dirty="0">
+                <a:latin typeface="Segoe UI" panose="020B0502040204020203" pitchFamily="34" charset="0"/>
+              </a:rPr>
+              <a:t>[4] </a:t>
+            </a:r>
+            <a:r>
+              <a:rPr lang="en-US" sz="1600" dirty="0"/>
+              <a:t>Bloom Filter. </a:t>
+            </a:r>
+            <a:r>
+              <a:rPr lang="en-US" sz="1600" i="1" dirty="0"/>
+              <a:t>Brilliant.org</a:t>
+            </a:r>
+            <a:r>
+              <a:rPr lang="en-US" sz="1600" dirty="0"/>
+              <a:t>. Retrieved 18:02, May 12, 2022, from </a:t>
+            </a:r>
+            <a:r>
+              <a:rPr lang="en-US" sz="1600" dirty="0">
+                <a:hlinkClick r:id="rId2"/>
+              </a:rPr>
+              <a:t>https://brilliant.org/wiki/bloom-filter/</a:t>
+            </a:r>
+            <a:endParaRPr lang="en-US" sz="1600" dirty="0"/>
+          </a:p>
+          <a:p>
+            <a:pPr marL="285750" indent="-285750">
+              <a:buFont typeface="Arial" panose="020B0604020202020204" pitchFamily="34" charset="0"/>
+              <a:buChar char="•"/>
+            </a:pPr>
+            <a:r>
+              <a:rPr lang="en-US" sz="1600" i="0" dirty="0">
+                <a:latin typeface="Segoe UI" panose="020B0502040204020203" pitchFamily="34" charset="0"/>
+              </a:rPr>
+              <a:t>[5] </a:t>
+            </a:r>
+            <a:r>
+              <a:rPr lang="en-US" sz="1600" dirty="0">
+                <a:latin typeface="Segoe UI" panose="020B0502040204020203" pitchFamily="34" charset="0"/>
+              </a:rPr>
+              <a:t>Fabio </a:t>
+            </a:r>
+            <a:r>
+              <a:rPr lang="en-US" sz="1600" dirty="0" err="1">
+                <a:latin typeface="Segoe UI" panose="020B0502040204020203" pitchFamily="34" charset="0"/>
+              </a:rPr>
+              <a:t>Grandi</a:t>
+            </a:r>
+            <a:r>
+              <a:rPr lang="en-US" sz="1600" dirty="0">
+                <a:latin typeface="Segoe UI" panose="020B0502040204020203" pitchFamily="34" charset="0"/>
+              </a:rPr>
+              <a:t>. 2018. On the analysis of Bloom filters. </a:t>
+            </a:r>
+            <a:r>
+              <a:rPr lang="en-US" sz="1600" i="1" dirty="0">
+                <a:latin typeface="Segoe UI" panose="020B0502040204020203" pitchFamily="34" charset="0"/>
+              </a:rPr>
+              <a:t>Information Processing Letters</a:t>
+            </a:r>
+            <a:r>
+              <a:rPr lang="en-US" sz="1600" i="0" dirty="0">
+                <a:latin typeface="Segoe UI" panose="020B0502040204020203" pitchFamily="34" charset="0"/>
+              </a:rPr>
+              <a:t> 129, 35–39. DOI: </a:t>
+            </a:r>
+            <a:r>
+              <a:rPr lang="en-US" sz="1600" i="0" dirty="0">
+                <a:latin typeface="Segoe UI" panose="020B0502040204020203" pitchFamily="34" charset="0"/>
+                <a:hlinkClick r:id="rId3"/>
+              </a:rPr>
+              <a:t>https://doi.org/10.1016/j.ipl.2017.09.004</a:t>
+            </a:r>
+            <a:endParaRPr lang="en-US" sz="1600" i="0" dirty="0">
+              <a:latin typeface="Segoe UI" panose="020B0502040204020203" pitchFamily="34" charset="0"/>
+            </a:endParaRPr>
+          </a:p>
+          <a:p>
+            <a:pPr marL="285750" indent="-285750">
+              <a:buFont typeface="Arial" panose="020B0604020202020204" pitchFamily="34" charset="0"/>
+              <a:buChar char="•"/>
+            </a:pPr>
+            <a:r>
+              <a:rPr lang="en-US" sz="1600" dirty="0">
+                <a:latin typeface="Segoe UI" panose="020B0502040204020203" pitchFamily="34" charset="0"/>
+              </a:rPr>
+              <a:t>[6] Nayak, S. and </a:t>
+            </a:r>
+            <a:r>
+              <a:rPr lang="en-US" sz="1600" dirty="0" err="1">
+                <a:latin typeface="Segoe UI" panose="020B0502040204020203" pitchFamily="34" charset="0"/>
+              </a:rPr>
+              <a:t>Patgiri</a:t>
+            </a:r>
+            <a:r>
+              <a:rPr lang="en-US" sz="1600" dirty="0">
+                <a:latin typeface="Segoe UI" panose="020B0502040204020203" pitchFamily="34" charset="0"/>
+              </a:rPr>
+              <a:t>, R. 2021. </a:t>
+            </a:r>
+            <a:r>
+              <a:rPr lang="en-US" sz="1600" i="1" dirty="0" err="1">
+                <a:latin typeface="Segoe UI" panose="020B0502040204020203" pitchFamily="34" charset="0"/>
+              </a:rPr>
+              <a:t>RobustBF</a:t>
+            </a:r>
+            <a:r>
+              <a:rPr lang="en-US" sz="1600" i="1" dirty="0">
+                <a:latin typeface="Segoe UI" panose="020B0502040204020203" pitchFamily="34" charset="0"/>
+              </a:rPr>
+              <a:t>: A High Accuracy and Memory Efficient 2D Bloom Filter</a:t>
+            </a:r>
+            <a:r>
+              <a:rPr lang="en-US" sz="1600" i="0" dirty="0">
+                <a:latin typeface="Segoe UI" panose="020B0502040204020203" pitchFamily="34" charset="0"/>
+              </a:rPr>
+              <a:t>. DOI: https://doi.org/10.48550/arxiv.2106.04365</a:t>
+            </a:r>
+          </a:p>
+          <a:p>
+            <a:pPr marL="285750" indent="-285750">
+              <a:buFont typeface="Arial" panose="020B0604020202020204" pitchFamily="34" charset="0"/>
+              <a:buChar char="•"/>
+            </a:pPr>
+            <a:r>
+              <a:rPr lang="en-US" sz="1600" dirty="0">
+                <a:latin typeface="Segoe UI" panose="020B0502040204020203" pitchFamily="34" charset="0"/>
+              </a:rPr>
+              <a:t>[7] </a:t>
+            </a:r>
+            <a:r>
+              <a:rPr lang="de-DE" sz="1600" dirty="0">
+                <a:latin typeface="Segoe UI" panose="020B0502040204020203" pitchFamily="34" charset="0"/>
+              </a:rPr>
+              <a:t>Fan, L., Cao, P., Almeida, J., and Broder, A. Z. 1998. Summary Cache: A </a:t>
+            </a:r>
+            <a:r>
+              <a:rPr lang="de-DE" sz="1600" dirty="0" err="1">
+                <a:latin typeface="Segoe UI" panose="020B0502040204020203" pitchFamily="34" charset="0"/>
+              </a:rPr>
+              <a:t>Scalable</a:t>
+            </a:r>
+            <a:r>
+              <a:rPr lang="de-DE" sz="1600" dirty="0">
+                <a:latin typeface="Segoe UI" panose="020B0502040204020203" pitchFamily="34" charset="0"/>
+              </a:rPr>
+              <a:t> Wide-Area Web Cache Sharing Protocol. In </a:t>
+            </a:r>
+            <a:r>
+              <a:rPr lang="de-DE" sz="1600" i="1" dirty="0">
+                <a:latin typeface="Segoe UI" panose="020B0502040204020203" pitchFamily="34" charset="0"/>
+              </a:rPr>
+              <a:t>Proceedings </a:t>
+            </a:r>
+            <a:r>
+              <a:rPr lang="de-DE" sz="1600" i="1" dirty="0" err="1">
+                <a:latin typeface="Segoe UI" panose="020B0502040204020203" pitchFamily="34" charset="0"/>
+              </a:rPr>
+              <a:t>of</a:t>
+            </a:r>
+            <a:r>
+              <a:rPr lang="de-DE" sz="1600" i="1" dirty="0">
+                <a:latin typeface="Segoe UI" panose="020B0502040204020203" pitchFamily="34" charset="0"/>
+              </a:rPr>
+              <a:t> </a:t>
+            </a:r>
+            <a:r>
+              <a:rPr lang="de-DE" sz="1600" i="1" dirty="0" err="1">
+                <a:latin typeface="Segoe UI" panose="020B0502040204020203" pitchFamily="34" charset="0"/>
+              </a:rPr>
+              <a:t>the</a:t>
+            </a:r>
+            <a:r>
+              <a:rPr lang="de-DE" sz="1600" i="1" dirty="0">
+                <a:latin typeface="Segoe UI" panose="020B0502040204020203" pitchFamily="34" charset="0"/>
+              </a:rPr>
+              <a:t> ACM SIGCOMM ’98 Conference on </a:t>
+            </a:r>
+            <a:r>
+              <a:rPr lang="de-DE" sz="1600" i="1" dirty="0" err="1">
+                <a:latin typeface="Segoe UI" panose="020B0502040204020203" pitchFamily="34" charset="0"/>
+              </a:rPr>
+              <a:t>Applications</a:t>
+            </a:r>
+            <a:r>
+              <a:rPr lang="de-DE" sz="1600" i="1" dirty="0">
+                <a:latin typeface="Segoe UI" panose="020B0502040204020203" pitchFamily="34" charset="0"/>
+              </a:rPr>
+              <a:t>, Technologies, </a:t>
+            </a:r>
+            <a:r>
+              <a:rPr lang="de-DE" sz="1600" i="1" dirty="0" err="1">
+                <a:latin typeface="Segoe UI" panose="020B0502040204020203" pitchFamily="34" charset="0"/>
+              </a:rPr>
+              <a:t>Architectures</a:t>
+            </a:r>
+            <a:r>
+              <a:rPr lang="de-DE" sz="1600" i="1" dirty="0">
+                <a:latin typeface="Segoe UI" panose="020B0502040204020203" pitchFamily="34" charset="0"/>
+              </a:rPr>
+              <a:t>, and </a:t>
+            </a:r>
+            <a:r>
+              <a:rPr lang="de-DE" sz="1600" i="1" dirty="0" err="1">
+                <a:latin typeface="Segoe UI" panose="020B0502040204020203" pitchFamily="34" charset="0"/>
+              </a:rPr>
+              <a:t>Protocols</a:t>
+            </a:r>
+            <a:r>
+              <a:rPr lang="de-DE" sz="1600" i="1" dirty="0">
+                <a:latin typeface="Segoe UI" panose="020B0502040204020203" pitchFamily="34" charset="0"/>
+              </a:rPr>
+              <a:t> </a:t>
+            </a:r>
+            <a:r>
+              <a:rPr lang="de-DE" sz="1600" i="1" dirty="0" err="1">
+                <a:latin typeface="Segoe UI" panose="020B0502040204020203" pitchFamily="34" charset="0"/>
+              </a:rPr>
+              <a:t>for</a:t>
+            </a:r>
+            <a:r>
+              <a:rPr lang="de-DE" sz="1600" i="1" dirty="0">
+                <a:latin typeface="Segoe UI" panose="020B0502040204020203" pitchFamily="34" charset="0"/>
+              </a:rPr>
+              <a:t> Computer Communication</a:t>
+            </a:r>
+            <a:r>
+              <a:rPr lang="de-DE" sz="1600" i="0" dirty="0">
+                <a:latin typeface="Segoe UI" panose="020B0502040204020203" pitchFamily="34" charset="0"/>
+              </a:rPr>
+              <a:t>. SIGCOMM ’98. </a:t>
+            </a:r>
+            <a:r>
+              <a:rPr lang="de-DE" sz="1600" i="0" dirty="0" err="1">
+                <a:latin typeface="Segoe UI" panose="020B0502040204020203" pitchFamily="34" charset="0"/>
+              </a:rPr>
+              <a:t>Association</a:t>
+            </a:r>
+            <a:r>
+              <a:rPr lang="de-DE" sz="1600" i="0" dirty="0">
+                <a:latin typeface="Segoe UI" panose="020B0502040204020203" pitchFamily="34" charset="0"/>
+              </a:rPr>
+              <a:t> </a:t>
+            </a:r>
+            <a:r>
+              <a:rPr lang="de-DE" sz="1600" i="0" dirty="0" err="1">
+                <a:latin typeface="Segoe UI" panose="020B0502040204020203" pitchFamily="34" charset="0"/>
+              </a:rPr>
+              <a:t>for</a:t>
+            </a:r>
+            <a:r>
+              <a:rPr lang="de-DE" sz="1600" i="0" dirty="0">
+                <a:latin typeface="Segoe UI" panose="020B0502040204020203" pitchFamily="34" charset="0"/>
+              </a:rPr>
+              <a:t> Computing Machinery, New York, NY, USA, 254–265. DOI:</a:t>
+            </a:r>
+            <a:r>
+              <a:rPr lang="en-US" sz="1600" i="0" dirty="0">
+                <a:latin typeface="Segoe UI" panose="020B0502040204020203" pitchFamily="34" charset="0"/>
+              </a:rPr>
+              <a:t> https://doi.org/</a:t>
+            </a:r>
+            <a:r>
+              <a:rPr lang="de-DE" sz="1600" i="0" dirty="0">
+                <a:latin typeface="Segoe UI" panose="020B0502040204020203" pitchFamily="34" charset="0"/>
+              </a:rPr>
+              <a:t>10.1145/285237.285287</a:t>
+            </a:r>
+          </a:p>
+        </p:txBody>
+      </p:sp>
+    </p:spTree>
+    <p:extLst>
+      <p:ext uri="{BB962C8B-B14F-4D97-AF65-F5344CB8AC3E}">
+        <p14:creationId xmlns:p14="http://schemas.microsoft.com/office/powerpoint/2010/main" val="1092689422"/>
+      </p:ext>
+    </p:extLst>
+  </p:cSld>
+  <p:clrMapOvr>
+    <a:masterClrMapping/>
+  </p:clrMapOvr>
+</p:sld>
+</file>
+
+<file path=ppt/slides/slide34.xml><?xml version="1.0" encoding="utf-8"?>
+<p:sld xmlns:a="http://schemas.openxmlformats.org/drawingml/2006/main" xmlns:r="http://schemas.openxmlformats.org/officeDocument/2006/relationships" xmlns:p="http://schemas.openxmlformats.org/presentationml/2006/main">
+  <p:cSld>
+    <p:spTree>
+      <p:nvGrpSpPr>
+        <p:cNvPr id="1" name=""/>
+        <p:cNvGrpSpPr/>
+        <p:nvPr/>
+      </p:nvGrpSpPr>
+      <p:grpSpPr>
+        <a:xfrm>
+          <a:off x="0" y="0"/>
+          <a:ext cx="0" cy="0"/>
+          <a:chOff x="0" y="0"/>
+          <a:chExt cx="0" cy="0"/>
+        </a:xfrm>
+      </p:grpSpPr>
+      <p:sp>
+        <p:nvSpPr>
+          <p:cNvPr id="6" name="Foliennummernplatzhalter 5"/>
+          <p:cNvSpPr>
+            <a:spLocks noGrp="1"/>
+          </p:cNvSpPr>
+          <p:nvPr>
+            <p:ph type="sldNum" sz="quarter" idx="4"/>
+          </p:nvPr>
+        </p:nvSpPr>
+        <p:spPr/>
+        <p:txBody>
+          <a:bodyPr/>
+          <a:lstStyle/>
+          <a:p>
+            <a:fld id="{F9CA7F02-FF28-4D8F-AF3B-6C950C783A54}" type="slidenum">
+              <a:rPr lang="de-DE" smtClean="0"/>
+              <a:pPr/>
+              <a:t>34</a:t>
+            </a:fld>
+            <a:endParaRPr lang="de-DE"/>
+          </a:p>
+        </p:txBody>
+      </p:sp>
+      <p:sp>
+        <p:nvSpPr>
+          <p:cNvPr id="3" name="Titel 2"/>
+          <p:cNvSpPr>
+            <a:spLocks noGrp="1"/>
+          </p:cNvSpPr>
+          <p:nvPr>
+            <p:ph type="title"/>
+          </p:nvPr>
+        </p:nvSpPr>
+        <p:spPr/>
+        <p:txBody>
+          <a:bodyPr/>
+          <a:lstStyle/>
+          <a:p>
+            <a:r>
+              <a:rPr lang="de-DE" dirty="0"/>
+              <a:t>BLOOM-FILTER</a:t>
+            </a:r>
+          </a:p>
+        </p:txBody>
+      </p:sp>
+      <p:sp>
+        <p:nvSpPr>
+          <p:cNvPr id="4" name="Inhaltsplatzhalter 3"/>
+          <p:cNvSpPr>
+            <a:spLocks noGrp="1"/>
+          </p:cNvSpPr>
+          <p:nvPr>
+            <p:ph sz="quarter" idx="13"/>
+          </p:nvPr>
+        </p:nvSpPr>
+        <p:spPr>
+          <a:xfrm>
+            <a:off x="936000" y="699542"/>
+            <a:ext cx="7308000" cy="429622"/>
+          </a:xfrm>
+        </p:spPr>
+        <p:txBody>
+          <a:bodyPr/>
+          <a:lstStyle/>
+          <a:p>
+            <a:r>
+              <a:rPr lang="de-DE" dirty="0"/>
+              <a:t>Quellen</a:t>
+            </a:r>
+          </a:p>
+        </p:txBody>
+      </p:sp>
+      <p:sp>
+        <p:nvSpPr>
+          <p:cNvPr id="7" name="Fußzeilenplatzhalter 6"/>
+          <p:cNvSpPr>
+            <a:spLocks noGrp="1"/>
+          </p:cNvSpPr>
+          <p:nvPr>
+            <p:ph type="ftr" sz="quarter" idx="3"/>
+          </p:nvPr>
+        </p:nvSpPr>
+        <p:spPr/>
+        <p:txBody>
+          <a:bodyPr/>
+          <a:lstStyle/>
+          <a:p>
+            <a:r>
+              <a:rPr lang="de-DE" dirty="0"/>
+              <a:t>TU Bergakademie Freiberg | Vortragender: Florian Schierz | 2022</a:t>
+            </a:r>
+          </a:p>
+        </p:txBody>
+      </p:sp>
+      <p:sp>
+        <p:nvSpPr>
+          <p:cNvPr id="11" name="Textfeld 10">
+            <a:extLst>
+              <a:ext uri="{FF2B5EF4-FFF2-40B4-BE49-F238E27FC236}">
+                <a16:creationId xmlns:a16="http://schemas.microsoft.com/office/drawing/2014/main" id="{AED7FCD8-3C56-4B11-ADA2-B181B3B96684}"/>
+              </a:ext>
+            </a:extLst>
+          </p:cNvPr>
+          <p:cNvSpPr txBox="1"/>
+          <p:nvPr/>
+        </p:nvSpPr>
+        <p:spPr>
+          <a:xfrm>
+            <a:off x="611560" y="1419622"/>
+            <a:ext cx="8064896" cy="2554545"/>
+          </a:xfrm>
+          <a:prstGeom prst="rect">
+            <a:avLst/>
+          </a:prstGeom>
+          <a:noFill/>
+        </p:spPr>
+        <p:txBody>
+          <a:bodyPr wrap="square" rtlCol="0">
+            <a:spAutoFit/>
+          </a:bodyPr>
+          <a:lstStyle/>
+          <a:p>
+            <a:pPr marL="285750" indent="-285750">
+              <a:buFont typeface="Arial" panose="020B0604020202020204" pitchFamily="34" charset="0"/>
+              <a:buChar char="•"/>
+            </a:pPr>
+            <a:r>
+              <a:rPr lang="en-US" sz="1600" dirty="0">
+                <a:latin typeface="Segoe UI" panose="020B0502040204020203" pitchFamily="34" charset="0"/>
+              </a:rPr>
+              <a:t>[8] </a:t>
+            </a:r>
+            <a:r>
+              <a:rPr lang="de-DE" sz="1600" dirty="0">
+                <a:latin typeface="Segoe UI" panose="020B0502040204020203" pitchFamily="34" charset="0"/>
+              </a:rPr>
+              <a:t>Rottenstreich Ori, </a:t>
+            </a:r>
+            <a:r>
+              <a:rPr lang="de-DE" sz="1600" dirty="0" err="1">
+                <a:latin typeface="Segoe UI" panose="020B0502040204020203" pitchFamily="34" charset="0"/>
+              </a:rPr>
+              <a:t>Kanizo</a:t>
+            </a:r>
+            <a:r>
+              <a:rPr lang="de-DE" sz="1600" dirty="0">
+                <a:latin typeface="Segoe UI" panose="020B0502040204020203" pitchFamily="34" charset="0"/>
+              </a:rPr>
+              <a:t> Yossi, and </a:t>
+            </a:r>
+            <a:r>
+              <a:rPr lang="de-DE" sz="1600" dirty="0" err="1">
+                <a:latin typeface="Segoe UI" panose="020B0502040204020203" pitchFamily="34" charset="0"/>
+              </a:rPr>
+              <a:t>Keslassy</a:t>
+            </a:r>
+            <a:r>
+              <a:rPr lang="de-DE" sz="1600" dirty="0">
+                <a:latin typeface="Segoe UI" panose="020B0502040204020203" pitchFamily="34" charset="0"/>
+              </a:rPr>
+              <a:t> Isaac. 2014. The Variable-</a:t>
+            </a:r>
+            <a:r>
+              <a:rPr lang="de-DE" sz="1600" dirty="0" err="1">
+                <a:latin typeface="Segoe UI" panose="020B0502040204020203" pitchFamily="34" charset="0"/>
+              </a:rPr>
+              <a:t>Increment</a:t>
+            </a:r>
+            <a:r>
+              <a:rPr lang="de-DE" sz="1600" dirty="0">
+                <a:latin typeface="Segoe UI" panose="020B0502040204020203" pitchFamily="34" charset="0"/>
+              </a:rPr>
+              <a:t> </a:t>
+            </a:r>
+            <a:r>
+              <a:rPr lang="de-DE" sz="1600" dirty="0" err="1">
+                <a:latin typeface="Segoe UI" panose="020B0502040204020203" pitchFamily="34" charset="0"/>
+              </a:rPr>
+              <a:t>Counting</a:t>
+            </a:r>
+            <a:r>
+              <a:rPr lang="de-DE" sz="1600" dirty="0">
+                <a:latin typeface="Segoe UI" panose="020B0502040204020203" pitchFamily="34" charset="0"/>
+              </a:rPr>
+              <a:t> Bloom Filter. </a:t>
+            </a:r>
+            <a:r>
+              <a:rPr lang="de-DE" sz="1600" i="1" dirty="0">
+                <a:latin typeface="Segoe UI" panose="020B0502040204020203" pitchFamily="34" charset="0"/>
+              </a:rPr>
+              <a:t>IEEE/ACM Trans. Networking</a:t>
+            </a:r>
+            <a:r>
+              <a:rPr lang="de-DE" sz="1600" i="0" dirty="0">
+                <a:latin typeface="Segoe UI" panose="020B0502040204020203" pitchFamily="34" charset="0"/>
+              </a:rPr>
+              <a:t> 22, 4, 1092–1105. DOI: </a:t>
+            </a:r>
+            <a:r>
+              <a:rPr lang="de-DE" sz="1600" i="0" dirty="0">
+                <a:latin typeface="Segoe UI" panose="020B0502040204020203" pitchFamily="34" charset="0"/>
+                <a:hlinkClick r:id="rId2"/>
+              </a:rPr>
+              <a:t>https://doi.org/</a:t>
+            </a:r>
+            <a:r>
+              <a:rPr lang="de-DE" sz="1600" dirty="0">
+                <a:hlinkClick r:id="rId2"/>
+              </a:rPr>
+              <a:t>10.1109/TNET.2013.2272604</a:t>
+            </a:r>
+            <a:endParaRPr lang="de-DE" sz="1600" dirty="0"/>
+          </a:p>
+          <a:p>
+            <a:pPr marL="285750" indent="-285750">
+              <a:buFont typeface="Arial" panose="020B0604020202020204" pitchFamily="34" charset="0"/>
+              <a:buChar char="•"/>
+            </a:pPr>
+            <a:r>
+              <a:rPr lang="en-US" sz="1600" dirty="0">
+                <a:latin typeface="Segoe UI" panose="020B0502040204020203" pitchFamily="34" charset="0"/>
+              </a:rPr>
+              <a:t>[9] Rothenberg, C., </a:t>
+            </a:r>
+            <a:r>
+              <a:rPr lang="en-US" sz="1600" dirty="0" err="1">
+                <a:latin typeface="Segoe UI" panose="020B0502040204020203" pitchFamily="34" charset="0"/>
+              </a:rPr>
+              <a:t>Macapuna</a:t>
+            </a:r>
+            <a:r>
+              <a:rPr lang="en-US" sz="1600" dirty="0">
+                <a:latin typeface="Segoe UI" panose="020B0502040204020203" pitchFamily="34" charset="0"/>
+              </a:rPr>
+              <a:t>, C., Verdi, F., and </a:t>
+            </a:r>
+            <a:r>
+              <a:rPr lang="en-US" sz="1600" dirty="0" err="1">
+                <a:latin typeface="Segoe UI" panose="020B0502040204020203" pitchFamily="34" charset="0"/>
+              </a:rPr>
+              <a:t>Magalhaes</a:t>
+            </a:r>
+            <a:r>
+              <a:rPr lang="en-US" sz="1600" dirty="0">
+                <a:latin typeface="Segoe UI" panose="020B0502040204020203" pitchFamily="34" charset="0"/>
+              </a:rPr>
+              <a:t>, M. 2010. The </a:t>
+            </a:r>
+            <a:r>
+              <a:rPr lang="en-US" sz="1600" dirty="0" err="1">
+                <a:latin typeface="Segoe UI" panose="020B0502040204020203" pitchFamily="34" charset="0"/>
+              </a:rPr>
+              <a:t>deletable</a:t>
+            </a:r>
+            <a:r>
+              <a:rPr lang="en-US" sz="1600" dirty="0">
+                <a:latin typeface="Segoe UI" panose="020B0502040204020203" pitchFamily="34" charset="0"/>
+              </a:rPr>
+              <a:t> Bloom filter: a new member of the Bloom family. </a:t>
+            </a:r>
+            <a:r>
+              <a:rPr lang="en-US" sz="1600" i="1" dirty="0">
+                <a:latin typeface="Segoe UI" panose="020B0502040204020203" pitchFamily="34" charset="0"/>
+              </a:rPr>
+              <a:t>IEEE </a:t>
+            </a:r>
+            <a:r>
+              <a:rPr lang="en-US" sz="1600" i="1" dirty="0" err="1">
+                <a:latin typeface="Segoe UI" panose="020B0502040204020203" pitchFamily="34" charset="0"/>
+              </a:rPr>
+              <a:t>Commun</a:t>
+            </a:r>
+            <a:r>
+              <a:rPr lang="en-US" sz="1600" i="1" dirty="0">
+                <a:latin typeface="Segoe UI" panose="020B0502040204020203" pitchFamily="34" charset="0"/>
+              </a:rPr>
+              <a:t>. Lett.</a:t>
+            </a:r>
+            <a:r>
+              <a:rPr lang="en-US" sz="1600" i="0" dirty="0">
+                <a:latin typeface="Segoe UI" panose="020B0502040204020203" pitchFamily="34" charset="0"/>
+              </a:rPr>
+              <a:t> 14, 6, 557–559. DOI: </a:t>
+            </a:r>
+            <a:r>
+              <a:rPr lang="en-US" sz="1600" i="0" dirty="0">
+                <a:latin typeface="Segoe UI" panose="020B0502040204020203" pitchFamily="34" charset="0"/>
+                <a:hlinkClick r:id="rId3"/>
+              </a:rPr>
+              <a:t>https://</a:t>
+            </a:r>
+            <a:r>
+              <a:rPr lang="de-DE" sz="1600" i="0" dirty="0">
+                <a:latin typeface="Segoe UI" panose="020B0502040204020203" pitchFamily="34" charset="0"/>
+                <a:hlinkClick r:id="rId3"/>
+              </a:rPr>
+              <a:t>doi.org/</a:t>
+            </a:r>
+            <a:r>
+              <a:rPr lang="de-DE" sz="1600" dirty="0">
+                <a:hlinkClick r:id="rId3"/>
+              </a:rPr>
+              <a:t>10.1109/LCOMM.2010.06.100344</a:t>
+            </a:r>
+            <a:endParaRPr lang="de-DE" sz="1600" dirty="0"/>
+          </a:p>
+          <a:p>
+            <a:pPr marL="285750" indent="-285750">
+              <a:buFont typeface="Arial" panose="020B0604020202020204" pitchFamily="34" charset="0"/>
+              <a:buChar char="•"/>
+            </a:pPr>
+            <a:r>
+              <a:rPr lang="de-DE" sz="1600" dirty="0">
+                <a:latin typeface="Segoe UI" panose="020B0502040204020203" pitchFamily="34" charset="0"/>
+              </a:rPr>
+              <a:t>[10] </a:t>
+            </a:r>
+            <a:r>
+              <a:rPr lang="en-US" sz="1600" dirty="0">
+                <a:latin typeface="Segoe UI" panose="020B0502040204020203" pitchFamily="34" charset="0"/>
+              </a:rPr>
+              <a:t>Rhea S.C. and </a:t>
+            </a:r>
+            <a:r>
+              <a:rPr lang="en-US" sz="1600" dirty="0" err="1">
+                <a:latin typeface="Segoe UI" panose="020B0502040204020203" pitchFamily="34" charset="0"/>
+              </a:rPr>
+              <a:t>Kubiatowicz</a:t>
+            </a:r>
+            <a:r>
+              <a:rPr lang="en-US" sz="1600" dirty="0">
+                <a:latin typeface="Segoe UI" panose="020B0502040204020203" pitchFamily="34" charset="0"/>
+              </a:rPr>
+              <a:t> J. 2002. Probabilistic location and routing. In </a:t>
+            </a:r>
+            <a:r>
+              <a:rPr lang="en-US" sz="1600" i="1" dirty="0" err="1">
+                <a:latin typeface="Segoe UI" panose="020B0502040204020203" pitchFamily="34" charset="0"/>
+              </a:rPr>
+              <a:t>Proceedings.Twenty</a:t>
+            </a:r>
+            <a:r>
+              <a:rPr lang="en-US" sz="1600" i="1" dirty="0">
+                <a:latin typeface="Segoe UI" panose="020B0502040204020203" pitchFamily="34" charset="0"/>
+              </a:rPr>
+              <a:t>-First Annual Joint Conference of the IEEE Computer and Communications Societies</a:t>
+            </a:r>
+            <a:r>
+              <a:rPr lang="en-US" sz="1600" i="0" dirty="0">
+                <a:latin typeface="Segoe UI" panose="020B0502040204020203" pitchFamily="34" charset="0"/>
+              </a:rPr>
+              <a:t>, 1248-1257 vol.3. DOI: </a:t>
+            </a:r>
+            <a:r>
+              <a:rPr lang="en-US" sz="1600" dirty="0">
+                <a:latin typeface="Segoe UI" panose="020B0502040204020203" pitchFamily="34" charset="0"/>
+                <a:hlinkClick r:id="rId4"/>
+              </a:rPr>
+              <a:t>https://</a:t>
+            </a:r>
+            <a:r>
+              <a:rPr lang="de-DE" sz="1600" dirty="0">
+                <a:latin typeface="Segoe UI" panose="020B0502040204020203" pitchFamily="34" charset="0"/>
+                <a:hlinkClick r:id="rId4"/>
+              </a:rPr>
+              <a:t>doi.org/</a:t>
+            </a:r>
+            <a:r>
+              <a:rPr lang="en-US" sz="1600" i="0" dirty="0">
+                <a:latin typeface="Segoe UI" panose="020B0502040204020203" pitchFamily="34" charset="0"/>
+                <a:hlinkClick r:id="rId4"/>
+              </a:rPr>
+              <a:t>10.1109/INFCOM.2002.1019375</a:t>
+            </a:r>
+            <a:endParaRPr lang="en-US" sz="1600" i="0" dirty="0">
+              <a:latin typeface="Segoe UI" panose="020B0502040204020203" pitchFamily="34" charset="0"/>
+            </a:endParaRPr>
+          </a:p>
+        </p:txBody>
+      </p:sp>
+    </p:spTree>
+    <p:extLst>
+      <p:ext uri="{BB962C8B-B14F-4D97-AF65-F5344CB8AC3E}">
+        <p14:creationId xmlns:p14="http://schemas.microsoft.com/office/powerpoint/2010/main" val="2790701121"/>
+      </p:ext>
+    </p:extLst>
+  </p:cSld>
+  <p:clrMapOvr>
+    <a:masterClrMapping/>
+  </p:clrMapOvr>
+</p:sld>
+</file>
+
+<file path=ppt/slides/slide35.xml><?xml version="1.0" encoding="utf-8"?>
+<p:sld xmlns:a="http://schemas.openxmlformats.org/drawingml/2006/main" xmlns:r="http://schemas.openxmlformats.org/officeDocument/2006/relationships" xmlns:p="http://schemas.openxmlformats.org/presentationml/2006/main">
+  <p:cSld>
+    <p:spTree>
+      <p:nvGrpSpPr>
+        <p:cNvPr id="1" name=""/>
+        <p:cNvGrpSpPr/>
+        <p:nvPr/>
+      </p:nvGrpSpPr>
+      <p:grpSpPr>
+        <a:xfrm>
+          <a:off x="0" y="0"/>
+          <a:ext cx="0" cy="0"/>
+          <a:chOff x="0" y="0"/>
+          <a:chExt cx="0" cy="0"/>
+        </a:xfrm>
+      </p:grpSpPr>
+      <p:sp>
+        <p:nvSpPr>
+          <p:cNvPr id="6" name="Foliennummernplatzhalter 5"/>
+          <p:cNvSpPr>
+            <a:spLocks noGrp="1"/>
+          </p:cNvSpPr>
+          <p:nvPr>
+            <p:ph type="sldNum" sz="quarter" idx="4"/>
+          </p:nvPr>
+        </p:nvSpPr>
+        <p:spPr/>
+        <p:txBody>
+          <a:bodyPr/>
+          <a:lstStyle/>
+          <a:p>
+            <a:fld id="{F9CA7F02-FF28-4D8F-AF3B-6C950C783A54}" type="slidenum">
+              <a:rPr lang="de-DE" smtClean="0"/>
+              <a:pPr/>
+              <a:t>35</a:t>
+            </a:fld>
+            <a:endParaRPr lang="de-DE"/>
+          </a:p>
+        </p:txBody>
+      </p:sp>
+      <p:sp>
+        <p:nvSpPr>
+          <p:cNvPr id="3" name="Titel 2"/>
+          <p:cNvSpPr>
+            <a:spLocks noGrp="1"/>
+          </p:cNvSpPr>
+          <p:nvPr>
+            <p:ph type="title"/>
+          </p:nvPr>
+        </p:nvSpPr>
+        <p:spPr/>
+        <p:txBody>
+          <a:bodyPr/>
+          <a:lstStyle/>
+          <a:p>
+            <a:r>
+              <a:rPr lang="de-DE" dirty="0"/>
+              <a:t>BLOOM-FILTER</a:t>
+            </a:r>
+          </a:p>
+        </p:txBody>
+      </p:sp>
+      <p:sp>
+        <p:nvSpPr>
+          <p:cNvPr id="4" name="Inhaltsplatzhalter 3"/>
+          <p:cNvSpPr>
+            <a:spLocks noGrp="1"/>
+          </p:cNvSpPr>
+          <p:nvPr>
+            <p:ph sz="quarter" idx="13"/>
+          </p:nvPr>
+        </p:nvSpPr>
+        <p:spPr>
+          <a:xfrm>
+            <a:off x="936000" y="699542"/>
+            <a:ext cx="7308000" cy="429622"/>
+          </a:xfrm>
+        </p:spPr>
+        <p:txBody>
+          <a:bodyPr/>
+          <a:lstStyle/>
+          <a:p>
+            <a:r>
+              <a:rPr lang="de-DE" dirty="0"/>
+              <a:t>Quellen</a:t>
+            </a:r>
+          </a:p>
+        </p:txBody>
+      </p:sp>
+      <p:sp>
+        <p:nvSpPr>
+          <p:cNvPr id="7" name="Fußzeilenplatzhalter 6"/>
+          <p:cNvSpPr>
+            <a:spLocks noGrp="1"/>
+          </p:cNvSpPr>
+          <p:nvPr>
+            <p:ph type="ftr" sz="quarter" idx="3"/>
+          </p:nvPr>
+        </p:nvSpPr>
+        <p:spPr/>
+        <p:txBody>
+          <a:bodyPr/>
+          <a:lstStyle/>
+          <a:p>
+            <a:r>
+              <a:rPr lang="de-DE" dirty="0"/>
+              <a:t>TU Bergakademie Freiberg | Vortragender: Florian Schierz | 2022</a:t>
+            </a:r>
+          </a:p>
+        </p:txBody>
+      </p:sp>
+      <p:sp>
+        <p:nvSpPr>
+          <p:cNvPr id="11" name="Textfeld 10">
+            <a:extLst>
+              <a:ext uri="{FF2B5EF4-FFF2-40B4-BE49-F238E27FC236}">
+                <a16:creationId xmlns:a16="http://schemas.microsoft.com/office/drawing/2014/main" id="{AED7FCD8-3C56-4B11-ADA2-B181B3B96684}"/>
+              </a:ext>
+            </a:extLst>
+          </p:cNvPr>
+          <p:cNvSpPr txBox="1"/>
+          <p:nvPr/>
+        </p:nvSpPr>
+        <p:spPr>
+          <a:xfrm>
+            <a:off x="611560" y="1419622"/>
+            <a:ext cx="8064896" cy="4339650"/>
+          </a:xfrm>
+          <a:prstGeom prst="rect">
+            <a:avLst/>
+          </a:prstGeom>
+          <a:noFill/>
+        </p:spPr>
+        <p:txBody>
+          <a:bodyPr wrap="square" rtlCol="0">
+            <a:spAutoFit/>
+          </a:bodyPr>
+          <a:lstStyle/>
+          <a:p>
+            <a:pPr marL="285750" indent="-285750">
+              <a:buFont typeface="Arial" panose="020B0604020202020204" pitchFamily="34" charset="0"/>
+              <a:buChar char="•"/>
+            </a:pPr>
+            <a:r>
+              <a:rPr lang="en-US" sz="1600" dirty="0">
+                <a:latin typeface="Segoe UI" panose="020B0502040204020203" pitchFamily="34" charset="0"/>
+              </a:rPr>
+              <a:t>[11] Whitaker A. and </a:t>
+            </a:r>
+            <a:r>
+              <a:rPr lang="en-US" sz="1600" dirty="0" err="1">
+                <a:latin typeface="Segoe UI" panose="020B0502040204020203" pitchFamily="34" charset="0"/>
+              </a:rPr>
+              <a:t>Wetherall</a:t>
+            </a:r>
+            <a:r>
+              <a:rPr lang="en-US" sz="1600" dirty="0">
+                <a:latin typeface="Segoe UI" panose="020B0502040204020203" pitchFamily="34" charset="0"/>
+              </a:rPr>
+              <a:t> D. 2002. Forwarding without loops in Icarus. In </a:t>
+            </a:r>
+            <a:r>
+              <a:rPr lang="en-US" sz="1600" i="1" dirty="0">
+                <a:latin typeface="Segoe UI" panose="020B0502040204020203" pitchFamily="34" charset="0"/>
+              </a:rPr>
+              <a:t>2002 IEEE Open Architectures and Network Programming Proceedings. OPENARCH 2002 (Cat. No.02EX571)</a:t>
+            </a:r>
+            <a:r>
+              <a:rPr lang="en-US" sz="1600" i="0" dirty="0">
+                <a:latin typeface="Segoe UI" panose="020B0502040204020203" pitchFamily="34" charset="0"/>
+              </a:rPr>
+              <a:t>, 63–75. DOI: </a:t>
+            </a:r>
+            <a:r>
+              <a:rPr lang="en-US" sz="1600" dirty="0">
+                <a:latin typeface="Segoe UI" panose="020B0502040204020203" pitchFamily="34" charset="0"/>
+                <a:hlinkClick r:id="rId2"/>
+              </a:rPr>
+              <a:t>https://</a:t>
+            </a:r>
+            <a:r>
+              <a:rPr lang="de-DE" sz="1600" dirty="0">
+                <a:latin typeface="Segoe UI" panose="020B0502040204020203" pitchFamily="34" charset="0"/>
+                <a:hlinkClick r:id="rId2"/>
+              </a:rPr>
+              <a:t>doi.org/</a:t>
+            </a:r>
+            <a:r>
+              <a:rPr lang="en-US" sz="1600" i="0" dirty="0">
+                <a:latin typeface="Segoe UI" panose="020B0502040204020203" pitchFamily="34" charset="0"/>
+                <a:hlinkClick r:id="rId2"/>
+              </a:rPr>
+              <a:t>10.1109/OPNARC.2002.1019229</a:t>
+            </a:r>
+            <a:endParaRPr lang="en-US" sz="1600" i="0" dirty="0">
+              <a:latin typeface="Segoe UI" panose="020B0502040204020203" pitchFamily="34" charset="0"/>
+            </a:endParaRPr>
+          </a:p>
+          <a:p>
+            <a:pPr marL="285750" indent="-285750">
+              <a:buFont typeface="Arial" panose="020B0604020202020204" pitchFamily="34" charset="0"/>
+              <a:buChar char="•"/>
+            </a:pPr>
+            <a:r>
+              <a:rPr lang="de-DE" sz="1600" dirty="0">
+                <a:latin typeface="Segoe UI" panose="020B0502040204020203" pitchFamily="34" charset="0"/>
+              </a:rPr>
+              <a:t>[12] Laufer Rafael P., </a:t>
+            </a:r>
+            <a:r>
+              <a:rPr lang="de-DE" sz="1600" dirty="0" err="1">
+                <a:latin typeface="Segoe UI" panose="020B0502040204020203" pitchFamily="34" charset="0"/>
+              </a:rPr>
+              <a:t>Velloso</a:t>
+            </a:r>
+            <a:r>
+              <a:rPr lang="de-DE" sz="1600" dirty="0">
+                <a:latin typeface="Segoe UI" panose="020B0502040204020203" pitchFamily="34" charset="0"/>
+              </a:rPr>
+              <a:t> Pedro B., Cunha Daniel de O., </a:t>
+            </a:r>
+            <a:r>
+              <a:rPr lang="de-DE" sz="1600" dirty="0" err="1">
+                <a:latin typeface="Segoe UI" panose="020B0502040204020203" pitchFamily="34" charset="0"/>
+              </a:rPr>
+              <a:t>Moraes</a:t>
+            </a:r>
+            <a:r>
+              <a:rPr lang="de-DE" sz="1600" dirty="0">
+                <a:latin typeface="Segoe UI" panose="020B0502040204020203" pitchFamily="34" charset="0"/>
+              </a:rPr>
+              <a:t> Igor M., </a:t>
+            </a:r>
+            <a:r>
+              <a:rPr lang="de-DE" sz="1600" dirty="0" err="1">
+                <a:latin typeface="Segoe UI" panose="020B0502040204020203" pitchFamily="34" charset="0"/>
+              </a:rPr>
+              <a:t>Bicudo</a:t>
+            </a:r>
+            <a:r>
+              <a:rPr lang="de-DE" sz="1600" dirty="0">
+                <a:latin typeface="Segoe UI" panose="020B0502040204020203" pitchFamily="34" charset="0"/>
+              </a:rPr>
+              <a:t> Marco D.D., Moreira Marcelo D.D., and Duarte Otto Carlos M.B. 2007. </a:t>
+            </a:r>
+            <a:r>
+              <a:rPr lang="de-DE" sz="1600" dirty="0" err="1">
+                <a:latin typeface="Segoe UI" panose="020B0502040204020203" pitchFamily="34" charset="0"/>
+              </a:rPr>
+              <a:t>Towards</a:t>
+            </a:r>
+            <a:r>
+              <a:rPr lang="de-DE" sz="1600" dirty="0">
+                <a:latin typeface="Segoe UI" panose="020B0502040204020203" pitchFamily="34" charset="0"/>
+              </a:rPr>
+              <a:t> </a:t>
+            </a:r>
+            <a:r>
+              <a:rPr lang="de-DE" sz="1600" dirty="0" err="1">
+                <a:latin typeface="Segoe UI" panose="020B0502040204020203" pitchFamily="34" charset="0"/>
+              </a:rPr>
+              <a:t>Stateless</a:t>
+            </a:r>
+            <a:r>
+              <a:rPr lang="de-DE" sz="1600" dirty="0">
+                <a:latin typeface="Segoe UI" panose="020B0502040204020203" pitchFamily="34" charset="0"/>
+              </a:rPr>
+              <a:t> Single-Packet IP </a:t>
+            </a:r>
+            <a:r>
+              <a:rPr lang="de-DE" sz="1600" dirty="0" err="1">
+                <a:latin typeface="Segoe UI" panose="020B0502040204020203" pitchFamily="34" charset="0"/>
+              </a:rPr>
+              <a:t>Traceback</a:t>
+            </a:r>
+            <a:r>
+              <a:rPr lang="de-DE" sz="1600" dirty="0">
+                <a:latin typeface="Segoe UI" panose="020B0502040204020203" pitchFamily="34" charset="0"/>
+              </a:rPr>
+              <a:t>. In </a:t>
+            </a:r>
+            <a:r>
+              <a:rPr lang="de-DE" sz="1600" i="1" dirty="0">
+                <a:latin typeface="Segoe UI" panose="020B0502040204020203" pitchFamily="34" charset="0"/>
+              </a:rPr>
+              <a:t>32nd IEEE Conference on </a:t>
+            </a:r>
+            <a:r>
+              <a:rPr lang="de-DE" sz="1600" i="1" dirty="0" err="1">
+                <a:latin typeface="Segoe UI" panose="020B0502040204020203" pitchFamily="34" charset="0"/>
+              </a:rPr>
+              <a:t>Local</a:t>
+            </a:r>
+            <a:r>
+              <a:rPr lang="de-DE" sz="1600" i="1" dirty="0">
+                <a:latin typeface="Segoe UI" panose="020B0502040204020203" pitchFamily="34" charset="0"/>
+              </a:rPr>
+              <a:t> Computer Networks (LCN 2007)</a:t>
+            </a:r>
+            <a:r>
+              <a:rPr lang="de-DE" sz="1600" i="0" dirty="0">
+                <a:latin typeface="Segoe UI" panose="020B0502040204020203" pitchFamily="34" charset="0"/>
+              </a:rPr>
+              <a:t>, 548–555. DOI: </a:t>
+            </a:r>
+            <a:r>
+              <a:rPr lang="en-US" sz="1600" dirty="0">
+                <a:latin typeface="Segoe UI" panose="020B0502040204020203" pitchFamily="34" charset="0"/>
+                <a:hlinkClick r:id="rId3"/>
+              </a:rPr>
+              <a:t>https://</a:t>
+            </a:r>
+            <a:r>
+              <a:rPr lang="de-DE" sz="1600" dirty="0">
+                <a:latin typeface="Segoe UI" panose="020B0502040204020203" pitchFamily="34" charset="0"/>
+                <a:hlinkClick r:id="rId3"/>
+              </a:rPr>
+              <a:t>doi.org/</a:t>
+            </a:r>
+            <a:r>
+              <a:rPr lang="de-DE" sz="1600" i="0" dirty="0">
+                <a:latin typeface="Segoe UI" panose="020B0502040204020203" pitchFamily="34" charset="0"/>
+                <a:hlinkClick r:id="rId3"/>
+              </a:rPr>
+              <a:t>10.1109/LCN.2007.15</a:t>
+            </a:r>
+            <a:endParaRPr lang="de-DE" sz="1600" i="0" dirty="0">
+              <a:latin typeface="Segoe UI" panose="020B0502040204020203" pitchFamily="34" charset="0"/>
+            </a:endParaRPr>
+          </a:p>
+          <a:p>
+            <a:pPr marL="285750" indent="-285750">
+              <a:buFont typeface="Arial" panose="020B0604020202020204" pitchFamily="34" charset="0"/>
+              <a:buChar char="•"/>
+            </a:pPr>
+            <a:r>
+              <a:rPr lang="de-DE" sz="1600" dirty="0">
+                <a:latin typeface="Segoe UI" panose="020B0502040204020203" pitchFamily="34" charset="0"/>
+                <a:cs typeface="Segoe UI" panose="020B0502040204020203" pitchFamily="34" charset="0"/>
+              </a:rPr>
+              <a:t>[13] </a:t>
+            </a:r>
+            <a:r>
+              <a:rPr lang="en-US" sz="1600" dirty="0">
+                <a:latin typeface="Segoe UI" panose="020B0502040204020203" pitchFamily="34" charset="0"/>
+                <a:cs typeface="Segoe UI" panose="020B0502040204020203" pitchFamily="34" charset="0"/>
+              </a:rPr>
+              <a:t>Wang, J. 1999. A Survey of Web Caching Schemes for the Internet. </a:t>
+            </a:r>
+            <a:r>
+              <a:rPr lang="en-US" sz="1600" i="1" dirty="0">
+                <a:latin typeface="Segoe UI" panose="020B0502040204020203" pitchFamily="34" charset="0"/>
+                <a:cs typeface="Segoe UI" panose="020B0502040204020203" pitchFamily="34" charset="0"/>
+              </a:rPr>
+              <a:t>SIGCOMM </a:t>
+            </a:r>
+            <a:r>
+              <a:rPr lang="en-US" sz="1600" i="1" dirty="0" err="1">
+                <a:latin typeface="Segoe UI" panose="020B0502040204020203" pitchFamily="34" charset="0"/>
+                <a:cs typeface="Segoe UI" panose="020B0502040204020203" pitchFamily="34" charset="0"/>
+              </a:rPr>
+              <a:t>Comput</a:t>
+            </a:r>
+            <a:r>
+              <a:rPr lang="en-US" sz="1600" i="1" dirty="0">
+                <a:latin typeface="Segoe UI" panose="020B0502040204020203" pitchFamily="34" charset="0"/>
+                <a:cs typeface="Segoe UI" panose="020B0502040204020203" pitchFamily="34" charset="0"/>
+              </a:rPr>
+              <a:t>. </a:t>
+            </a:r>
+            <a:r>
+              <a:rPr lang="en-US" sz="1600" i="1" dirty="0" err="1">
+                <a:latin typeface="Segoe UI" panose="020B0502040204020203" pitchFamily="34" charset="0"/>
+                <a:cs typeface="Segoe UI" panose="020B0502040204020203" pitchFamily="34" charset="0"/>
+              </a:rPr>
+              <a:t>Commun</a:t>
+            </a:r>
+            <a:r>
+              <a:rPr lang="en-US" sz="1600" i="1" dirty="0">
+                <a:latin typeface="Segoe UI" panose="020B0502040204020203" pitchFamily="34" charset="0"/>
+                <a:cs typeface="Segoe UI" panose="020B0502040204020203" pitchFamily="34" charset="0"/>
+              </a:rPr>
+              <a:t>. Rev.</a:t>
+            </a:r>
+            <a:r>
+              <a:rPr lang="en-US" sz="1600" i="0" dirty="0">
+                <a:latin typeface="Segoe UI" panose="020B0502040204020203" pitchFamily="34" charset="0"/>
+                <a:cs typeface="Segoe UI" panose="020B0502040204020203" pitchFamily="34" charset="0"/>
+              </a:rPr>
+              <a:t> 29, 5, 36–46. DOI: </a:t>
+            </a:r>
+            <a:r>
+              <a:rPr kumimoji="0" lang="de-DE" altLang="de-DE" sz="1600" b="0" i="0" u="none" strike="noStrike" cap="none" normalizeH="0" baseline="0" dirty="0">
+                <a:ln>
+                  <a:noFill/>
+                </a:ln>
+                <a:solidFill>
+                  <a:schemeClr val="tx1"/>
+                </a:solidFill>
+                <a:effectLst/>
+                <a:latin typeface="Segoe UI" panose="020B0502040204020203" pitchFamily="34" charset="0"/>
+                <a:cs typeface="Segoe UI" panose="020B0502040204020203" pitchFamily="34" charset="0"/>
+                <a:hlinkClick r:id="rId4"/>
+              </a:rPr>
+              <a:t>https://doi.org/10.1145/505696.505701</a:t>
+            </a:r>
+            <a:endParaRPr kumimoji="0" lang="de-DE" altLang="de-DE" sz="1600" b="0" i="0" u="none" strike="noStrike" cap="none" normalizeH="0" baseline="0" dirty="0">
+              <a:ln>
+                <a:noFill/>
+              </a:ln>
+              <a:solidFill>
+                <a:schemeClr val="tx1"/>
+              </a:solidFill>
+              <a:effectLst/>
+              <a:latin typeface="Segoe UI" panose="020B0502040204020203" pitchFamily="34" charset="0"/>
+              <a:cs typeface="Segoe UI" panose="020B0502040204020203" pitchFamily="34" charset="0"/>
+            </a:endParaRPr>
+          </a:p>
+          <a:p>
+            <a:pPr marL="285750" indent="-285750">
+              <a:buFont typeface="Arial" panose="020B0604020202020204" pitchFamily="34" charset="0"/>
+              <a:buChar char="•"/>
+            </a:pPr>
+            <a:r>
+              <a:rPr lang="de-DE" sz="1600" dirty="0">
+                <a:latin typeface="Segoe UI" panose="020B0502040204020203" pitchFamily="34" charset="0"/>
+              </a:rPr>
+              <a:t>[14] </a:t>
+            </a:r>
+            <a:r>
+              <a:rPr lang="de-DE" sz="1600" dirty="0" err="1">
+                <a:latin typeface="Segoe UI" panose="020B0502040204020203" pitchFamily="34" charset="0"/>
+              </a:rPr>
+              <a:t>Dharmapurikar</a:t>
+            </a:r>
+            <a:r>
+              <a:rPr lang="de-DE" sz="1600" dirty="0">
+                <a:latin typeface="Segoe UI" panose="020B0502040204020203" pitchFamily="34" charset="0"/>
+              </a:rPr>
+              <a:t> S., </a:t>
+            </a:r>
+            <a:r>
+              <a:rPr lang="de-DE" sz="1600" dirty="0" err="1">
+                <a:latin typeface="Segoe UI" panose="020B0502040204020203" pitchFamily="34" charset="0"/>
+              </a:rPr>
+              <a:t>Krishnamurthy</a:t>
+            </a:r>
+            <a:r>
+              <a:rPr lang="de-DE" sz="1600" dirty="0">
+                <a:latin typeface="Segoe UI" panose="020B0502040204020203" pitchFamily="34" charset="0"/>
+              </a:rPr>
+              <a:t> P., </a:t>
+            </a:r>
+            <a:r>
+              <a:rPr lang="de-DE" sz="1600" dirty="0" err="1">
+                <a:latin typeface="Segoe UI" panose="020B0502040204020203" pitchFamily="34" charset="0"/>
+              </a:rPr>
+              <a:t>Sproull</a:t>
+            </a:r>
+            <a:r>
+              <a:rPr lang="de-DE" sz="1600" dirty="0">
+                <a:latin typeface="Segoe UI" panose="020B0502040204020203" pitchFamily="34" charset="0"/>
+              </a:rPr>
+              <a:t> T., and Lockwood J. 2003. Deep packet </a:t>
+            </a:r>
+            <a:r>
+              <a:rPr lang="de-DE" sz="1600" dirty="0" err="1">
+                <a:latin typeface="Segoe UI" panose="020B0502040204020203" pitchFamily="34" charset="0"/>
+              </a:rPr>
+              <a:t>inspection</a:t>
+            </a:r>
+            <a:r>
+              <a:rPr lang="de-DE" sz="1600" dirty="0">
+                <a:latin typeface="Segoe UI" panose="020B0502040204020203" pitchFamily="34" charset="0"/>
+              </a:rPr>
+              <a:t> </a:t>
+            </a:r>
+            <a:r>
+              <a:rPr lang="de-DE" sz="1600" dirty="0" err="1">
+                <a:latin typeface="Segoe UI" panose="020B0502040204020203" pitchFamily="34" charset="0"/>
+              </a:rPr>
+              <a:t>using</a:t>
+            </a:r>
+            <a:r>
+              <a:rPr lang="de-DE" sz="1600" dirty="0">
+                <a:latin typeface="Segoe UI" panose="020B0502040204020203" pitchFamily="34" charset="0"/>
+              </a:rPr>
+              <a:t> parallel Bloom </a:t>
+            </a:r>
+            <a:r>
+              <a:rPr lang="de-DE" sz="1600" dirty="0" err="1">
+                <a:latin typeface="Segoe UI" panose="020B0502040204020203" pitchFamily="34" charset="0"/>
+              </a:rPr>
+              <a:t>filters</a:t>
+            </a:r>
+            <a:r>
+              <a:rPr lang="de-DE" sz="1600" dirty="0">
+                <a:latin typeface="Segoe UI" panose="020B0502040204020203" pitchFamily="34" charset="0"/>
+              </a:rPr>
+              <a:t>. In </a:t>
+            </a:r>
+            <a:r>
+              <a:rPr lang="de-DE" sz="1600" i="1" dirty="0">
+                <a:latin typeface="Segoe UI" panose="020B0502040204020203" pitchFamily="34" charset="0"/>
+              </a:rPr>
+              <a:t>11th Symposium on High Performance </a:t>
+            </a:r>
+            <a:r>
+              <a:rPr lang="de-DE" sz="1600" i="1" dirty="0" err="1">
+                <a:latin typeface="Segoe UI" panose="020B0502040204020203" pitchFamily="34" charset="0"/>
+              </a:rPr>
+              <a:t>Interconnects</a:t>
+            </a:r>
+            <a:r>
+              <a:rPr lang="de-DE" sz="1600" i="1" dirty="0">
+                <a:latin typeface="Segoe UI" panose="020B0502040204020203" pitchFamily="34" charset="0"/>
+              </a:rPr>
+              <a:t>, 2003. Proceedings</a:t>
+            </a:r>
+            <a:r>
+              <a:rPr lang="de-DE" sz="1600" i="0" dirty="0">
+                <a:latin typeface="Segoe UI" panose="020B0502040204020203" pitchFamily="34" charset="0"/>
+              </a:rPr>
+              <a:t>, 44–51. DOI: </a:t>
+            </a:r>
+            <a:r>
+              <a:rPr lang="en-US" sz="1600" dirty="0">
+                <a:latin typeface="Segoe UI" panose="020B0502040204020203" pitchFamily="34" charset="0"/>
+                <a:hlinkClick r:id="rId5"/>
+              </a:rPr>
+              <a:t>https://</a:t>
+            </a:r>
+            <a:r>
+              <a:rPr lang="de-DE" sz="1600" dirty="0">
+                <a:latin typeface="Segoe UI" panose="020B0502040204020203" pitchFamily="34" charset="0"/>
+                <a:hlinkClick r:id="rId5"/>
+              </a:rPr>
+              <a:t>doi.org/</a:t>
+            </a:r>
+            <a:r>
+              <a:rPr lang="de-DE" sz="1600" i="0" dirty="0">
+                <a:latin typeface="Segoe UI" panose="020B0502040204020203" pitchFamily="34" charset="0"/>
+                <a:hlinkClick r:id="rId5"/>
+              </a:rPr>
+              <a:t>10.1109/CONECT.2003.1231477</a:t>
+            </a:r>
+            <a:endParaRPr lang="de-DE" altLang="de-DE" sz="1600" dirty="0">
+              <a:latin typeface="Segoe UI" panose="020B0502040204020203" pitchFamily="34" charset="0"/>
+              <a:cs typeface="Segoe UI" panose="020B0502040204020203" pitchFamily="34" charset="0"/>
+            </a:endParaRPr>
+          </a:p>
+          <a:p>
+            <a:pPr marL="285750" indent="-285750">
+              <a:buFont typeface="Arial" panose="020B0604020202020204" pitchFamily="34" charset="0"/>
+              <a:buChar char="•"/>
+            </a:pPr>
+            <a:endParaRPr kumimoji="0" lang="de-DE" altLang="de-DE" sz="3600" b="0" i="0" u="none" strike="noStrike" cap="none" normalizeH="0" baseline="0" dirty="0">
+              <a:ln>
+                <a:noFill/>
+              </a:ln>
+              <a:solidFill>
+                <a:schemeClr val="tx1"/>
+              </a:solidFill>
+              <a:effectLst/>
+              <a:latin typeface="Arial" panose="020B0604020202020204" pitchFamily="34" charset="0"/>
+            </a:endParaRPr>
+          </a:p>
+          <a:p>
+            <a:pPr marL="285750" indent="-285750">
+              <a:buFont typeface="Arial" panose="020B0604020202020204" pitchFamily="34" charset="0"/>
+              <a:buChar char="•"/>
+            </a:pPr>
+            <a:endParaRPr lang="en-US" sz="1600" i="0" dirty="0">
+              <a:latin typeface="Segoe UI" panose="020B0502040204020203" pitchFamily="34" charset="0"/>
+            </a:endParaRPr>
+          </a:p>
+          <a:p>
+            <a:pPr marL="285750" indent="-285750">
+              <a:buFont typeface="Arial" panose="020B0604020202020204" pitchFamily="34" charset="0"/>
+              <a:buChar char="•"/>
+            </a:pPr>
+            <a:endParaRPr lang="en-US" sz="1600" i="0" dirty="0">
+              <a:latin typeface="Segoe UI" panose="020B0502040204020203" pitchFamily="34" charset="0"/>
+            </a:endParaRPr>
+          </a:p>
+        </p:txBody>
+      </p:sp>
+    </p:spTree>
+    <p:extLst>
+      <p:ext uri="{BB962C8B-B14F-4D97-AF65-F5344CB8AC3E}">
+        <p14:creationId xmlns:p14="http://schemas.microsoft.com/office/powerpoint/2010/main" val="3916588754"/>
+      </p:ext>
+    </p:extLst>
+  </p:cSld>
+  <p:clrMapOvr>
+    <a:masterClrMapping/>
+  </p:clrMapOvr>
+</p:sld>
+</file>
+
+<file path=ppt/slides/slide36.xml><?xml version="1.0" encoding="utf-8"?>
+<p:sld xmlns:a="http://schemas.openxmlformats.org/drawingml/2006/main" xmlns:r="http://schemas.openxmlformats.org/officeDocument/2006/relationships" xmlns:p="http://schemas.openxmlformats.org/presentationml/2006/main">
+  <p:cSld>
+    <p:spTree>
+      <p:nvGrpSpPr>
+        <p:cNvPr id="1" name=""/>
+        <p:cNvGrpSpPr/>
+        <p:nvPr/>
+      </p:nvGrpSpPr>
+      <p:grpSpPr>
+        <a:xfrm>
+          <a:off x="0" y="0"/>
+          <a:ext cx="0" cy="0"/>
+          <a:chOff x="0" y="0"/>
+          <a:chExt cx="0" cy="0"/>
+        </a:xfrm>
+      </p:grpSpPr>
+      <p:sp>
+        <p:nvSpPr>
+          <p:cNvPr id="6" name="Foliennummernplatzhalter 5"/>
+          <p:cNvSpPr>
+            <a:spLocks noGrp="1"/>
+          </p:cNvSpPr>
+          <p:nvPr>
+            <p:ph type="sldNum" sz="quarter" idx="4"/>
+          </p:nvPr>
+        </p:nvSpPr>
+        <p:spPr/>
+        <p:txBody>
+          <a:bodyPr/>
+          <a:lstStyle/>
+          <a:p>
+            <a:fld id="{F9CA7F02-FF28-4D8F-AF3B-6C950C783A54}" type="slidenum">
+              <a:rPr lang="de-DE" smtClean="0"/>
+              <a:pPr/>
+              <a:t>36</a:t>
+            </a:fld>
+            <a:endParaRPr lang="de-DE"/>
+          </a:p>
+        </p:txBody>
+      </p:sp>
+      <p:sp>
+        <p:nvSpPr>
+          <p:cNvPr id="3" name="Titel 2"/>
+          <p:cNvSpPr>
+            <a:spLocks noGrp="1"/>
+          </p:cNvSpPr>
+          <p:nvPr>
+            <p:ph type="title"/>
+          </p:nvPr>
+        </p:nvSpPr>
+        <p:spPr/>
+        <p:txBody>
+          <a:bodyPr/>
+          <a:lstStyle/>
+          <a:p>
+            <a:r>
+              <a:rPr lang="de-DE" dirty="0"/>
+              <a:t>BLOOM-FILTER</a:t>
+            </a:r>
+          </a:p>
+        </p:txBody>
+      </p:sp>
+      <p:sp>
+        <p:nvSpPr>
+          <p:cNvPr id="4" name="Inhaltsplatzhalter 3"/>
+          <p:cNvSpPr>
+            <a:spLocks noGrp="1"/>
+          </p:cNvSpPr>
+          <p:nvPr>
+            <p:ph sz="quarter" idx="13"/>
+          </p:nvPr>
+        </p:nvSpPr>
+        <p:spPr>
+          <a:xfrm>
+            <a:off x="936000" y="699542"/>
+            <a:ext cx="7308000" cy="429622"/>
+          </a:xfrm>
+        </p:spPr>
+        <p:txBody>
+          <a:bodyPr/>
+          <a:lstStyle/>
+          <a:p>
+            <a:r>
+              <a:rPr lang="de-DE" dirty="0"/>
+              <a:t>Quellen</a:t>
+            </a:r>
+          </a:p>
+        </p:txBody>
+      </p:sp>
+      <p:sp>
+        <p:nvSpPr>
+          <p:cNvPr id="7" name="Fußzeilenplatzhalter 6"/>
+          <p:cNvSpPr>
+            <a:spLocks noGrp="1"/>
+          </p:cNvSpPr>
+          <p:nvPr>
+            <p:ph type="ftr" sz="quarter" idx="3"/>
+          </p:nvPr>
+        </p:nvSpPr>
+        <p:spPr/>
+        <p:txBody>
+          <a:bodyPr/>
+          <a:lstStyle/>
+          <a:p>
+            <a:r>
+              <a:rPr lang="de-DE" dirty="0"/>
+              <a:t>TU Bergakademie Freiberg | Vortragender: Florian Schierz | 2022</a:t>
+            </a:r>
+          </a:p>
+        </p:txBody>
+      </p:sp>
+      <p:sp>
+        <p:nvSpPr>
+          <p:cNvPr id="11" name="Textfeld 10">
+            <a:extLst>
+              <a:ext uri="{FF2B5EF4-FFF2-40B4-BE49-F238E27FC236}">
+                <a16:creationId xmlns:a16="http://schemas.microsoft.com/office/drawing/2014/main" id="{AED7FCD8-3C56-4B11-ADA2-B181B3B96684}"/>
+              </a:ext>
+            </a:extLst>
+          </p:cNvPr>
+          <p:cNvSpPr txBox="1"/>
+          <p:nvPr/>
+        </p:nvSpPr>
+        <p:spPr>
+          <a:xfrm>
+            <a:off x="611560" y="1419622"/>
+            <a:ext cx="8064896" cy="5724644"/>
+          </a:xfrm>
+          <a:prstGeom prst="rect">
+            <a:avLst/>
+          </a:prstGeom>
+          <a:noFill/>
+        </p:spPr>
+        <p:txBody>
+          <a:bodyPr wrap="square" rtlCol="0">
+            <a:spAutoFit/>
+          </a:bodyPr>
+          <a:lstStyle/>
+          <a:p>
+            <a:pPr marL="285750" indent="-285750">
+              <a:buFont typeface="Arial" panose="020B0604020202020204" pitchFamily="34" charset="0"/>
+              <a:buChar char="•"/>
+            </a:pPr>
+            <a:r>
+              <a:rPr lang="en-US" sz="1600" dirty="0">
+                <a:latin typeface="Segoe UI" panose="020B0502040204020203" pitchFamily="34" charset="0"/>
+              </a:rPr>
+              <a:t>[15] </a:t>
+            </a:r>
+            <a:r>
+              <a:rPr lang="en-US" sz="1600" dirty="0" err="1">
+                <a:latin typeface="Segoe UI" panose="020B0502040204020203" pitchFamily="34" charset="0"/>
+              </a:rPr>
+              <a:t>Gremillion</a:t>
+            </a:r>
+            <a:r>
+              <a:rPr lang="en-US" sz="1600" dirty="0">
+                <a:latin typeface="Segoe UI" panose="020B0502040204020203" pitchFamily="34" charset="0"/>
+              </a:rPr>
+              <a:t>, L. L. 1982. Designing a Bloom Filter for Differential File Access. </a:t>
+            </a:r>
+            <a:r>
+              <a:rPr lang="en-US" sz="1600" i="1" dirty="0" err="1">
+                <a:latin typeface="Segoe UI" panose="020B0502040204020203" pitchFamily="34" charset="0"/>
+              </a:rPr>
+              <a:t>Commun</a:t>
+            </a:r>
+            <a:r>
+              <a:rPr lang="en-US" sz="1600" i="1" dirty="0">
+                <a:latin typeface="Segoe UI" panose="020B0502040204020203" pitchFamily="34" charset="0"/>
+              </a:rPr>
+              <a:t>. ACM</a:t>
+            </a:r>
+            <a:r>
+              <a:rPr lang="en-US" sz="1600" i="0" dirty="0">
+                <a:latin typeface="Segoe UI" panose="020B0502040204020203" pitchFamily="34" charset="0"/>
+              </a:rPr>
+              <a:t> 25, 9, 600–604. </a:t>
+            </a:r>
+            <a:r>
+              <a:rPr lang="en-US" sz="1600" i="0" dirty="0">
+                <a:latin typeface="Segoe UI" panose="020B0502040204020203" pitchFamily="34" charset="0"/>
+                <a:cs typeface="Segoe UI" panose="020B0502040204020203" pitchFamily="34" charset="0"/>
+              </a:rPr>
+              <a:t>DOI: </a:t>
+            </a:r>
+            <a:r>
+              <a:rPr kumimoji="0" lang="de-DE" altLang="de-DE" sz="1600" b="0" i="0" u="none" strike="noStrike" cap="none" normalizeH="0" baseline="0" dirty="0">
+                <a:ln>
+                  <a:noFill/>
+                </a:ln>
+                <a:solidFill>
+                  <a:schemeClr val="tx1"/>
+                </a:solidFill>
+                <a:effectLst/>
+                <a:latin typeface="Segoe UI" panose="020B0502040204020203" pitchFamily="34" charset="0"/>
+                <a:cs typeface="Segoe UI" panose="020B0502040204020203" pitchFamily="34" charset="0"/>
+                <a:hlinkClick r:id="rId2"/>
+              </a:rPr>
+              <a:t>https://doi.org/10.1145/358628.358632</a:t>
+            </a:r>
+            <a:endParaRPr kumimoji="0" lang="de-DE" altLang="de-DE" sz="1600" b="0" i="0" u="none" strike="noStrike" cap="none" normalizeH="0" baseline="0" dirty="0">
+              <a:ln>
+                <a:noFill/>
+              </a:ln>
+              <a:solidFill>
+                <a:schemeClr val="tx1"/>
+              </a:solidFill>
+              <a:effectLst/>
+              <a:latin typeface="Segoe UI" panose="020B0502040204020203" pitchFamily="34" charset="0"/>
+              <a:cs typeface="Segoe UI" panose="020B0502040204020203" pitchFamily="34" charset="0"/>
+            </a:endParaRPr>
+          </a:p>
+          <a:p>
+            <a:pPr marL="285750" indent="-285750">
+              <a:buFont typeface="Arial" panose="020B0604020202020204" pitchFamily="34" charset="0"/>
+              <a:buChar char="•"/>
+            </a:pPr>
+            <a:r>
+              <a:rPr lang="de-DE" altLang="de-DE" sz="1600" dirty="0">
+                <a:latin typeface="Segoe UI" panose="020B0502040204020203" pitchFamily="34" charset="0"/>
+                <a:cs typeface="Segoe UI" panose="020B0502040204020203" pitchFamily="34" charset="0"/>
+              </a:rPr>
+              <a:t>[16] </a:t>
+            </a:r>
+            <a:r>
+              <a:rPr lang="de-DE" sz="1600" dirty="0" err="1">
+                <a:latin typeface="Segoe UI" panose="020B0502040204020203" pitchFamily="34" charset="0"/>
+              </a:rPr>
+              <a:t>Murugan</a:t>
+            </a:r>
+            <a:r>
+              <a:rPr lang="de-DE" sz="1600" dirty="0">
+                <a:latin typeface="Segoe UI" panose="020B0502040204020203" pitchFamily="34" charset="0"/>
+              </a:rPr>
+              <a:t>, S., </a:t>
+            </a:r>
+            <a:r>
+              <a:rPr lang="de-DE" sz="1600" dirty="0" err="1">
+                <a:latin typeface="Segoe UI" panose="020B0502040204020203" pitchFamily="34" charset="0"/>
+              </a:rPr>
+              <a:t>Bakthavatchalam</a:t>
+            </a:r>
+            <a:r>
+              <a:rPr lang="de-DE" sz="1600" dirty="0">
+                <a:latin typeface="Segoe UI" panose="020B0502040204020203" pitchFamily="34" charset="0"/>
+              </a:rPr>
+              <a:t>, T. A., and </a:t>
+            </a:r>
+            <a:r>
+              <a:rPr lang="de-DE" sz="1600" dirty="0" err="1">
+                <a:latin typeface="Segoe UI" panose="020B0502040204020203" pitchFamily="34" charset="0"/>
+              </a:rPr>
+              <a:t>Sankarasubbu</a:t>
+            </a:r>
+            <a:r>
+              <a:rPr lang="de-DE" sz="1600" dirty="0">
+                <a:latin typeface="Segoe UI" panose="020B0502040204020203" pitchFamily="34" charset="0"/>
+              </a:rPr>
+              <a:t>, M. 2020. </a:t>
+            </a:r>
+            <a:r>
+              <a:rPr lang="de-DE" sz="1600" dirty="0" err="1">
+                <a:latin typeface="Segoe UI" panose="020B0502040204020203" pitchFamily="34" charset="0"/>
+              </a:rPr>
+              <a:t>SymSpell</a:t>
+            </a:r>
+            <a:r>
+              <a:rPr lang="de-DE" sz="1600" dirty="0">
+                <a:latin typeface="Segoe UI" panose="020B0502040204020203" pitchFamily="34" charset="0"/>
+              </a:rPr>
+              <a:t> and LSTM </a:t>
+            </a:r>
+            <a:r>
+              <a:rPr lang="de-DE" sz="1600" dirty="0" err="1">
+                <a:latin typeface="Segoe UI" panose="020B0502040204020203" pitchFamily="34" charset="0"/>
+              </a:rPr>
+              <a:t>based</a:t>
+            </a:r>
+            <a:r>
+              <a:rPr lang="de-DE" sz="1600" dirty="0">
+                <a:latin typeface="Segoe UI" panose="020B0502040204020203" pitchFamily="34" charset="0"/>
+              </a:rPr>
+              <a:t> </a:t>
+            </a:r>
+            <a:r>
+              <a:rPr lang="de-DE" sz="1600" dirty="0" err="1">
+                <a:latin typeface="Segoe UI" panose="020B0502040204020203" pitchFamily="34" charset="0"/>
+              </a:rPr>
+              <a:t>Spell</a:t>
+            </a:r>
+            <a:r>
+              <a:rPr lang="de-DE" sz="1600" dirty="0">
+                <a:latin typeface="Segoe UI" panose="020B0502040204020203" pitchFamily="34" charset="0"/>
+              </a:rPr>
+              <a:t>-Checkers </a:t>
+            </a:r>
+            <a:r>
+              <a:rPr lang="de-DE" sz="1600" dirty="0" err="1">
+                <a:latin typeface="Segoe UI" panose="020B0502040204020203" pitchFamily="34" charset="0"/>
+              </a:rPr>
+              <a:t>for</a:t>
+            </a:r>
+            <a:r>
+              <a:rPr lang="de-DE" sz="1600" dirty="0">
+                <a:latin typeface="Segoe UI" panose="020B0502040204020203" pitchFamily="34" charset="0"/>
+              </a:rPr>
+              <a:t> Tamil.</a:t>
+            </a:r>
+            <a:r>
+              <a:rPr lang="de-DE" sz="1600" dirty="0">
+                <a:latin typeface="Segoe UI" panose="020B0502040204020203" pitchFamily="34" charset="0"/>
+                <a:cs typeface="Segoe UI" panose="020B0502040204020203" pitchFamily="34" charset="0"/>
+              </a:rPr>
+              <a:t> </a:t>
+            </a:r>
+            <a:r>
+              <a:rPr lang="de-DE" sz="1600" dirty="0">
+                <a:latin typeface="Segoe UI" panose="020B0502040204020203" pitchFamily="34" charset="0"/>
+                <a:cs typeface="Segoe UI" panose="020B0502040204020203" pitchFamily="34" charset="0"/>
+                <a:hlinkClick r:id="rId3"/>
+              </a:rPr>
+              <a:t>http://uttamam.org/papers/20_17.pdf</a:t>
+            </a:r>
+            <a:endParaRPr lang="de-DE" sz="1600" dirty="0">
+              <a:latin typeface="Segoe UI" panose="020B0502040204020203" pitchFamily="34" charset="0"/>
+              <a:cs typeface="Segoe UI" panose="020B0502040204020203" pitchFamily="34" charset="0"/>
+            </a:endParaRPr>
+          </a:p>
+          <a:p>
+            <a:pPr marL="285750" indent="-285750">
+              <a:buFont typeface="Arial" panose="020B0604020202020204" pitchFamily="34" charset="0"/>
+              <a:buChar char="•"/>
+            </a:pPr>
+            <a:r>
+              <a:rPr kumimoji="0" lang="de-DE" altLang="de-DE" sz="1600" b="0" i="0" u="none" strike="noStrike" cap="none" normalizeH="0" baseline="0" dirty="0">
+                <a:ln>
+                  <a:noFill/>
+                </a:ln>
+                <a:solidFill>
+                  <a:schemeClr val="tx1"/>
+                </a:solidFill>
+                <a:effectLst/>
+                <a:latin typeface="Segoe UI" panose="020B0502040204020203" pitchFamily="34" charset="0"/>
+                <a:cs typeface="Segoe UI" panose="020B0502040204020203" pitchFamily="34" charset="0"/>
+              </a:rPr>
+              <a:t>[17] </a:t>
+            </a:r>
+            <a:r>
+              <a:rPr lang="de-DE" sz="1600" dirty="0" err="1">
+                <a:latin typeface="Segoe UI" panose="020B0502040204020203" pitchFamily="34" charset="0"/>
+              </a:rPr>
+              <a:t>Dharmapurikar</a:t>
+            </a:r>
+            <a:r>
+              <a:rPr lang="de-DE" sz="1600" dirty="0">
+                <a:latin typeface="Segoe UI" panose="020B0502040204020203" pitchFamily="34" charset="0"/>
+              </a:rPr>
+              <a:t>, S., </a:t>
+            </a:r>
+            <a:r>
+              <a:rPr lang="de-DE" sz="1600" dirty="0" err="1">
+                <a:latin typeface="Segoe UI" panose="020B0502040204020203" pitchFamily="34" charset="0"/>
+              </a:rPr>
+              <a:t>Krishnamurthy</a:t>
+            </a:r>
+            <a:r>
+              <a:rPr lang="de-DE" sz="1600" dirty="0">
+                <a:latin typeface="Segoe UI" panose="020B0502040204020203" pitchFamily="34" charset="0"/>
+              </a:rPr>
+              <a:t>, P., and Taylor, D. E. 2003. </a:t>
+            </a:r>
+            <a:r>
+              <a:rPr lang="de-DE" sz="1600" dirty="0" err="1">
+                <a:latin typeface="Segoe UI" panose="020B0502040204020203" pitchFamily="34" charset="0"/>
+              </a:rPr>
+              <a:t>Longest</a:t>
+            </a:r>
+            <a:r>
+              <a:rPr lang="de-DE" sz="1600" dirty="0">
+                <a:latin typeface="Segoe UI" panose="020B0502040204020203" pitchFamily="34" charset="0"/>
+              </a:rPr>
+              <a:t> </a:t>
+            </a:r>
+            <a:r>
+              <a:rPr lang="de-DE" sz="1600" dirty="0" err="1">
+                <a:latin typeface="Segoe UI" panose="020B0502040204020203" pitchFamily="34" charset="0"/>
+              </a:rPr>
+              <a:t>Prefix</a:t>
+            </a:r>
+            <a:r>
+              <a:rPr lang="de-DE" sz="1600" dirty="0">
+                <a:latin typeface="Segoe UI" panose="020B0502040204020203" pitchFamily="34" charset="0"/>
+              </a:rPr>
+              <a:t> </a:t>
+            </a:r>
+            <a:r>
+              <a:rPr lang="de-DE" sz="1600" dirty="0" err="1">
+                <a:latin typeface="Segoe UI" panose="020B0502040204020203" pitchFamily="34" charset="0"/>
+              </a:rPr>
+              <a:t>Matching</a:t>
+            </a:r>
+            <a:r>
+              <a:rPr lang="de-DE" sz="1600" dirty="0">
+                <a:latin typeface="Segoe UI" panose="020B0502040204020203" pitchFamily="34" charset="0"/>
+              </a:rPr>
+              <a:t> </a:t>
+            </a:r>
+            <a:r>
+              <a:rPr lang="de-DE" sz="1600" dirty="0" err="1">
+                <a:latin typeface="Segoe UI" panose="020B0502040204020203" pitchFamily="34" charset="0"/>
+              </a:rPr>
+              <a:t>Using</a:t>
+            </a:r>
+            <a:r>
+              <a:rPr lang="de-DE" sz="1600" dirty="0">
+                <a:latin typeface="Segoe UI" panose="020B0502040204020203" pitchFamily="34" charset="0"/>
+              </a:rPr>
+              <a:t> Bloom Filters. In </a:t>
+            </a:r>
+            <a:r>
+              <a:rPr lang="de-DE" sz="1600" i="1" dirty="0">
+                <a:latin typeface="Segoe UI" panose="020B0502040204020203" pitchFamily="34" charset="0"/>
+              </a:rPr>
+              <a:t>Proceedings </a:t>
+            </a:r>
+            <a:r>
+              <a:rPr lang="de-DE" sz="1600" i="1" dirty="0" err="1">
+                <a:latin typeface="Segoe UI" panose="020B0502040204020203" pitchFamily="34" charset="0"/>
+              </a:rPr>
+              <a:t>of</a:t>
+            </a:r>
+            <a:r>
+              <a:rPr lang="de-DE" sz="1600" i="1" dirty="0">
+                <a:latin typeface="Segoe UI" panose="020B0502040204020203" pitchFamily="34" charset="0"/>
+              </a:rPr>
+              <a:t> </a:t>
+            </a:r>
+            <a:r>
+              <a:rPr lang="de-DE" sz="1600" i="1" dirty="0" err="1">
+                <a:latin typeface="Segoe UI" panose="020B0502040204020203" pitchFamily="34" charset="0"/>
+              </a:rPr>
+              <a:t>the</a:t>
+            </a:r>
+            <a:r>
+              <a:rPr lang="de-DE" sz="1600" i="1" dirty="0">
+                <a:latin typeface="Segoe UI" panose="020B0502040204020203" pitchFamily="34" charset="0"/>
+              </a:rPr>
+              <a:t> 2003 Conference on </a:t>
+            </a:r>
+            <a:r>
+              <a:rPr lang="de-DE" sz="1600" i="1" dirty="0" err="1">
+                <a:latin typeface="Segoe UI" panose="020B0502040204020203" pitchFamily="34" charset="0"/>
+              </a:rPr>
+              <a:t>Applications</a:t>
+            </a:r>
+            <a:r>
+              <a:rPr lang="de-DE" sz="1600" i="1" dirty="0">
+                <a:latin typeface="Segoe UI" panose="020B0502040204020203" pitchFamily="34" charset="0"/>
+              </a:rPr>
+              <a:t>, Technologies, </a:t>
+            </a:r>
+            <a:r>
+              <a:rPr lang="de-DE" sz="1600" i="1" dirty="0" err="1">
+                <a:latin typeface="Segoe UI" panose="020B0502040204020203" pitchFamily="34" charset="0"/>
+              </a:rPr>
+              <a:t>Architectures</a:t>
+            </a:r>
+            <a:r>
+              <a:rPr lang="de-DE" sz="1600" i="1" dirty="0">
+                <a:latin typeface="Segoe UI" panose="020B0502040204020203" pitchFamily="34" charset="0"/>
+              </a:rPr>
+              <a:t>, and </a:t>
+            </a:r>
+            <a:r>
+              <a:rPr lang="de-DE" sz="1600" i="1" dirty="0" err="1">
+                <a:latin typeface="Segoe UI" panose="020B0502040204020203" pitchFamily="34" charset="0"/>
+              </a:rPr>
+              <a:t>Protocols</a:t>
+            </a:r>
+            <a:r>
+              <a:rPr lang="de-DE" sz="1600" i="1" dirty="0">
+                <a:latin typeface="Segoe UI" panose="020B0502040204020203" pitchFamily="34" charset="0"/>
+              </a:rPr>
+              <a:t> </a:t>
+            </a:r>
+            <a:r>
+              <a:rPr lang="de-DE" sz="1600" i="1" dirty="0" err="1">
+                <a:latin typeface="Segoe UI" panose="020B0502040204020203" pitchFamily="34" charset="0"/>
+              </a:rPr>
+              <a:t>for</a:t>
+            </a:r>
+            <a:r>
+              <a:rPr lang="de-DE" sz="1600" i="1" dirty="0">
+                <a:latin typeface="Segoe UI" panose="020B0502040204020203" pitchFamily="34" charset="0"/>
+              </a:rPr>
+              <a:t> Computer Communications</a:t>
+            </a:r>
+            <a:r>
+              <a:rPr lang="de-DE" sz="1600" i="0" dirty="0">
+                <a:latin typeface="Segoe UI" panose="020B0502040204020203" pitchFamily="34" charset="0"/>
+              </a:rPr>
+              <a:t>. SIGCOMM ’03. </a:t>
+            </a:r>
+            <a:r>
+              <a:rPr lang="de-DE" sz="1600" i="0" dirty="0" err="1">
+                <a:latin typeface="Segoe UI" panose="020B0502040204020203" pitchFamily="34" charset="0"/>
+              </a:rPr>
+              <a:t>Association</a:t>
+            </a:r>
+            <a:r>
+              <a:rPr lang="de-DE" sz="1600" i="0" dirty="0">
+                <a:latin typeface="Segoe UI" panose="020B0502040204020203" pitchFamily="34" charset="0"/>
+              </a:rPr>
+              <a:t> </a:t>
+            </a:r>
+            <a:r>
+              <a:rPr lang="de-DE" sz="1600" i="0" dirty="0" err="1">
+                <a:latin typeface="Segoe UI" panose="020B0502040204020203" pitchFamily="34" charset="0"/>
+              </a:rPr>
+              <a:t>for</a:t>
+            </a:r>
+            <a:r>
+              <a:rPr lang="de-DE" sz="1600" i="0" dirty="0">
+                <a:latin typeface="Segoe UI" panose="020B0502040204020203" pitchFamily="34" charset="0"/>
+              </a:rPr>
+              <a:t> Computing Machinery, New York, NY, USA, 201–212. DOI: </a:t>
+            </a:r>
+            <a:r>
+              <a:rPr lang="de-DE" altLang="de-DE" sz="1600" dirty="0">
+                <a:latin typeface="Segoe UI" panose="020B0502040204020203" pitchFamily="34" charset="0"/>
+                <a:cs typeface="Segoe UI" panose="020B0502040204020203" pitchFamily="34" charset="0"/>
+                <a:hlinkClick r:id="rId4"/>
+              </a:rPr>
+              <a:t>https://doi.org/</a:t>
+            </a:r>
+            <a:r>
+              <a:rPr lang="de-DE" sz="1600" i="0" dirty="0">
+                <a:latin typeface="Segoe UI" panose="020B0502040204020203" pitchFamily="34" charset="0"/>
+                <a:hlinkClick r:id="rId4"/>
+              </a:rPr>
+              <a:t>10.1145/863955.863979</a:t>
+            </a:r>
+            <a:endParaRPr lang="de-DE" sz="1600" i="0" dirty="0">
+              <a:latin typeface="Segoe UI" panose="020B0502040204020203" pitchFamily="34" charset="0"/>
+            </a:endParaRPr>
+          </a:p>
+          <a:p>
+            <a:pPr marL="285750" indent="-285750">
+              <a:buFont typeface="Arial" panose="020B0604020202020204" pitchFamily="34" charset="0"/>
+              <a:buChar char="•"/>
+            </a:pPr>
+            <a:r>
+              <a:rPr lang="de-DE" sz="1600" dirty="0">
+                <a:latin typeface="Segoe UI" panose="020B0502040204020203" pitchFamily="34" charset="0"/>
+              </a:rPr>
+              <a:t>[18] </a:t>
+            </a:r>
+            <a:r>
+              <a:rPr lang="en-US" sz="1600" dirty="0">
+                <a:latin typeface="Segoe UI" panose="020B0502040204020203" pitchFamily="34" charset="0"/>
+              </a:rPr>
+              <a:t>Jain, N., Dahlin, M., and </a:t>
+            </a:r>
+            <a:r>
+              <a:rPr lang="en-US" sz="1600" dirty="0" err="1">
+                <a:latin typeface="Segoe UI" panose="020B0502040204020203" pitchFamily="34" charset="0"/>
+              </a:rPr>
+              <a:t>Tewar</a:t>
+            </a:r>
+            <a:r>
+              <a:rPr lang="en-US" sz="1600" dirty="0">
+                <a:latin typeface="Segoe UI" panose="020B0502040204020203" pitchFamily="34" charset="0"/>
+              </a:rPr>
+              <a:t>, R. 2005. Using Bloom Filters to Refine Web Search Results. In </a:t>
+            </a:r>
+            <a:r>
+              <a:rPr lang="en-US" sz="1600" i="1" dirty="0">
+                <a:latin typeface="Segoe UI" panose="020B0502040204020203" pitchFamily="34" charset="0"/>
+              </a:rPr>
+              <a:t>Eighth International Workshop on the Web and Databases (</a:t>
+            </a:r>
+            <a:r>
+              <a:rPr lang="en-US" sz="1600" i="1" dirty="0" err="1">
+                <a:latin typeface="Segoe UI" panose="020B0502040204020203" pitchFamily="34" charset="0"/>
+              </a:rPr>
+              <a:t>WebDB</a:t>
+            </a:r>
+            <a:r>
+              <a:rPr lang="en-US" sz="1600" i="1" dirty="0">
+                <a:latin typeface="Segoe UI" panose="020B0502040204020203" pitchFamily="34" charset="0"/>
+              </a:rPr>
+              <a:t> ’05)</a:t>
+            </a:r>
+            <a:r>
+              <a:rPr lang="en-US" sz="1600" i="0" dirty="0">
+                <a:latin typeface="Segoe UI" panose="020B0502040204020203" pitchFamily="34" charset="0"/>
+              </a:rPr>
+              <a:t>.</a:t>
+            </a:r>
+            <a:r>
+              <a:rPr lang="de-DE" sz="1600" dirty="0">
+                <a:latin typeface="Segoe UI" panose="020B0502040204020203" pitchFamily="34" charset="0"/>
+              </a:rPr>
+              <a:t> https://www.microsoft.com/en-us/research/wp-content/uploads/2017/01/webdb-167.pdf</a:t>
+            </a:r>
+          </a:p>
+          <a:p>
+            <a:pPr marL="285750" indent="-285750">
+              <a:buFont typeface="Arial" panose="020B0604020202020204" pitchFamily="34" charset="0"/>
+              <a:buChar char="•"/>
+            </a:pPr>
+            <a:endParaRPr kumimoji="0" lang="de-DE" altLang="de-DE" sz="1600" b="0" i="0" u="none" strike="noStrike" cap="none" normalizeH="0" baseline="0" dirty="0">
+              <a:ln>
+                <a:noFill/>
+              </a:ln>
+              <a:solidFill>
+                <a:schemeClr val="tx1"/>
+              </a:solidFill>
+              <a:effectLst/>
+              <a:latin typeface="Segoe UI" panose="020B0502040204020203" pitchFamily="34" charset="0"/>
+              <a:cs typeface="Segoe UI" panose="020B0502040204020203" pitchFamily="34" charset="0"/>
+            </a:endParaRPr>
+          </a:p>
+          <a:p>
+            <a:pPr marL="285750" indent="-285750">
+              <a:buFont typeface="Arial" panose="020B0604020202020204" pitchFamily="34" charset="0"/>
+              <a:buChar char="•"/>
+            </a:pPr>
+            <a:endParaRPr lang="de-DE" altLang="de-DE" sz="1600" dirty="0">
+              <a:latin typeface="Segoe UI" panose="020B0502040204020203" pitchFamily="34" charset="0"/>
+              <a:cs typeface="Segoe UI" panose="020B0502040204020203" pitchFamily="34" charset="0"/>
+            </a:endParaRPr>
+          </a:p>
+          <a:p>
+            <a:pPr marL="285750" indent="-285750">
+              <a:buFont typeface="Arial" panose="020B0604020202020204" pitchFamily="34" charset="0"/>
+              <a:buChar char="•"/>
+            </a:pPr>
+            <a:endParaRPr kumimoji="0" lang="de-DE" altLang="de-DE" sz="3600" b="0" i="0" u="none" strike="noStrike" cap="none" normalizeH="0" baseline="0" dirty="0">
+              <a:ln>
+                <a:noFill/>
+              </a:ln>
+              <a:solidFill>
+                <a:schemeClr val="tx1"/>
+              </a:solidFill>
+              <a:effectLst/>
+              <a:latin typeface="Arial" panose="020B0604020202020204" pitchFamily="34" charset="0"/>
+            </a:endParaRPr>
+          </a:p>
+          <a:p>
+            <a:pPr marL="285750" indent="-285750">
+              <a:buFont typeface="Arial" panose="020B0604020202020204" pitchFamily="34" charset="0"/>
+              <a:buChar char="•"/>
+            </a:pPr>
+            <a:endParaRPr lang="de-DE" altLang="de-DE" sz="1600" dirty="0">
+              <a:latin typeface="Segoe UI" panose="020B0502040204020203" pitchFamily="34" charset="0"/>
+              <a:cs typeface="Segoe UI" panose="020B0502040204020203" pitchFamily="34" charset="0"/>
+            </a:endParaRPr>
+          </a:p>
+          <a:p>
+            <a:pPr marL="285750" indent="-285750">
+              <a:buFont typeface="Arial" panose="020B0604020202020204" pitchFamily="34" charset="0"/>
+              <a:buChar char="•"/>
+            </a:pPr>
+            <a:endParaRPr kumimoji="0" lang="de-DE" altLang="de-DE" sz="3600" b="0" i="0" u="none" strike="noStrike" cap="none" normalizeH="0" baseline="0" dirty="0">
+              <a:ln>
+                <a:noFill/>
+              </a:ln>
+              <a:solidFill>
+                <a:schemeClr val="tx1"/>
+              </a:solidFill>
+              <a:effectLst/>
+              <a:latin typeface="Arial" panose="020B0604020202020204" pitchFamily="34" charset="0"/>
+            </a:endParaRPr>
+          </a:p>
+          <a:p>
+            <a:pPr marL="285750" indent="-285750">
+              <a:buFont typeface="Arial" panose="020B0604020202020204" pitchFamily="34" charset="0"/>
+              <a:buChar char="•"/>
+            </a:pPr>
+            <a:endParaRPr lang="en-US" sz="1600" i="0" dirty="0">
+              <a:latin typeface="Segoe UI" panose="020B0502040204020203" pitchFamily="34" charset="0"/>
+            </a:endParaRPr>
+          </a:p>
+          <a:p>
+            <a:pPr marL="285750" indent="-285750">
+              <a:buFont typeface="Arial" panose="020B0604020202020204" pitchFamily="34" charset="0"/>
+              <a:buChar char="•"/>
+            </a:pPr>
+            <a:endParaRPr lang="en-US" sz="1600" i="0" dirty="0">
+              <a:latin typeface="Segoe UI" panose="020B0502040204020203" pitchFamily="34" charset="0"/>
+            </a:endParaRPr>
+          </a:p>
+        </p:txBody>
+      </p:sp>
+    </p:spTree>
+    <p:extLst>
+      <p:ext uri="{BB962C8B-B14F-4D97-AF65-F5344CB8AC3E}">
+        <p14:creationId xmlns:p14="http://schemas.microsoft.com/office/powerpoint/2010/main" val="3408374900"/>
+      </p:ext>
+    </p:extLst>
+  </p:cSld>
+  <p:clrMapOvr>
+    <a:masterClrMapping/>
+  </p:clrMapOvr>
+</p:sld>
+</file>
+
+<file path=ppt/slides/slide37.xml><?xml version="1.0" encoding="utf-8"?>
+<p:sld xmlns:a="http://schemas.openxmlformats.org/drawingml/2006/main" xmlns:r="http://schemas.openxmlformats.org/officeDocument/2006/relationships" xmlns:p="http://schemas.openxmlformats.org/presentationml/2006/main">
+  <p:cSld>
+    <p:spTree>
+      <p:nvGrpSpPr>
+        <p:cNvPr id="1" name=""/>
+        <p:cNvGrpSpPr/>
+        <p:nvPr/>
+      </p:nvGrpSpPr>
+      <p:grpSpPr>
+        <a:xfrm>
+          <a:off x="0" y="0"/>
+          <a:ext cx="0" cy="0"/>
+          <a:chOff x="0" y="0"/>
+          <a:chExt cx="0" cy="0"/>
+        </a:xfrm>
+      </p:grpSpPr>
+      <p:sp>
+        <p:nvSpPr>
+          <p:cNvPr id="6" name="Foliennummernplatzhalter 5"/>
+          <p:cNvSpPr>
+            <a:spLocks noGrp="1"/>
+          </p:cNvSpPr>
+          <p:nvPr>
+            <p:ph type="sldNum" sz="quarter" idx="4"/>
+          </p:nvPr>
+        </p:nvSpPr>
+        <p:spPr/>
+        <p:txBody>
+          <a:bodyPr/>
+          <a:lstStyle/>
+          <a:p>
+            <a:fld id="{F9CA7F02-FF28-4D8F-AF3B-6C950C783A54}" type="slidenum">
+              <a:rPr lang="de-DE" smtClean="0"/>
+              <a:pPr/>
+              <a:t>37</a:t>
+            </a:fld>
+            <a:endParaRPr lang="de-DE"/>
+          </a:p>
+        </p:txBody>
+      </p:sp>
+      <p:sp>
+        <p:nvSpPr>
+          <p:cNvPr id="3" name="Titel 2"/>
+          <p:cNvSpPr>
+            <a:spLocks noGrp="1"/>
+          </p:cNvSpPr>
+          <p:nvPr>
+            <p:ph type="title"/>
+          </p:nvPr>
+        </p:nvSpPr>
+        <p:spPr/>
+        <p:txBody>
+          <a:bodyPr/>
+          <a:lstStyle/>
+          <a:p>
+            <a:r>
+              <a:rPr lang="de-DE" dirty="0"/>
+              <a:t>BLOOM-FILTER</a:t>
+            </a:r>
+          </a:p>
+        </p:txBody>
+      </p:sp>
+      <p:sp>
+        <p:nvSpPr>
+          <p:cNvPr id="4" name="Inhaltsplatzhalter 3"/>
+          <p:cNvSpPr>
+            <a:spLocks noGrp="1"/>
+          </p:cNvSpPr>
+          <p:nvPr>
+            <p:ph sz="quarter" idx="13"/>
+          </p:nvPr>
+        </p:nvSpPr>
+        <p:spPr>
+          <a:xfrm>
+            <a:off x="936000" y="699542"/>
+            <a:ext cx="7308000" cy="429622"/>
+          </a:xfrm>
+        </p:spPr>
+        <p:txBody>
+          <a:bodyPr/>
+          <a:lstStyle/>
+          <a:p>
+            <a:r>
+              <a:rPr lang="de-DE" dirty="0"/>
+              <a:t>Quellen</a:t>
+            </a:r>
+          </a:p>
+        </p:txBody>
+      </p:sp>
+      <p:sp>
+        <p:nvSpPr>
+          <p:cNvPr id="7" name="Fußzeilenplatzhalter 6"/>
+          <p:cNvSpPr>
+            <a:spLocks noGrp="1"/>
+          </p:cNvSpPr>
+          <p:nvPr>
+            <p:ph type="ftr" sz="quarter" idx="3"/>
+          </p:nvPr>
+        </p:nvSpPr>
+        <p:spPr/>
+        <p:txBody>
+          <a:bodyPr/>
+          <a:lstStyle/>
+          <a:p>
+            <a:r>
+              <a:rPr lang="de-DE" dirty="0"/>
+              <a:t>TU Bergakademie Freiberg | Vortragender: Florian Schierz | 2022</a:t>
+            </a:r>
+          </a:p>
+        </p:txBody>
+      </p:sp>
+      <p:sp>
+        <p:nvSpPr>
+          <p:cNvPr id="11" name="Textfeld 10">
+            <a:extLst>
+              <a:ext uri="{FF2B5EF4-FFF2-40B4-BE49-F238E27FC236}">
+                <a16:creationId xmlns:a16="http://schemas.microsoft.com/office/drawing/2014/main" id="{AED7FCD8-3C56-4B11-ADA2-B181B3B96684}"/>
+              </a:ext>
+            </a:extLst>
+          </p:cNvPr>
+          <p:cNvSpPr txBox="1"/>
+          <p:nvPr/>
+        </p:nvSpPr>
+        <p:spPr>
+          <a:xfrm>
+            <a:off x="611560" y="1419622"/>
             <a:ext cx="8064896" cy="1323439"/>
           </a:xfrm>
           <a:prstGeom prst="rect">
@@ -15034,7 +15864,7 @@
 </p:sld>
 </file>
 
-<file path=ppt/slides/slide34.xml><?xml version="1.0" encoding="utf-8"?>
+<file path=ppt/slides/slide38.xml><?xml version="1.0" encoding="utf-8"?>
 <p:sld xmlns:a="http://schemas.openxmlformats.org/drawingml/2006/main" xmlns:r="http://schemas.openxmlformats.org/officeDocument/2006/relationships" xmlns:p="http://schemas.openxmlformats.org/presentationml/2006/main">
   <p:cSld>
     <p:spTree>
@@ -15537,7 +16367,7 @@
             <a:fld id="{F9CA7F02-FF28-4D8F-AF3B-6C950C783A54}" type="slidenum">
               <a:rPr lang="de-DE" smtClean="0"/>
               <a:pPr/>
-              <a:t>34</a:t>
+              <a:t>38</a:t>
             </a:fld>
             <a:endParaRPr lang="de-DE"/>
           </a:p>

</xml_diff>